<commit_message>
Examples of phonon_simple and isotropic_sqw output
</commit_message>
<xml_diff>
--- a/CSNS_March_2019/4_Thursday_March_28th/5_inelastic_scattering/inelastic_scattering.pptx
+++ b/CSNS_March_2019/4_Thursday_March_28th/5_inelastic_scattering/inelastic_scattering.pptx
@@ -5,7 +5,7 @@
     <p:sldMasterId id="2147483648" r:id="rId1"/>
   </p:sldMasterIdLst>
   <p:notesMasterIdLst>
-    <p:notesMasterId r:id="rId14"/>
+    <p:notesMasterId r:id="rId16"/>
   </p:notesMasterIdLst>
   <p:sldIdLst>
     <p:sldId id="256" r:id="rId2"/>
@@ -14,12 +14,14 @@
     <p:sldId id="266" r:id="rId5"/>
     <p:sldId id="267" r:id="rId6"/>
     <p:sldId id="268" r:id="rId7"/>
-    <p:sldId id="269" r:id="rId8"/>
-    <p:sldId id="273" r:id="rId9"/>
-    <p:sldId id="271" r:id="rId10"/>
-    <p:sldId id="272" r:id="rId11"/>
-    <p:sldId id="274" r:id="rId12"/>
-    <p:sldId id="275" r:id="rId13"/>
+    <p:sldId id="276" r:id="rId8"/>
+    <p:sldId id="269" r:id="rId9"/>
+    <p:sldId id="277" r:id="rId10"/>
+    <p:sldId id="273" r:id="rId11"/>
+    <p:sldId id="271" r:id="rId12"/>
+    <p:sldId id="272" r:id="rId13"/>
+    <p:sldId id="274" r:id="rId14"/>
+    <p:sldId id="275" r:id="rId15"/>
   </p:sldIdLst>
   <p:sldSz cx="12179300" cy="6858000"/>
   <p:notesSz cx="6858000" cy="9144000"/>
@@ -1203,7 +1205,7 @@
           </a:ln>
           <a:extLst>
             <a:ext uri="{C572A759-6A51-4108-AA02-DFA0A04FC94B}">
-              <ma14:wrappingTextBoxFlag xmlns="" xmlns:m="http://schemas.openxmlformats.org/officeDocument/2006/math" xmlns:a14="http://schemas.microsoft.com/office/drawing/2010/main" xmlns:ma14="http://schemas.microsoft.com/office/mac/drawingml/2011/main" val="1"/>
+              <ma14:wrappingTextBoxFlag xmlns:ma14="http://schemas.microsoft.com/office/mac/drawingml/2011/main" xmlns:a14="http://schemas.microsoft.com/office/drawing/2010/main" xmlns:m="http://schemas.openxmlformats.org/officeDocument/2006/math" xmlns="" val="1"/>
             </a:ext>
           </a:extLst>
         </p:spPr>
@@ -1249,7 +1251,7 @@
           </a:ln>
           <a:extLst>
             <a:ext uri="{C572A759-6A51-4108-AA02-DFA0A04FC94B}">
-              <ma14:wrappingTextBoxFlag xmlns="" xmlns:m="http://schemas.openxmlformats.org/officeDocument/2006/math" xmlns:a14="http://schemas.microsoft.com/office/drawing/2010/main" xmlns:ma14="http://schemas.microsoft.com/office/mac/drawingml/2011/main" val="1"/>
+              <ma14:wrappingTextBoxFlag xmlns:ma14="http://schemas.microsoft.com/office/mac/drawingml/2011/main" xmlns:a14="http://schemas.microsoft.com/office/drawing/2010/main" xmlns:m="http://schemas.openxmlformats.org/officeDocument/2006/math" xmlns="" val="1"/>
             </a:ext>
           </a:extLst>
         </p:spPr>
@@ -2237,7 +2239,7 @@
             <a:effectLst/>
             <a:extLst>
               <a:ext uri="{C572A759-6A51-4108-AA02-DFA0A04FC94B}">
-                <ma14:wrappingTextBoxFlag xmlns="" xmlns:m="http://schemas.openxmlformats.org/officeDocument/2006/math" xmlns:a14="http://schemas.microsoft.com/office/drawing/2010/main" xmlns:ma14="http://schemas.microsoft.com/office/mac/drawingml/2011/main" val="1"/>
+                <ma14:wrappingTextBoxFlag xmlns:ma14="http://schemas.microsoft.com/office/mac/drawingml/2011/main" xmlns:a14="http://schemas.microsoft.com/office/drawing/2010/main" xmlns:m="http://schemas.openxmlformats.org/officeDocument/2006/math" xmlns="" val="1"/>
               </a:ext>
             </a:extLst>
           </p:spPr>
@@ -2835,7 +2837,7 @@
           </a:ln>
           <a:extLst>
             <a:ext uri="{C572A759-6A51-4108-AA02-DFA0A04FC94B}">
-              <ma14:wrappingTextBoxFlag xmlns="" xmlns:m="http://schemas.openxmlformats.org/officeDocument/2006/math" xmlns:a14="http://schemas.microsoft.com/office/drawing/2010/main" xmlns:ma14="http://schemas.microsoft.com/office/mac/drawingml/2011/main" val="1"/>
+              <ma14:wrappingTextBoxFlag xmlns:ma14="http://schemas.microsoft.com/office/mac/drawingml/2011/main" xmlns:a14="http://schemas.microsoft.com/office/drawing/2010/main" xmlns:m="http://schemas.openxmlformats.org/officeDocument/2006/math" xmlns="" val="1"/>
             </a:ext>
           </a:extLst>
         </p:spPr>
@@ -2881,7 +2883,7 @@
           </a:ln>
           <a:extLst>
             <a:ext uri="{C572A759-6A51-4108-AA02-DFA0A04FC94B}">
-              <ma14:wrappingTextBoxFlag xmlns="" xmlns:m="http://schemas.openxmlformats.org/officeDocument/2006/math" xmlns:a14="http://schemas.microsoft.com/office/drawing/2010/main" xmlns:ma14="http://schemas.microsoft.com/office/mac/drawingml/2011/main" val="1"/>
+              <ma14:wrappingTextBoxFlag xmlns:ma14="http://schemas.microsoft.com/office/mac/drawingml/2011/main" xmlns:a14="http://schemas.microsoft.com/office/drawing/2010/main" xmlns:m="http://schemas.openxmlformats.org/officeDocument/2006/math" xmlns="" val="1"/>
             </a:ext>
           </a:extLst>
         </p:spPr>
@@ -3785,7 +3787,7 @@
             <a:effectLst/>
             <a:extLst>
               <a:ext uri="{C572A759-6A51-4108-AA02-DFA0A04FC94B}">
-                <ma14:wrappingTextBoxFlag xmlns="" xmlns:m="http://schemas.openxmlformats.org/officeDocument/2006/math" xmlns:a14="http://schemas.microsoft.com/office/drawing/2010/main" xmlns:ma14="http://schemas.microsoft.com/office/mac/drawingml/2011/main" val="1"/>
+                <ma14:wrappingTextBoxFlag xmlns:ma14="http://schemas.microsoft.com/office/mac/drawingml/2011/main" xmlns:a14="http://schemas.microsoft.com/office/drawing/2010/main" xmlns:m="http://schemas.openxmlformats.org/officeDocument/2006/math" xmlns="" val="1"/>
               </a:ext>
             </a:extLst>
           </p:spPr>
@@ -4420,7 +4422,7 @@
           </a:ln>
           <a:extLst>
             <a:ext uri="{C572A759-6A51-4108-AA02-DFA0A04FC94B}">
-              <ma14:wrappingTextBoxFlag xmlns="" xmlns:m="http://schemas.openxmlformats.org/officeDocument/2006/math" xmlns:a14="http://schemas.microsoft.com/office/drawing/2010/main" xmlns:ma14="http://schemas.microsoft.com/office/mac/drawingml/2011/main" val="1"/>
+              <ma14:wrappingTextBoxFlag xmlns:ma14="http://schemas.microsoft.com/office/mac/drawingml/2011/main" xmlns:a14="http://schemas.microsoft.com/office/drawing/2010/main" xmlns:m="http://schemas.openxmlformats.org/officeDocument/2006/math" xmlns="" val="1"/>
             </a:ext>
           </a:extLst>
         </p:spPr>
@@ -4466,7 +4468,7 @@
           </a:ln>
           <a:extLst>
             <a:ext uri="{C572A759-6A51-4108-AA02-DFA0A04FC94B}">
-              <ma14:wrappingTextBoxFlag xmlns="" xmlns:m="http://schemas.openxmlformats.org/officeDocument/2006/math" xmlns:a14="http://schemas.microsoft.com/office/drawing/2010/main" xmlns:ma14="http://schemas.microsoft.com/office/mac/drawingml/2011/main" val="1"/>
+              <ma14:wrappingTextBoxFlag xmlns:ma14="http://schemas.microsoft.com/office/mac/drawingml/2011/main" xmlns:a14="http://schemas.microsoft.com/office/drawing/2010/main" xmlns:m="http://schemas.openxmlformats.org/officeDocument/2006/math" xmlns="" val="1"/>
             </a:ext>
           </a:extLst>
         </p:spPr>
@@ -5333,7 +5335,7 @@
             <a:effectLst/>
             <a:extLst>
               <a:ext uri="{C572A759-6A51-4108-AA02-DFA0A04FC94B}">
-                <ma14:wrappingTextBoxFlag xmlns="" xmlns:m="http://schemas.openxmlformats.org/officeDocument/2006/math" xmlns:a14="http://schemas.microsoft.com/office/drawing/2010/main" xmlns:ma14="http://schemas.microsoft.com/office/mac/drawingml/2011/main" val="1"/>
+                <ma14:wrappingTextBoxFlag xmlns:ma14="http://schemas.microsoft.com/office/mac/drawingml/2011/main" xmlns:a14="http://schemas.microsoft.com/office/drawing/2010/main" xmlns:m="http://schemas.openxmlformats.org/officeDocument/2006/math" xmlns="" val="1"/>
               </a:ext>
             </a:extLst>
           </p:spPr>
@@ -5386,7 +5388,7 @@
           </a:ln>
           <a:extLst>
             <a:ext uri="{C572A759-6A51-4108-AA02-DFA0A04FC94B}">
-              <ma14:wrappingTextBoxFlag xmlns="" xmlns:m="http://schemas.openxmlformats.org/officeDocument/2006/math" xmlns:a14="http://schemas.microsoft.com/office/drawing/2010/main" xmlns:ma14="http://schemas.microsoft.com/office/mac/drawingml/2011/main" val="1"/>
+              <ma14:wrappingTextBoxFlag xmlns:ma14="http://schemas.microsoft.com/office/mac/drawingml/2011/main" xmlns:a14="http://schemas.microsoft.com/office/drawing/2010/main" xmlns:m="http://schemas.openxmlformats.org/officeDocument/2006/math" xmlns="" val="1"/>
             </a:ext>
           </a:extLst>
         </p:spPr>
@@ -5423,7 +5425,7 @@
           </a:ln>
           <a:extLst>
             <a:ext uri="{C572A759-6A51-4108-AA02-DFA0A04FC94B}">
-              <ma14:wrappingTextBoxFlag xmlns="" xmlns:m="http://schemas.openxmlformats.org/officeDocument/2006/math" xmlns:a14="http://schemas.microsoft.com/office/drawing/2010/main" xmlns:ma14="http://schemas.microsoft.com/office/mac/drawingml/2011/main" val="1"/>
+              <ma14:wrappingTextBoxFlag xmlns:ma14="http://schemas.microsoft.com/office/mac/drawingml/2011/main" xmlns:a14="http://schemas.microsoft.com/office/drawing/2010/main" xmlns:m="http://schemas.openxmlformats.org/officeDocument/2006/math" xmlns="" val="1"/>
             </a:ext>
           </a:extLst>
         </p:spPr>
@@ -6366,7 +6368,7 @@
           </a:prstGeom>
           <a:extLst>
             <a:ext uri="{C572A759-6A51-4108-AA02-DFA0A04FC94B}">
-              <ma14:wrappingTextBoxFlag xmlns="" xmlns:m="http://schemas.openxmlformats.org/officeDocument/2006/math" xmlns:a14="http://schemas.microsoft.com/office/drawing/2010/main" xmlns:ma14="http://schemas.microsoft.com/office/mac/drawingml/2011/main" val="1"/>
+              <ma14:wrappingTextBoxFlag xmlns:ma14="http://schemas.microsoft.com/office/mac/drawingml/2011/main" xmlns:a14="http://schemas.microsoft.com/office/drawing/2010/main" xmlns:m="http://schemas.openxmlformats.org/officeDocument/2006/math" xmlns="" val="1"/>
             </a:ext>
           </a:extLst>
         </p:spPr>
@@ -6431,12 +6433,213 @@
           <a:lstStyle/>
           <a:p>
             <a:r>
+              <a:rPr lang="da-DK" dirty="0" err="1"/>
+              <a:t>Popular</a:t>
+            </a:r>
+            <a:r>
               <a:rPr lang="da-DK" dirty="0"/>
-              <a:t>Chopper </a:t>
+              <a:t> component: </a:t>
             </a:r>
             <a:r>
               <a:rPr lang="da-DK" dirty="0" err="1"/>
-              <a:t>spectrometers</a:t>
+              <a:t>Isotropic_sqw</a:t>
+            </a:r>
+            <a:endParaRPr dirty="0"/>
+          </a:p>
+        </p:txBody>
+      </p:sp>
+      <p:sp>
+        <p:nvSpPr>
+          <p:cNvPr id="251" name="Content Placeholder 5"/>
+          <p:cNvSpPr txBox="1">
+            <a:spLocks noGrp="1"/>
+          </p:cNvSpPr>
+          <p:nvPr>
+            <p:ph type="body" idx="1"/>
+          </p:nvPr>
+        </p:nvSpPr>
+        <p:spPr>
+          <a:xfrm>
+            <a:off x="1774799" y="1706399"/>
+            <a:ext cx="9312376" cy="4545579"/>
+          </a:xfrm>
+          <a:prstGeom prst="rect">
+            <a:avLst/>
+          </a:prstGeom>
+        </p:spPr>
+        <p:txBody>
+          <a:bodyPr/>
+          <a:lstStyle/>
+          <a:p>
+            <a:r>
+              <a:rPr lang="da-DK" dirty="0"/>
+              <a:t>Rb </a:t>
+            </a:r>
+            <a:r>
+              <a:rPr lang="da-DK" dirty="0" err="1"/>
+              <a:t>liquid</a:t>
+            </a:r>
+            <a:r>
+              <a:rPr lang="da-DK" dirty="0"/>
+              <a:t> in time of </a:t>
+            </a:r>
+            <a:r>
+              <a:rPr lang="da-DK" dirty="0" err="1"/>
+              <a:t>flight</a:t>
+            </a:r>
+            <a:endParaRPr lang="da-DK" dirty="0"/>
+          </a:p>
+          <a:p>
+            <a:r>
+              <a:rPr lang="da-DK" dirty="0" err="1"/>
+              <a:t>Coherent</a:t>
+            </a:r>
+            <a:r>
+              <a:rPr lang="da-DK" dirty="0"/>
+              <a:t> and </a:t>
+            </a:r>
+            <a:r>
+              <a:rPr lang="da-DK" dirty="0" err="1"/>
+              <a:t>incoherent</a:t>
+            </a:r>
+            <a:endParaRPr lang="da-DK" dirty="0"/>
+          </a:p>
+          <a:p>
+            <a:pPr marL="0" indent="0">
+              <a:buNone/>
+            </a:pPr>
+            <a:endParaRPr dirty="0"/>
+          </a:p>
+        </p:txBody>
+      </p:sp>
+      <p:sp>
+        <p:nvSpPr>
+          <p:cNvPr id="252" name="Slide Number Placeholder 3"/>
+          <p:cNvSpPr txBox="1">
+            <a:spLocks noGrp="1"/>
+          </p:cNvSpPr>
+          <p:nvPr>
+            <p:ph type="sldNum" sz="quarter" idx="2"/>
+          </p:nvPr>
+        </p:nvSpPr>
+        <p:spPr>
+          <a:xfrm>
+            <a:off x="11506450" y="6636099"/>
+            <a:ext cx="127001" cy="127001"/>
+          </a:xfrm>
+          <a:prstGeom prst="rect">
+            <a:avLst/>
+          </a:prstGeom>
+          <a:extLst>
+            <a:ext uri="{C572A759-6A51-4108-AA02-DFA0A04FC94B}">
+              <ma14:wrappingTextBoxFlag xmlns:ma14="http://schemas.microsoft.com/office/mac/drawingml/2011/main" xmlns:a14="http://schemas.microsoft.com/office/drawing/2010/main" xmlns:m="http://schemas.openxmlformats.org/officeDocument/2006/math" xmlns="" val="1"/>
+            </a:ext>
+          </a:extLst>
+        </p:spPr>
+        <p:txBody>
+          <a:bodyPr/>
+          <a:lstStyle/>
+          <a:p>
+            <a:fld id="{86CB4B4D-7CA3-9044-876B-883B54F8677D}" type="slidenum">
+              <a:t>10</a:t>
+            </a:fld>
+            <a:endParaRPr/>
+          </a:p>
+        </p:txBody>
+      </p:sp>
+      <p:pic>
+        <p:nvPicPr>
+          <p:cNvPr id="3" name="Picture 2">
+            <a:extLst>
+              <a:ext uri="{FF2B5EF4-FFF2-40B4-BE49-F238E27FC236}">
+                <a16:creationId xmlns:a16="http://schemas.microsoft.com/office/drawing/2014/main" id="{E963C22E-FBB1-4047-9AF8-A3DA63978273}"/>
+              </a:ext>
+            </a:extLst>
+          </p:cNvPr>
+          <p:cNvPicPr>
+            <a:picLocks noChangeAspect="1"/>
+          </p:cNvPicPr>
+          <p:nvPr/>
+        </p:nvPicPr>
+        <p:blipFill>
+          <a:blip r:embed="rId2">
+            <a:extLst>
+              <a:ext uri="{28A0092B-C50C-407E-A947-70E740481C1C}">
+                <a14:useLocalDpi xmlns:a14="http://schemas.microsoft.com/office/drawing/2010/main" val="0"/>
+              </a:ext>
+            </a:extLst>
+          </a:blip>
+          <a:stretch>
+            <a:fillRect/>
+          </a:stretch>
+        </p:blipFill>
+        <p:spPr>
+          <a:xfrm>
+            <a:off x="4962053" y="1706398"/>
+            <a:ext cx="7071448" cy="4660111"/>
+          </a:xfrm>
+          <a:prstGeom prst="rect">
+            <a:avLst/>
+          </a:prstGeom>
+        </p:spPr>
+      </p:pic>
+    </p:spTree>
+    <p:extLst>
+      <p:ext uri="{BB962C8B-B14F-4D97-AF65-F5344CB8AC3E}">
+        <p14:creationId xmlns:p14="http://schemas.microsoft.com/office/powerpoint/2010/main" val="1139390163"/>
+      </p:ext>
+    </p:extLst>
+  </p:cSld>
+  <p:clrMapOvr>
+    <a:masterClrMapping/>
+  </p:clrMapOvr>
+  <p:transition spd="med"/>
+</p:sld>
+</file>
+
+<file path=ppt/slides/slide11.xml><?xml version="1.0" encoding="utf-8"?>
+<p:sld xmlns:a="http://schemas.openxmlformats.org/drawingml/2006/main" xmlns:r="http://schemas.openxmlformats.org/officeDocument/2006/relationships" xmlns:p="http://schemas.openxmlformats.org/presentationml/2006/main">
+  <p:cSld>
+    <p:spTree>
+      <p:nvGrpSpPr>
+        <p:cNvPr id="1" name=""/>
+        <p:cNvGrpSpPr/>
+        <p:nvPr/>
+      </p:nvGrpSpPr>
+      <p:grpSpPr>
+        <a:xfrm>
+          <a:off x="0" y="0"/>
+          <a:ext cx="0" cy="0"/>
+          <a:chOff x="0" y="0"/>
+          <a:chExt cx="0" cy="0"/>
+        </a:xfrm>
+      </p:grpSpPr>
+      <p:sp>
+        <p:nvSpPr>
+          <p:cNvPr id="250" name="Title 4"/>
+          <p:cNvSpPr txBox="1">
+            <a:spLocks noGrp="1"/>
+          </p:cNvSpPr>
+          <p:nvPr>
+            <p:ph type="title"/>
+          </p:nvPr>
+        </p:nvSpPr>
+        <p:spPr>
+          <a:xfrm>
+            <a:off x="1774725" y="426126"/>
+            <a:ext cx="9312376" cy="972718"/>
+          </a:xfrm>
+          <a:prstGeom prst="rect">
+            <a:avLst/>
+          </a:prstGeom>
+        </p:spPr>
+        <p:txBody>
+          <a:bodyPr/>
+          <a:lstStyle/>
+          <a:p>
+            <a:r>
+              <a:rPr lang="da-DK" dirty="0"/>
+              <a:t>TAS</a:t>
             </a:r>
             <a:endParaRPr dirty="0"/>
           </a:p>
@@ -6533,7 +6736,7 @@
           </a:prstGeom>
           <a:extLst>
             <a:ext uri="{C572A759-6A51-4108-AA02-DFA0A04FC94B}">
-              <ma14:wrappingTextBoxFlag xmlns="" xmlns:m="http://schemas.openxmlformats.org/officeDocument/2006/math" xmlns:a14="http://schemas.microsoft.com/office/drawing/2010/main" xmlns:ma14="http://schemas.microsoft.com/office/mac/drawingml/2011/main" val="1"/>
+              <ma14:wrappingTextBoxFlag xmlns:ma14="http://schemas.microsoft.com/office/mac/drawingml/2011/main" xmlns:a14="http://schemas.microsoft.com/office/drawing/2010/main" xmlns:m="http://schemas.openxmlformats.org/officeDocument/2006/math" xmlns="" val="1"/>
             </a:ext>
           </a:extLst>
         </p:spPr>
@@ -6542,7 +6745,214 @@
           <a:lstStyle/>
           <a:p>
             <a:fld id="{86CB4B4D-7CA3-9044-876B-883B54F8677D}" type="slidenum">
-              <a:t>10</a:t>
+              <a:t>11</a:t>
+            </a:fld>
+            <a:endParaRPr/>
+          </a:p>
+        </p:txBody>
+      </p:sp>
+      <p:pic>
+        <p:nvPicPr>
+          <p:cNvPr id="3" name="Picture 2">
+            <a:extLst>
+              <a:ext uri="{FF2B5EF4-FFF2-40B4-BE49-F238E27FC236}">
+                <a16:creationId xmlns:a16="http://schemas.microsoft.com/office/drawing/2014/main" id="{0F080686-8093-B94D-9F4A-9CE20F5AD4FB}"/>
+              </a:ext>
+            </a:extLst>
+          </p:cNvPr>
+          <p:cNvPicPr>
+            <a:picLocks noChangeAspect="1"/>
+          </p:cNvPicPr>
+          <p:nvPr/>
+        </p:nvPicPr>
+        <p:blipFill rotWithShape="1">
+          <a:blip r:embed="rId3">
+            <a:extLst>
+              <a:ext uri="{28A0092B-C50C-407E-A947-70E740481C1C}">
+                <a14:useLocalDpi xmlns:a14="http://schemas.microsoft.com/office/drawing/2010/main" val="0"/>
+              </a:ext>
+            </a:extLst>
+          </a:blip>
+          <a:srcRect l="10227" r="11179"/>
+          <a:stretch/>
+        </p:blipFill>
+        <p:spPr>
+          <a:xfrm>
+            <a:off x="6069331" y="1398844"/>
+            <a:ext cx="5817870" cy="4877326"/>
+          </a:xfrm>
+          <a:prstGeom prst="rect">
+            <a:avLst/>
+          </a:prstGeom>
+        </p:spPr>
+      </p:pic>
+    </p:spTree>
+    <p:extLst>
+      <p:ext uri="{BB962C8B-B14F-4D97-AF65-F5344CB8AC3E}">
+        <p14:creationId xmlns:p14="http://schemas.microsoft.com/office/powerpoint/2010/main" val="3025174763"/>
+      </p:ext>
+    </p:extLst>
+  </p:cSld>
+  <p:clrMapOvr>
+    <a:masterClrMapping/>
+  </p:clrMapOvr>
+  <p:transition spd="med"/>
+</p:sld>
+</file>
+
+<file path=ppt/slides/slide12.xml><?xml version="1.0" encoding="utf-8"?>
+<p:sld xmlns:a="http://schemas.openxmlformats.org/drawingml/2006/main" xmlns:r="http://schemas.openxmlformats.org/officeDocument/2006/relationships" xmlns:p="http://schemas.openxmlformats.org/presentationml/2006/main">
+  <p:cSld>
+    <p:spTree>
+      <p:nvGrpSpPr>
+        <p:cNvPr id="1" name=""/>
+        <p:cNvGrpSpPr/>
+        <p:nvPr/>
+      </p:nvGrpSpPr>
+      <p:grpSpPr>
+        <a:xfrm>
+          <a:off x="0" y="0"/>
+          <a:ext cx="0" cy="0"/>
+          <a:chOff x="0" y="0"/>
+          <a:chExt cx="0" cy="0"/>
+        </a:xfrm>
+      </p:grpSpPr>
+      <p:sp>
+        <p:nvSpPr>
+          <p:cNvPr id="250" name="Title 4"/>
+          <p:cNvSpPr txBox="1">
+            <a:spLocks noGrp="1"/>
+          </p:cNvSpPr>
+          <p:nvPr>
+            <p:ph type="title"/>
+          </p:nvPr>
+        </p:nvSpPr>
+        <p:spPr>
+          <a:xfrm>
+            <a:off x="1774725" y="426126"/>
+            <a:ext cx="9312376" cy="972718"/>
+          </a:xfrm>
+          <a:prstGeom prst="rect">
+            <a:avLst/>
+          </a:prstGeom>
+        </p:spPr>
+        <p:txBody>
+          <a:bodyPr/>
+          <a:lstStyle/>
+          <a:p>
+            <a:r>
+              <a:rPr lang="da-DK" dirty="0"/>
+              <a:t>Chopper </a:t>
+            </a:r>
+            <a:r>
+              <a:rPr lang="da-DK" dirty="0" err="1"/>
+              <a:t>spectrometers</a:t>
+            </a:r>
+            <a:endParaRPr dirty="0"/>
+          </a:p>
+        </p:txBody>
+      </p:sp>
+      <p:sp>
+        <p:nvSpPr>
+          <p:cNvPr id="251" name="Content Placeholder 5"/>
+          <p:cNvSpPr txBox="1">
+            <a:spLocks noGrp="1"/>
+          </p:cNvSpPr>
+          <p:nvPr>
+            <p:ph type="body" idx="1"/>
+          </p:nvPr>
+        </p:nvSpPr>
+        <p:spPr>
+          <a:xfrm>
+            <a:off x="1774799" y="1706399"/>
+            <a:ext cx="4060393" cy="4545579"/>
+          </a:xfrm>
+          <a:prstGeom prst="rect">
+            <a:avLst/>
+          </a:prstGeom>
+        </p:spPr>
+        <p:txBody>
+          <a:bodyPr/>
+          <a:lstStyle/>
+          <a:p>
+            <a:r>
+              <a:rPr lang="da-DK" dirty="0" err="1"/>
+              <a:t>Only</a:t>
+            </a:r>
+            <a:r>
+              <a:rPr lang="da-DK" dirty="0"/>
+              <a:t> a small </a:t>
+            </a:r>
+            <a:r>
+              <a:rPr lang="da-DK" dirty="0" err="1"/>
+              <a:t>fraction</a:t>
+            </a:r>
+            <a:r>
+              <a:rPr lang="da-DK" dirty="0"/>
+              <a:t> of neutrons </a:t>
+            </a:r>
+            <a:r>
+              <a:rPr lang="da-DK" dirty="0" err="1"/>
+              <a:t>arrive</a:t>
+            </a:r>
+            <a:r>
+              <a:rPr lang="da-DK" dirty="0"/>
+              <a:t>, most </a:t>
+            </a:r>
+            <a:r>
+              <a:rPr lang="da-DK" dirty="0" err="1"/>
+              <a:t>are</a:t>
+            </a:r>
+            <a:r>
+              <a:rPr lang="da-DK" dirty="0"/>
+              <a:t> </a:t>
+            </a:r>
+            <a:r>
+              <a:rPr lang="da-DK" dirty="0" err="1"/>
+              <a:t>simulated</a:t>
+            </a:r>
+            <a:r>
+              <a:rPr lang="da-DK" dirty="0"/>
+              <a:t> in </a:t>
+            </a:r>
+            <a:r>
+              <a:rPr lang="da-DK" dirty="0" err="1"/>
+              <a:t>vain</a:t>
+            </a:r>
+            <a:endParaRPr lang="da-DK" dirty="0"/>
+          </a:p>
+        </p:txBody>
+      </p:sp>
+      <p:sp>
+        <p:nvSpPr>
+          <p:cNvPr id="252" name="Slide Number Placeholder 3"/>
+          <p:cNvSpPr txBox="1">
+            <a:spLocks noGrp="1"/>
+          </p:cNvSpPr>
+          <p:nvPr>
+            <p:ph type="sldNum" sz="quarter" idx="2"/>
+          </p:nvPr>
+        </p:nvSpPr>
+        <p:spPr>
+          <a:xfrm>
+            <a:off x="11506450" y="6636099"/>
+            <a:ext cx="127001" cy="127001"/>
+          </a:xfrm>
+          <a:prstGeom prst="rect">
+            <a:avLst/>
+          </a:prstGeom>
+          <a:extLst>
+            <a:ext uri="{C572A759-6A51-4108-AA02-DFA0A04FC94B}">
+              <ma14:wrappingTextBoxFlag xmlns:ma14="http://schemas.microsoft.com/office/mac/drawingml/2011/main" xmlns:a14="http://schemas.microsoft.com/office/drawing/2010/main" xmlns:m="http://schemas.openxmlformats.org/officeDocument/2006/math" xmlns="" val="1"/>
+            </a:ext>
+          </a:extLst>
+        </p:spPr>
+        <p:txBody>
+          <a:bodyPr/>
+          <a:lstStyle/>
+          <a:p>
+            <a:fld id="{86CB4B4D-7CA3-9044-876B-883B54F8677D}" type="slidenum">
+              <a:t>12</a:t>
             </a:fld>
             <a:endParaRPr/>
           </a:p>
@@ -6598,7 +7008,7 @@
 </p:sld>
 </file>
 
-<file path=ppt/slides/slide11.xml><?xml version="1.0" encoding="utf-8"?>
+<file path=ppt/slides/slide13.xml><?xml version="1.0" encoding="utf-8"?>
 <p:sld xmlns:a="http://schemas.openxmlformats.org/drawingml/2006/main" xmlns:r="http://schemas.openxmlformats.org/officeDocument/2006/relationships" xmlns:p="http://schemas.openxmlformats.org/presentationml/2006/main">
   <p:cSld>
     <p:spTree>
@@ -6798,7 +7208,7 @@
           </a:prstGeom>
           <a:extLst>
             <a:ext uri="{C572A759-6A51-4108-AA02-DFA0A04FC94B}">
-              <ma14:wrappingTextBoxFlag xmlns="" xmlns:m="http://schemas.openxmlformats.org/officeDocument/2006/math" xmlns:a14="http://schemas.microsoft.com/office/drawing/2010/main" xmlns:ma14="http://schemas.microsoft.com/office/mac/drawingml/2011/main" val="1"/>
+              <ma14:wrappingTextBoxFlag xmlns:ma14="http://schemas.microsoft.com/office/mac/drawingml/2011/main" xmlns:a14="http://schemas.microsoft.com/office/drawing/2010/main" xmlns:m="http://schemas.openxmlformats.org/officeDocument/2006/math" xmlns="" val="1"/>
             </a:ext>
           </a:extLst>
         </p:spPr>
@@ -6807,7 +7217,7 @@
           <a:lstStyle/>
           <a:p>
             <a:fld id="{86CB4B4D-7CA3-9044-876B-883B54F8677D}" type="slidenum">
-              <a:t>11</a:t>
+              <a:t>13</a:t>
             </a:fld>
             <a:endParaRPr/>
           </a:p>
@@ -6827,7 +7237,7 @@
 </p:sld>
 </file>
 
-<file path=ppt/slides/slide12.xml><?xml version="1.0" encoding="utf-8"?>
+<file path=ppt/slides/slide14.xml><?xml version="1.0" encoding="utf-8"?>
 <p:sld xmlns:a="http://schemas.openxmlformats.org/drawingml/2006/main" xmlns:r="http://schemas.openxmlformats.org/officeDocument/2006/relationships" xmlns:p="http://schemas.openxmlformats.org/presentationml/2006/main">
   <p:cSld>
     <p:spTree>
@@ -6895,39 +7305,107 @@
           </a:prstGeom>
         </p:spPr>
         <p:txBody>
-          <a:bodyPr/>
+          <a:bodyPr>
+            <a:normAutofit/>
+          </a:bodyPr>
           <a:lstStyle/>
           <a:p>
             <a:r>
-              <a:rPr lang="da-DK" dirty="0" err="1"/>
+              <a:rPr lang="da-DK" sz="2400" dirty="0" err="1"/>
               <a:t>Use</a:t>
             </a:r>
             <a:r>
-              <a:rPr lang="da-DK" dirty="0"/>
+              <a:rPr lang="da-DK" sz="2400" dirty="0"/>
               <a:t> </a:t>
             </a:r>
             <a:r>
-              <a:rPr lang="da-DK" dirty="0" err="1"/>
+              <a:rPr lang="da-DK" sz="2400" dirty="0" err="1"/>
               <a:t>provided</a:t>
             </a:r>
             <a:r>
-              <a:rPr lang="da-DK" dirty="0"/>
+              <a:rPr lang="da-DK" sz="2400" dirty="0"/>
               <a:t> TAS instrument to scan the </a:t>
             </a:r>
             <a:r>
-              <a:rPr lang="da-DK" dirty="0" err="1"/>
+              <a:rPr lang="da-DK" sz="2400" dirty="0" err="1"/>
               <a:t>phonon</a:t>
             </a:r>
             <a:r>
-              <a:rPr lang="da-DK" dirty="0"/>
+              <a:rPr lang="da-DK" sz="2400" dirty="0"/>
               <a:t> dispersion</a:t>
             </a:r>
           </a:p>
           <a:p>
-            <a:endParaRPr lang="da-DK" dirty="0"/>
+            <a:r>
+              <a:rPr lang="da-DK" sz="2400" dirty="0" err="1"/>
+              <a:t>Requires</a:t>
+            </a:r>
+            <a:r>
+              <a:rPr lang="da-DK" sz="2400" dirty="0"/>
+              <a:t> </a:t>
+            </a:r>
+            <a:r>
+              <a:rPr lang="da-DK" sz="2400" dirty="0" err="1"/>
+              <a:t>that</a:t>
+            </a:r>
+            <a:r>
+              <a:rPr lang="da-DK" sz="2400" dirty="0"/>
+              <a:t> </a:t>
+            </a:r>
+            <a:r>
+              <a:rPr lang="da-DK" sz="2400" dirty="0" err="1"/>
+              <a:t>you</a:t>
+            </a:r>
+            <a:r>
+              <a:rPr lang="da-DK" sz="2400" dirty="0"/>
+              <a:t> </a:t>
+            </a:r>
+            <a:r>
+              <a:rPr lang="da-DK" sz="2400" dirty="0" err="1"/>
+              <a:t>work</a:t>
+            </a:r>
+            <a:r>
+              <a:rPr lang="da-DK" sz="2400" dirty="0"/>
+              <a:t> in folder with the components in the zip file</a:t>
+            </a:r>
           </a:p>
           <a:p>
-            <a:endParaRPr dirty="0"/>
+            <a:r>
+              <a:rPr lang="da-DK" sz="2400" dirty="0" err="1"/>
+              <a:t>Futrher</a:t>
+            </a:r>
+            <a:r>
+              <a:rPr lang="da-DK" sz="2400" dirty="0"/>
+              <a:t> </a:t>
+            </a:r>
+            <a:r>
+              <a:rPr lang="da-DK" sz="2400" dirty="0" err="1"/>
+              <a:t>explanation</a:t>
+            </a:r>
+            <a:r>
+              <a:rPr lang="da-DK" sz="2400" dirty="0"/>
+              <a:t> on </a:t>
+            </a:r>
+            <a:r>
+              <a:rPr lang="da-DK" sz="2400" dirty="0" err="1"/>
+              <a:t>github</a:t>
+            </a:r>
+            <a:endParaRPr lang="da-DK" sz="2400" dirty="0"/>
+          </a:p>
+          <a:p>
+            <a:pPr marL="0" indent="0">
+              <a:buNone/>
+            </a:pPr>
+            <a:endParaRPr lang="da-DK" sz="2400" dirty="0"/>
+          </a:p>
+          <a:p>
+            <a:endParaRPr lang="da-DK" sz="2400" dirty="0"/>
+          </a:p>
+          <a:p>
+            <a:endParaRPr lang="da-DK" sz="2400" dirty="0"/>
+          </a:p>
+          <a:p>
+            <a:endParaRPr sz="2400" dirty="0"/>
           </a:p>
         </p:txBody>
       </p:sp>
@@ -6951,7 +7429,7 @@
           </a:prstGeom>
           <a:extLst>
             <a:ext uri="{C572A759-6A51-4108-AA02-DFA0A04FC94B}">
-              <ma14:wrappingTextBoxFlag xmlns="" xmlns:m="http://schemas.openxmlformats.org/officeDocument/2006/math" xmlns:a14="http://schemas.microsoft.com/office/drawing/2010/main" xmlns:ma14="http://schemas.microsoft.com/office/mac/drawingml/2011/main" val="1"/>
+              <ma14:wrappingTextBoxFlag xmlns:ma14="http://schemas.microsoft.com/office/mac/drawingml/2011/main" xmlns:a14="http://schemas.microsoft.com/office/drawing/2010/main" xmlns:m="http://schemas.openxmlformats.org/officeDocument/2006/math" xmlns="" val="1"/>
             </a:ext>
           </a:extLst>
         </p:spPr>
@@ -6960,7 +7438,7 @@
           <a:lstStyle/>
           <a:p>
             <a:fld id="{86CB4B4D-7CA3-9044-876B-883B54F8677D}" type="slidenum">
-              <a:t>12</a:t>
+              <a:t>14</a:t>
             </a:fld>
             <a:endParaRPr/>
           </a:p>
@@ -7183,7 +7661,7 @@
           </a:prstGeom>
           <a:extLst>
             <a:ext uri="{C572A759-6A51-4108-AA02-DFA0A04FC94B}">
-              <ma14:wrappingTextBoxFlag xmlns="" xmlns:m="http://schemas.openxmlformats.org/officeDocument/2006/math" xmlns:a14="http://schemas.microsoft.com/office/drawing/2010/main" xmlns:ma14="http://schemas.microsoft.com/office/mac/drawingml/2011/main" val="1"/>
+              <ma14:wrappingTextBoxFlag xmlns:ma14="http://schemas.microsoft.com/office/mac/drawingml/2011/main" xmlns:a14="http://schemas.microsoft.com/office/drawing/2010/main" xmlns:m="http://schemas.openxmlformats.org/officeDocument/2006/math" xmlns="" val="1"/>
             </a:ext>
           </a:extLst>
         </p:spPr>
@@ -7392,7 +7870,7 @@
           </a:prstGeom>
           <a:extLst>
             <a:ext uri="{C572A759-6A51-4108-AA02-DFA0A04FC94B}">
-              <ma14:wrappingTextBoxFlag xmlns="" xmlns:m="http://schemas.openxmlformats.org/officeDocument/2006/math" xmlns:a14="http://schemas.microsoft.com/office/drawing/2010/main" xmlns:ma14="http://schemas.microsoft.com/office/mac/drawingml/2011/main" val="1"/>
+              <ma14:wrappingTextBoxFlag xmlns:ma14="http://schemas.microsoft.com/office/mac/drawingml/2011/main" xmlns:a14="http://schemas.microsoft.com/office/drawing/2010/main" xmlns:m="http://schemas.openxmlformats.org/officeDocument/2006/math" xmlns="" val="1"/>
             </a:ext>
           </a:extLst>
         </p:spPr>
@@ -7695,7 +8173,7 @@
           </a:prstGeom>
           <a:extLst>
             <a:ext uri="{C572A759-6A51-4108-AA02-DFA0A04FC94B}">
-              <ma14:wrappingTextBoxFlag xmlns="" xmlns:m="http://schemas.openxmlformats.org/officeDocument/2006/math" xmlns:a14="http://schemas.microsoft.com/office/drawing/2010/main" xmlns:ma14="http://schemas.microsoft.com/office/mac/drawingml/2011/main" val="1"/>
+              <ma14:wrappingTextBoxFlag xmlns:ma14="http://schemas.microsoft.com/office/mac/drawingml/2011/main" xmlns:a14="http://schemas.microsoft.com/office/drawing/2010/main" xmlns:m="http://schemas.openxmlformats.org/officeDocument/2006/math" xmlns="" val="1"/>
             </a:ext>
           </a:extLst>
         </p:spPr>
@@ -7883,7 +8361,7 @@
           </a:prstGeom>
           <a:extLst>
             <a:ext uri="{C572A759-6A51-4108-AA02-DFA0A04FC94B}">
-              <ma14:wrappingTextBoxFlag xmlns="" xmlns:m="http://schemas.openxmlformats.org/officeDocument/2006/math" xmlns:a14="http://schemas.microsoft.com/office/drawing/2010/main" xmlns:ma14="http://schemas.microsoft.com/office/mac/drawingml/2011/main" val="1"/>
+              <ma14:wrappingTextBoxFlag xmlns:ma14="http://schemas.microsoft.com/office/mac/drawingml/2011/main" xmlns:a14="http://schemas.microsoft.com/office/drawing/2010/main" xmlns:m="http://schemas.openxmlformats.org/officeDocument/2006/math" xmlns="" val="1"/>
             </a:ext>
           </a:extLst>
         </p:spPr>
@@ -8949,6 +9427,566 @@
       </p:grpSpPr>
       <p:sp>
         <p:nvSpPr>
+          <p:cNvPr id="252" name="Slide Number Placeholder 3"/>
+          <p:cNvSpPr txBox="1">
+            <a:spLocks noGrp="1"/>
+          </p:cNvSpPr>
+          <p:nvPr>
+            <p:ph type="sldNum" sz="quarter" idx="2"/>
+          </p:nvPr>
+        </p:nvSpPr>
+        <p:spPr>
+          <a:xfrm>
+            <a:off x="11506450" y="6636099"/>
+            <a:ext cx="127001" cy="127001"/>
+          </a:xfrm>
+          <a:prstGeom prst="rect">
+            <a:avLst/>
+          </a:prstGeom>
+          <a:extLst>
+            <a:ext uri="{C572A759-6A51-4108-AA02-DFA0A04FC94B}">
+              <ma14:wrappingTextBoxFlag xmlns:ma14="http://schemas.microsoft.com/office/mac/drawingml/2011/main" xmlns:a14="http://schemas.microsoft.com/office/drawing/2010/main" xmlns:m="http://schemas.openxmlformats.org/officeDocument/2006/math" xmlns="" val="1"/>
+            </a:ext>
+          </a:extLst>
+        </p:spPr>
+        <p:txBody>
+          <a:bodyPr/>
+          <a:lstStyle/>
+          <a:p>
+            <a:fld id="{86CB4B4D-7CA3-9044-876B-883B54F8677D}" type="slidenum">
+              <a:t>6</a:t>
+            </a:fld>
+            <a:endParaRPr/>
+          </a:p>
+        </p:txBody>
+      </p:sp>
+      <p:cxnSp>
+        <p:nvCxnSpPr>
+          <p:cNvPr id="3" name="Straight Arrow Connector 2">
+            <a:extLst>
+              <a:ext uri="{FF2B5EF4-FFF2-40B4-BE49-F238E27FC236}">
+                <a16:creationId xmlns:a16="http://schemas.microsoft.com/office/drawing/2014/main" id="{5E888289-2846-7641-8AE9-7D9F7D1EB51F}"/>
+              </a:ext>
+            </a:extLst>
+          </p:cNvPr>
+          <p:cNvCxnSpPr>
+            <a:cxnSpLocks/>
+          </p:cNvCxnSpPr>
+          <p:nvPr/>
+        </p:nvCxnSpPr>
+        <p:spPr>
+          <a:xfrm>
+            <a:off x="1619660" y="5810831"/>
+            <a:ext cx="4301080" cy="0"/>
+          </a:xfrm>
+          <a:prstGeom prst="straightConnector1">
+            <a:avLst/>
+          </a:prstGeom>
+          <a:noFill/>
+          <a:ln w="63500" cap="flat">
+            <a:solidFill>
+              <a:schemeClr val="accent1"/>
+            </a:solidFill>
+            <a:prstDash val="solid"/>
+            <a:round/>
+            <a:tailEnd type="triangle"/>
+          </a:ln>
+          <a:effectLst/>
+          <a:sp3d/>
+        </p:spPr>
+        <p:style>
+          <a:lnRef idx="0">
+            <a:scrgbClr r="0" g="0" b="0"/>
+          </a:lnRef>
+          <a:fillRef idx="0">
+            <a:scrgbClr r="0" g="0" b="0"/>
+          </a:fillRef>
+          <a:effectRef idx="0">
+            <a:scrgbClr r="0" g="0" b="0"/>
+          </a:effectRef>
+          <a:fontRef idx="none"/>
+        </p:style>
+      </p:cxnSp>
+      <p:cxnSp>
+        <p:nvCxnSpPr>
+          <p:cNvPr id="8" name="Straight Arrow Connector 7">
+            <a:extLst>
+              <a:ext uri="{FF2B5EF4-FFF2-40B4-BE49-F238E27FC236}">
+                <a16:creationId xmlns:a16="http://schemas.microsoft.com/office/drawing/2014/main" id="{BD12D8D0-55F9-8346-A8DE-1B686F24BAA0}"/>
+              </a:ext>
+            </a:extLst>
+          </p:cNvPr>
+          <p:cNvCxnSpPr>
+            <a:cxnSpLocks/>
+          </p:cNvCxnSpPr>
+          <p:nvPr/>
+        </p:nvCxnSpPr>
+        <p:spPr>
+          <a:xfrm flipV="1">
+            <a:off x="1934105" y="2477562"/>
+            <a:ext cx="0" cy="3578267"/>
+          </a:xfrm>
+          <a:prstGeom prst="straightConnector1">
+            <a:avLst/>
+          </a:prstGeom>
+          <a:noFill/>
+          <a:ln w="63500" cap="flat">
+            <a:solidFill>
+              <a:schemeClr val="accent1"/>
+            </a:solidFill>
+            <a:prstDash val="solid"/>
+            <a:round/>
+            <a:tailEnd type="triangle"/>
+          </a:ln>
+          <a:effectLst/>
+          <a:sp3d/>
+        </p:spPr>
+        <p:style>
+          <a:lnRef idx="0">
+            <a:scrgbClr r="0" g="0" b="0"/>
+          </a:lnRef>
+          <a:fillRef idx="0">
+            <a:scrgbClr r="0" g="0" b="0"/>
+          </a:fillRef>
+          <a:effectRef idx="0">
+            <a:scrgbClr r="0" g="0" b="0"/>
+          </a:effectRef>
+          <a:fontRef idx="none"/>
+        </p:style>
+      </p:cxnSp>
+      <p:sp>
+        <p:nvSpPr>
+          <p:cNvPr id="6" name="TextBox 5">
+            <a:extLst>
+              <a:ext uri="{FF2B5EF4-FFF2-40B4-BE49-F238E27FC236}">
+                <a16:creationId xmlns:a16="http://schemas.microsoft.com/office/drawing/2014/main" id="{5F0E52F9-1A39-244C-B67D-75E1DE8F6417}"/>
+              </a:ext>
+            </a:extLst>
+          </p:cNvPr>
+          <p:cNvSpPr txBox="1"/>
+          <p:nvPr/>
+        </p:nvSpPr>
+        <p:spPr>
+          <a:xfrm>
+            <a:off x="6029328" y="5589297"/>
+            <a:ext cx="672777" cy="577081"/>
+          </a:xfrm>
+          <a:prstGeom prst="rect">
+            <a:avLst/>
+          </a:prstGeom>
+          <a:noFill/>
+          <a:ln w="12700" cap="flat">
+            <a:noFill/>
+            <a:miter lim="400000"/>
+          </a:ln>
+          <a:effectLst/>
+          <a:sp3d/>
+        </p:spPr>
+        <p:style>
+          <a:lnRef idx="0">
+            <a:scrgbClr r="0" g="0" b="0"/>
+          </a:lnRef>
+          <a:fillRef idx="0">
+            <a:scrgbClr r="0" g="0" b="0"/>
+          </a:fillRef>
+          <a:effectRef idx="0">
+            <a:scrgbClr r="0" g="0" b="0"/>
+          </a:effectRef>
+          <a:fontRef idx="none"/>
+        </p:style>
+        <p:txBody>
+          <a:bodyPr rot="0" spcFirstLastPara="1" vertOverflow="overflow" horzOverflow="overflow" vert="horz" wrap="square" lIns="0" tIns="0" rIns="0" bIns="0" numCol="1" spcCol="38100" rtlCol="0" anchor="t">
+            <a:spAutoFit/>
+          </a:bodyPr>
+          <a:lstStyle/>
+          <a:p>
+            <a:pPr marL="0" marR="0" indent="0" algn="l" defTabSz="914400" rtl="0" fontAlgn="auto" latinLnBrk="0" hangingPunct="0">
+              <a:lnSpc>
+                <a:spcPct val="100000"/>
+              </a:lnSpc>
+              <a:spcBef>
+                <a:spcPts val="900"/>
+              </a:spcBef>
+              <a:spcAft>
+                <a:spcPts val="0"/>
+              </a:spcAft>
+              <a:buClrTx/>
+              <a:buSzTx/>
+              <a:buFontTx/>
+              <a:buNone/>
+              <a:tabLst/>
+            </a:pPr>
+            <a:r>
+              <a:rPr kumimoji="0" lang="da-DK" sz="3000" b="0" i="0" u="none" strike="noStrike" cap="none" spc="0" normalizeH="0" baseline="0" dirty="0">
+                <a:ln>
+                  <a:noFill/>
+                </a:ln>
+                <a:solidFill>
+                  <a:srgbClr val="000000"/>
+                </a:solidFill>
+                <a:effectLst/>
+                <a:uFillTx/>
+                <a:latin typeface="+mn-lt"/>
+                <a:ea typeface="+mn-ea"/>
+                <a:cs typeface="+mn-cs"/>
+                <a:sym typeface="Arial"/>
+              </a:rPr>
+              <a:t>q</a:t>
+            </a:r>
+          </a:p>
+        </p:txBody>
+      </p:sp>
+      <p:sp>
+        <p:nvSpPr>
+          <p:cNvPr id="7" name="TextBox 6">
+            <a:extLst>
+              <a:ext uri="{FF2B5EF4-FFF2-40B4-BE49-F238E27FC236}">
+                <a16:creationId xmlns:a16="http://schemas.microsoft.com/office/drawing/2014/main" id="{E9C29F20-6440-854D-BA5B-5E8BB669B782}"/>
+              </a:ext>
+            </a:extLst>
+          </p:cNvPr>
+          <p:cNvSpPr txBox="1"/>
+          <p:nvPr/>
+        </p:nvSpPr>
+        <p:spPr>
+          <a:xfrm>
+            <a:off x="1424799" y="2248876"/>
+            <a:ext cx="729205" cy="577081"/>
+          </a:xfrm>
+          <a:prstGeom prst="rect">
+            <a:avLst/>
+          </a:prstGeom>
+          <a:noFill/>
+          <a:ln w="12700" cap="flat">
+            <a:noFill/>
+            <a:miter lim="400000"/>
+          </a:ln>
+          <a:effectLst/>
+          <a:sp3d/>
+        </p:spPr>
+        <p:style>
+          <a:lnRef idx="0">
+            <a:scrgbClr r="0" g="0" b="0"/>
+          </a:lnRef>
+          <a:fillRef idx="0">
+            <a:scrgbClr r="0" g="0" b="0"/>
+          </a:fillRef>
+          <a:effectRef idx="0">
+            <a:scrgbClr r="0" g="0" b="0"/>
+          </a:effectRef>
+          <a:fontRef idx="none"/>
+        </p:style>
+        <p:txBody>
+          <a:bodyPr rot="0" spcFirstLastPara="1" vertOverflow="overflow" horzOverflow="overflow" vert="horz" wrap="square" lIns="0" tIns="0" rIns="0" bIns="0" numCol="1" spcCol="38100" rtlCol="0" anchor="t">
+            <a:spAutoFit/>
+          </a:bodyPr>
+          <a:lstStyle/>
+          <a:p>
+            <a:pPr marL="0" marR="0" indent="0" algn="l" defTabSz="914400" rtl="0" fontAlgn="auto" latinLnBrk="0" hangingPunct="0">
+              <a:lnSpc>
+                <a:spcPct val="100000"/>
+              </a:lnSpc>
+              <a:spcBef>
+                <a:spcPts val="900"/>
+              </a:spcBef>
+              <a:spcAft>
+                <a:spcPts val="0"/>
+              </a:spcAft>
+              <a:buClrTx/>
+              <a:buSzTx/>
+              <a:buFontTx/>
+              <a:buNone/>
+              <a:tabLst/>
+            </a:pPr>
+            <a:r>
+              <a:rPr kumimoji="0" lang="da-DK" sz="3000" b="0" i="0" u="none" strike="noStrike" cap="none" spc="0" normalizeH="0" baseline="0" dirty="0">
+                <a:ln>
+                  <a:noFill/>
+                </a:ln>
+                <a:solidFill>
+                  <a:srgbClr val="000000"/>
+                </a:solidFill>
+                <a:effectLst/>
+                <a:uFillTx/>
+                <a:latin typeface="+mn-lt"/>
+                <a:ea typeface="+mn-ea"/>
+                <a:cs typeface="+mn-cs"/>
+                <a:sym typeface="Arial"/>
+              </a:rPr>
+              <a:t>⍵</a:t>
+            </a:r>
+          </a:p>
+        </p:txBody>
+      </p:sp>
+      <p:sp>
+        <p:nvSpPr>
+          <p:cNvPr id="12" name="TextBox 11">
+            <a:extLst>
+              <a:ext uri="{FF2B5EF4-FFF2-40B4-BE49-F238E27FC236}">
+                <a16:creationId xmlns:a16="http://schemas.microsoft.com/office/drawing/2014/main" id="{D5467834-F18E-9245-8A36-F2EA293FAC74}"/>
+              </a:ext>
+            </a:extLst>
+          </p:cNvPr>
+          <p:cNvSpPr txBox="1"/>
+          <p:nvPr/>
+        </p:nvSpPr>
+        <p:spPr>
+          <a:xfrm>
+            <a:off x="4009951" y="5652987"/>
+            <a:ext cx="672777" cy="577081"/>
+          </a:xfrm>
+          <a:prstGeom prst="rect">
+            <a:avLst/>
+          </a:prstGeom>
+          <a:noFill/>
+          <a:ln w="12700" cap="flat">
+            <a:noFill/>
+            <a:miter lim="400000"/>
+          </a:ln>
+          <a:effectLst/>
+          <a:sp3d/>
+        </p:spPr>
+        <p:style>
+          <a:lnRef idx="0">
+            <a:scrgbClr r="0" g="0" b="0"/>
+          </a:lnRef>
+          <a:fillRef idx="0">
+            <a:scrgbClr r="0" g="0" b="0"/>
+          </a:fillRef>
+          <a:effectRef idx="0">
+            <a:scrgbClr r="0" g="0" b="0"/>
+          </a:effectRef>
+          <a:fontRef idx="none"/>
+        </p:style>
+        <p:txBody>
+          <a:bodyPr rot="0" spcFirstLastPara="1" vertOverflow="overflow" horzOverflow="overflow" vert="horz" wrap="square" lIns="0" tIns="0" rIns="0" bIns="0" numCol="1" spcCol="38100" rtlCol="0" anchor="t">
+            <a:spAutoFit/>
+          </a:bodyPr>
+          <a:lstStyle/>
+          <a:p>
+            <a:pPr marL="0" marR="0" indent="0" algn="l" defTabSz="914400" rtl="0" fontAlgn="auto" latinLnBrk="0" hangingPunct="0">
+              <a:lnSpc>
+                <a:spcPct val="100000"/>
+              </a:lnSpc>
+              <a:spcBef>
+                <a:spcPts val="900"/>
+              </a:spcBef>
+              <a:spcAft>
+                <a:spcPts val="0"/>
+              </a:spcAft>
+              <a:buClrTx/>
+              <a:buSzTx/>
+              <a:buFontTx/>
+              <a:buNone/>
+              <a:tabLst/>
+            </a:pPr>
+            <a:r>
+              <a:rPr kumimoji="0" lang="da-DK" sz="3000" b="0" i="0" u="none" strike="noStrike" cap="none" spc="0" normalizeH="0" baseline="0" dirty="0">
+                <a:ln>
+                  <a:noFill/>
+                </a:ln>
+                <a:solidFill>
+                  <a:srgbClr val="000000"/>
+                </a:solidFill>
+                <a:effectLst/>
+                <a:uFillTx/>
+                <a:latin typeface="+mn-lt"/>
+                <a:ea typeface="+mn-ea"/>
+                <a:cs typeface="+mn-cs"/>
+                <a:sym typeface="Arial"/>
+              </a:rPr>
+              <a:t>q</a:t>
+            </a:r>
+            <a:r>
+              <a:rPr kumimoji="0" lang="da-DK" sz="3000" b="0" i="0" u="none" strike="noStrike" cap="none" spc="0" normalizeH="0" baseline="-25000" dirty="0">
+                <a:ln>
+                  <a:noFill/>
+                </a:ln>
+                <a:solidFill>
+                  <a:srgbClr val="000000"/>
+                </a:solidFill>
+                <a:effectLst/>
+                <a:uFillTx/>
+                <a:latin typeface="+mn-lt"/>
+                <a:ea typeface="+mn-ea"/>
+                <a:cs typeface="+mn-cs"/>
+                <a:sym typeface="Arial"/>
+              </a:rPr>
+              <a:t>0</a:t>
+            </a:r>
+          </a:p>
+        </p:txBody>
+      </p:sp>
+      <p:sp>
+        <p:nvSpPr>
+          <p:cNvPr id="9" name="Oval 8">
+            <a:extLst>
+              <a:ext uri="{FF2B5EF4-FFF2-40B4-BE49-F238E27FC236}">
+                <a16:creationId xmlns:a16="http://schemas.microsoft.com/office/drawing/2014/main" id="{AB8E70F7-3A94-9D4B-AE00-FA2D6ECD274A}"/>
+              </a:ext>
+            </a:extLst>
+          </p:cNvPr>
+          <p:cNvSpPr/>
+          <p:nvPr/>
+        </p:nvSpPr>
+        <p:spPr>
+          <a:xfrm>
+            <a:off x="2960394" y="-3863873"/>
+            <a:ext cx="2411706" cy="9675259"/>
+          </a:xfrm>
+          <a:prstGeom prst="ellipse">
+            <a:avLst/>
+          </a:prstGeom>
+          <a:solidFill>
+            <a:srgbClr val="FFFFFF"/>
+          </a:solidFill>
+          <a:ln w="50800" cap="flat">
+            <a:solidFill>
+              <a:schemeClr val="accent1"/>
+            </a:solidFill>
+            <a:prstDash val="solid"/>
+            <a:round/>
+          </a:ln>
+          <a:effectLst/>
+          <a:sp3d/>
+        </p:spPr>
+        <p:style>
+          <a:lnRef idx="0">
+            <a:scrgbClr r="0" g="0" b="0"/>
+          </a:lnRef>
+          <a:fillRef idx="0">
+            <a:scrgbClr r="0" g="0" b="0"/>
+          </a:fillRef>
+          <a:effectRef idx="0">
+            <a:scrgbClr r="0" g="0" b="0"/>
+          </a:effectRef>
+          <a:fontRef idx="none"/>
+        </p:style>
+        <p:txBody>
+          <a:bodyPr rot="0" spcFirstLastPara="1" vertOverflow="overflow" horzOverflow="overflow" vert="horz" wrap="square" lIns="46799" tIns="46799" rIns="46799" bIns="46799" numCol="1" spcCol="38100" rtlCol="0" anchor="ctr">
+            <a:spAutoFit/>
+          </a:bodyPr>
+          <a:lstStyle/>
+          <a:p>
+            <a:pPr marL="0" marR="0" indent="0" algn="l" defTabSz="914400" rtl="0" fontAlgn="auto" latinLnBrk="0" hangingPunct="0">
+              <a:lnSpc>
+                <a:spcPct val="100000"/>
+              </a:lnSpc>
+              <a:spcBef>
+                <a:spcPts val="900"/>
+              </a:spcBef>
+              <a:spcAft>
+                <a:spcPts val="0"/>
+              </a:spcAft>
+              <a:buClrTx/>
+              <a:buSzTx/>
+              <a:buFontTx/>
+              <a:buNone/>
+              <a:tabLst/>
+            </a:pPr>
+            <a:endParaRPr kumimoji="0" lang="da-DK" sz="1600" b="0" i="0" u="none" strike="noStrike" cap="none" spc="0" normalizeH="0" baseline="0">
+              <a:ln>
+                <a:noFill/>
+              </a:ln>
+              <a:solidFill>
+                <a:srgbClr val="000000"/>
+              </a:solidFill>
+              <a:effectLst/>
+              <a:uFillTx/>
+              <a:latin typeface="+mn-lt"/>
+              <a:ea typeface="+mn-ea"/>
+              <a:cs typeface="+mn-cs"/>
+              <a:sym typeface="Arial"/>
+            </a:endParaRPr>
+          </a:p>
+        </p:txBody>
+      </p:sp>
+      <p:sp>
+        <p:nvSpPr>
+          <p:cNvPr id="10" name="Rectangle 9">
+            <a:extLst>
+              <a:ext uri="{FF2B5EF4-FFF2-40B4-BE49-F238E27FC236}">
+                <a16:creationId xmlns:a16="http://schemas.microsoft.com/office/drawing/2014/main" id="{DE2011C8-55CB-4045-8DAE-F4C5523B55AB}"/>
+              </a:ext>
+            </a:extLst>
+          </p:cNvPr>
+          <p:cNvSpPr/>
+          <p:nvPr/>
+        </p:nvSpPr>
+        <p:spPr>
+          <a:xfrm>
+            <a:off x="2721164" y="-942372"/>
+            <a:ext cx="4213668" cy="3944652"/>
+          </a:xfrm>
+          <a:prstGeom prst="rect">
+            <a:avLst/>
+          </a:prstGeom>
+          <a:solidFill>
+            <a:srgbClr val="FFFFFF"/>
+          </a:solidFill>
+          <a:ln w="25400" cap="flat">
+            <a:solidFill>
+              <a:schemeClr val="bg1"/>
+            </a:solidFill>
+            <a:prstDash val="solid"/>
+            <a:round/>
+          </a:ln>
+          <a:effectLst/>
+          <a:sp3d/>
+        </p:spPr>
+        <p:style>
+          <a:lnRef idx="0">
+            <a:scrgbClr r="0" g="0" b="0"/>
+          </a:lnRef>
+          <a:fillRef idx="0">
+            <a:scrgbClr r="0" g="0" b="0"/>
+          </a:fillRef>
+          <a:effectRef idx="0">
+            <a:scrgbClr r="0" g="0" b="0"/>
+          </a:effectRef>
+          <a:fontRef idx="none"/>
+        </p:style>
+        <p:txBody>
+          <a:bodyPr rot="0" spcFirstLastPara="1" vertOverflow="overflow" horzOverflow="overflow" vert="horz" wrap="square" lIns="46799" tIns="46799" rIns="46799" bIns="46799" numCol="1" spcCol="38100" rtlCol="0" anchor="ctr">
+            <a:spAutoFit/>
+          </a:bodyPr>
+          <a:lstStyle/>
+          <a:p>
+            <a:pPr marL="0" marR="0" indent="0" algn="l" defTabSz="914400" rtl="0" fontAlgn="auto" latinLnBrk="0" hangingPunct="0">
+              <a:lnSpc>
+                <a:spcPct val="100000"/>
+              </a:lnSpc>
+              <a:spcBef>
+                <a:spcPts val="900"/>
+              </a:spcBef>
+              <a:spcAft>
+                <a:spcPts val="0"/>
+              </a:spcAft>
+              <a:buClrTx/>
+              <a:buSzTx/>
+              <a:buFontTx/>
+              <a:buNone/>
+              <a:tabLst/>
+            </a:pPr>
+            <a:endParaRPr kumimoji="0" lang="da-DK" sz="1600" b="0" i="0" u="none" strike="noStrike" cap="none" spc="0" normalizeH="0" baseline="0">
+              <a:ln>
+                <a:noFill/>
+              </a:ln>
+              <a:solidFill>
+                <a:srgbClr val="000000"/>
+              </a:solidFill>
+              <a:effectLst/>
+              <a:uFillTx/>
+              <a:latin typeface="+mn-lt"/>
+              <a:ea typeface="+mn-ea"/>
+              <a:cs typeface="+mn-cs"/>
+              <a:sym typeface="Arial"/>
+            </a:endParaRPr>
+          </a:p>
+        </p:txBody>
+      </p:sp>
+      <p:sp>
+        <p:nvSpPr>
           <p:cNvPr id="250" name="Title 4"/>
           <p:cNvSpPr txBox="1">
             <a:spLocks noGrp="1"/>
@@ -8986,6 +10024,88 @@
           </a:p>
         </p:txBody>
       </p:sp>
+      <p:cxnSp>
+        <p:nvCxnSpPr>
+          <p:cNvPr id="13" name="Straight Connector 12">
+            <a:extLst>
+              <a:ext uri="{FF2B5EF4-FFF2-40B4-BE49-F238E27FC236}">
+                <a16:creationId xmlns:a16="http://schemas.microsoft.com/office/drawing/2014/main" id="{03E8AC96-2807-2D40-A780-22EB1B4BC85A}"/>
+              </a:ext>
+            </a:extLst>
+          </p:cNvPr>
+          <p:cNvCxnSpPr>
+            <a:cxnSpLocks/>
+          </p:cNvCxnSpPr>
+          <p:nvPr/>
+        </p:nvCxnSpPr>
+        <p:spPr>
+          <a:xfrm>
+            <a:off x="2605190" y="21980"/>
+            <a:ext cx="4767943" cy="0"/>
+          </a:xfrm>
+          <a:prstGeom prst="line">
+            <a:avLst/>
+          </a:prstGeom>
+          <a:noFill/>
+          <a:ln w="47625" cap="flat">
+            <a:solidFill>
+              <a:schemeClr val="accent1"/>
+            </a:solidFill>
+            <a:prstDash val="solid"/>
+            <a:round/>
+          </a:ln>
+          <a:effectLst/>
+          <a:sp3d/>
+        </p:spPr>
+        <p:style>
+          <a:lnRef idx="0">
+            <a:scrgbClr r="0" g="0" b="0"/>
+          </a:lnRef>
+          <a:fillRef idx="0">
+            <a:scrgbClr r="0" g="0" b="0"/>
+          </a:fillRef>
+          <a:effectRef idx="0">
+            <a:scrgbClr r="0" g="0" b="0"/>
+          </a:effectRef>
+          <a:fontRef idx="none"/>
+        </p:style>
+      </p:cxnSp>
+      <p:pic>
+        <p:nvPicPr>
+          <p:cNvPr id="16" name="Picture 15">
+            <a:extLst>
+              <a:ext uri="{FF2B5EF4-FFF2-40B4-BE49-F238E27FC236}">
+                <a16:creationId xmlns:a16="http://schemas.microsoft.com/office/drawing/2014/main" id="{DDD1B1C2-A4CD-4447-98EF-86C68D5F7593}"/>
+              </a:ext>
+            </a:extLst>
+          </p:cNvPr>
+          <p:cNvPicPr>
+            <a:picLocks noChangeAspect="1"/>
+          </p:cNvPicPr>
+          <p:nvPr/>
+        </p:nvPicPr>
+        <p:blipFill>
+          <a:blip r:embed="rId2">
+            <a:extLst>
+              <a:ext uri="{28A0092B-C50C-407E-A947-70E740481C1C}">
+                <a14:useLocalDpi xmlns:a14="http://schemas.microsoft.com/office/drawing/2010/main" val="0"/>
+              </a:ext>
+            </a:extLst>
+          </a:blip>
+          <a:stretch>
+            <a:fillRect/>
+          </a:stretch>
+        </p:blipFill>
+        <p:spPr>
+          <a:xfrm>
+            <a:off x="6947028" y="2144227"/>
+            <a:ext cx="4876800" cy="3797300"/>
+          </a:xfrm>
+          <a:prstGeom prst="rect">
+            <a:avLst/>
+          </a:prstGeom>
+        </p:spPr>
+      </p:pic>
       <p:sp>
         <p:nvSpPr>
           <p:cNvPr id="251" name="Content Placeholder 5"/>
@@ -9010,49 +10130,22 @@
           <a:lstStyle/>
           <a:p>
             <a:r>
+              <a:rPr lang="da-DK" dirty="0"/>
+              <a:t>Dispersion relation, </a:t>
+            </a:r>
+            <a:r>
               <a:rPr lang="da-DK" dirty="0" err="1"/>
-              <a:t>Example</a:t>
+              <a:t>theory</a:t>
             </a:r>
             <a:r>
               <a:rPr lang="da-DK" dirty="0"/>
-              <a:t> of the output</a:t>
-            </a:r>
-            <a:endParaRPr dirty="0"/>
-          </a:p>
-        </p:txBody>
-      </p:sp>
-      <p:sp>
-        <p:nvSpPr>
-          <p:cNvPr id="252" name="Slide Number Placeholder 3"/>
-          <p:cNvSpPr txBox="1">
-            <a:spLocks noGrp="1"/>
-          </p:cNvSpPr>
-          <p:nvPr>
-            <p:ph type="sldNum" sz="quarter" idx="2"/>
-          </p:nvPr>
-        </p:nvSpPr>
-        <p:spPr>
-          <a:xfrm>
-            <a:off x="11506450" y="6636099"/>
-            <a:ext cx="127001" cy="127001"/>
-          </a:xfrm>
-          <a:prstGeom prst="rect">
-            <a:avLst/>
-          </a:prstGeom>
-          <a:extLst>
-            <a:ext uri="{C572A759-6A51-4108-AA02-DFA0A04FC94B}">
-              <ma14:wrappingTextBoxFlag xmlns="" xmlns:m="http://schemas.openxmlformats.org/officeDocument/2006/math" xmlns:a14="http://schemas.microsoft.com/office/drawing/2010/main" xmlns:ma14="http://schemas.microsoft.com/office/mac/drawingml/2011/main" val="1"/>
-            </a:ext>
-          </a:extLst>
-        </p:spPr>
-        <p:txBody>
-          <a:bodyPr/>
-          <a:lstStyle/>
-          <a:p>
-            <a:fld id="{86CB4B4D-7CA3-9044-876B-883B54F8677D}" type="slidenum">
-              <a:t>6</a:t>
-            </a:fld>
-            <a:endParaRPr/>
+              <a:t> and </a:t>
+            </a:r>
+            <a:r>
+              <a:rPr lang="da-DK" dirty="0" err="1"/>
+              <a:t>mcstas</a:t>
+            </a:r>
+            <a:endParaRPr lang="da-DK" dirty="0"/>
           </a:p>
         </p:txBody>
       </p:sp>
@@ -9120,7 +10213,7 @@
             </a:r>
             <a:r>
               <a:rPr lang="da-DK" dirty="0" err="1"/>
-              <a:t>Isotropic_sqw</a:t>
+              <a:t>Phonon_simple</a:t>
             </a:r>
             <a:endParaRPr dirty="0"/>
           </a:p>
@@ -9151,84 +10244,11 @@
           <a:p>
             <a:r>
               <a:rPr lang="da-DK" dirty="0" err="1"/>
-              <a:t>Isotropic</a:t>
+              <a:t>Example</a:t>
             </a:r>
             <a:r>
               <a:rPr lang="da-DK" dirty="0"/>
-              <a:t> processes (</a:t>
-            </a:r>
-            <a:r>
-              <a:rPr lang="da-DK" dirty="0" err="1"/>
-              <a:t>powder</a:t>
-            </a:r>
-            <a:r>
-              <a:rPr lang="da-DK" dirty="0"/>
-              <a:t>, </a:t>
-            </a:r>
-            <a:r>
-              <a:rPr lang="da-DK" dirty="0" err="1"/>
-              <a:t>liquid</a:t>
-            </a:r>
-            <a:r>
-              <a:rPr lang="da-DK" dirty="0"/>
-              <a:t>, …)</a:t>
-            </a:r>
-          </a:p>
-          <a:p>
-            <a:r>
-              <a:rPr lang="da-DK" dirty="0" err="1"/>
-              <a:t>Use</a:t>
-            </a:r>
-            <a:r>
-              <a:rPr lang="da-DK" dirty="0"/>
-              <a:t> data files to </a:t>
-            </a:r>
-            <a:r>
-              <a:rPr lang="da-DK" dirty="0" err="1"/>
-              <a:t>describe</a:t>
-            </a:r>
-            <a:r>
-              <a:rPr lang="da-DK" dirty="0"/>
-              <a:t> S(</a:t>
-            </a:r>
-            <a:r>
-              <a:rPr lang="da-DK" dirty="0" err="1"/>
-              <a:t>q,w</a:t>
-            </a:r>
-            <a:r>
-              <a:rPr lang="da-DK" dirty="0"/>
-              <a:t>) </a:t>
-            </a:r>
-            <a:r>
-              <a:rPr lang="da-DK" dirty="0" err="1"/>
-              <a:t>directly</a:t>
-            </a:r>
-            <a:r>
-              <a:rPr lang="da-DK" dirty="0"/>
-              <a:t>, </a:t>
-            </a:r>
-            <a:r>
-              <a:rPr lang="da-DK" dirty="0" err="1"/>
-              <a:t>coherent</a:t>
-            </a:r>
-            <a:r>
-              <a:rPr lang="da-DK" dirty="0"/>
-              <a:t> and </a:t>
-            </a:r>
-            <a:r>
-              <a:rPr lang="da-DK" dirty="0" err="1"/>
-              <a:t>incoherent</a:t>
-            </a:r>
-            <a:endParaRPr lang="da-DK" dirty="0"/>
-          </a:p>
-          <a:p>
-            <a:r>
-              <a:rPr lang="da-DK" dirty="0" err="1"/>
-              <a:t>Something</a:t>
-            </a:r>
-            <a:r>
-              <a:rPr lang="da-DK" dirty="0"/>
-              <a:t> on input</a:t>
+              <a:t> of the output</a:t>
             </a:r>
             <a:endParaRPr dirty="0"/>
           </a:p>
@@ -9254,7 +10274,7 @@
           </a:prstGeom>
           <a:extLst>
             <a:ext uri="{C572A759-6A51-4108-AA02-DFA0A04FC94B}">
-              <ma14:wrappingTextBoxFlag xmlns="" xmlns:m="http://schemas.openxmlformats.org/officeDocument/2006/math" xmlns:a14="http://schemas.microsoft.com/office/drawing/2010/main" xmlns:ma14="http://schemas.microsoft.com/office/mac/drawingml/2011/main" val="1"/>
+              <ma14:wrappingTextBoxFlag xmlns:ma14="http://schemas.microsoft.com/office/mac/drawingml/2011/main" xmlns:a14="http://schemas.microsoft.com/office/drawing/2010/main" xmlns:m="http://schemas.openxmlformats.org/officeDocument/2006/math" xmlns="" val="1"/>
             </a:ext>
           </a:extLst>
         </p:spPr>
@@ -9269,10 +10289,195 @@
           </a:p>
         </p:txBody>
       </p:sp>
+      <p:pic>
+        <p:nvPicPr>
+          <p:cNvPr id="3" name="Picture 2">
+            <a:extLst>
+              <a:ext uri="{FF2B5EF4-FFF2-40B4-BE49-F238E27FC236}">
+                <a16:creationId xmlns:a16="http://schemas.microsoft.com/office/drawing/2014/main" id="{AB9E7C52-3CCB-1742-BDF9-5B0F922D6792}"/>
+              </a:ext>
+            </a:extLst>
+          </p:cNvPr>
+          <p:cNvPicPr>
+            <a:picLocks noChangeAspect="1"/>
+          </p:cNvPicPr>
+          <p:nvPr/>
+        </p:nvPicPr>
+        <p:blipFill rotWithShape="1">
+          <a:blip r:embed="rId2">
+            <a:extLst>
+              <a:ext uri="{28A0092B-C50C-407E-A947-70E740481C1C}">
+                <a14:useLocalDpi xmlns:a14="http://schemas.microsoft.com/office/drawing/2010/main" val="0"/>
+              </a:ext>
+            </a:extLst>
+          </a:blip>
+          <a:srcRect b="1625"/>
+          <a:stretch/>
+        </p:blipFill>
+        <p:spPr>
+          <a:xfrm>
+            <a:off x="5326380" y="1543863"/>
+            <a:ext cx="6679833" cy="4879798"/>
+          </a:xfrm>
+          <a:prstGeom prst="rect">
+            <a:avLst/>
+          </a:prstGeom>
+        </p:spPr>
+      </p:pic>
+      <p:sp>
+        <p:nvSpPr>
+          <p:cNvPr id="4" name="TextBox 3">
+            <a:extLst>
+              <a:ext uri="{FF2B5EF4-FFF2-40B4-BE49-F238E27FC236}">
+                <a16:creationId xmlns:a16="http://schemas.microsoft.com/office/drawing/2014/main" id="{8FFD424F-F4F4-244B-96C6-068CCF1C709A}"/>
+              </a:ext>
+            </a:extLst>
+          </p:cNvPr>
+          <p:cNvSpPr txBox="1"/>
+          <p:nvPr/>
+        </p:nvSpPr>
+        <p:spPr>
+          <a:xfrm>
+            <a:off x="7109460" y="1543863"/>
+            <a:ext cx="3566160" cy="484748"/>
+          </a:xfrm>
+          <a:prstGeom prst="rect">
+            <a:avLst/>
+          </a:prstGeom>
+          <a:noFill/>
+          <a:ln w="12700" cap="flat">
+            <a:noFill/>
+            <a:miter lim="400000"/>
+          </a:ln>
+          <a:effectLst/>
+          <a:sp3d/>
+        </p:spPr>
+        <p:style>
+          <a:lnRef idx="0">
+            <a:scrgbClr r="0" g="0" b="0"/>
+          </a:lnRef>
+          <a:fillRef idx="0">
+            <a:scrgbClr r="0" g="0" b="0"/>
+          </a:fillRef>
+          <a:effectRef idx="0">
+            <a:scrgbClr r="0" g="0" b="0"/>
+          </a:effectRef>
+          <a:fontRef idx="none"/>
+        </p:style>
+        <p:txBody>
+          <a:bodyPr rot="0" spcFirstLastPara="1" vertOverflow="overflow" horzOverflow="overflow" vert="horz" wrap="square" lIns="0" tIns="0" rIns="0" bIns="0" numCol="1" spcCol="38100" rtlCol="0" anchor="t">
+            <a:spAutoFit/>
+          </a:bodyPr>
+          <a:lstStyle/>
+          <a:p>
+            <a:pPr marL="0" marR="0" indent="0" algn="l" defTabSz="914400" rtl="0" fontAlgn="auto" latinLnBrk="0" hangingPunct="0">
+              <a:lnSpc>
+                <a:spcPct val="100000"/>
+              </a:lnSpc>
+              <a:spcBef>
+                <a:spcPts val="900"/>
+              </a:spcBef>
+              <a:spcAft>
+                <a:spcPts val="0"/>
+              </a:spcAft>
+              <a:buClrTx/>
+              <a:buSzTx/>
+              <a:buFontTx/>
+              <a:buNone/>
+              <a:tabLst/>
+            </a:pPr>
+            <a:r>
+              <a:rPr kumimoji="0" lang="da-DK" sz="2400" b="0" i="0" u="none" strike="noStrike" cap="none" spc="0" normalizeH="0" baseline="0" dirty="0">
+                <a:ln>
+                  <a:noFill/>
+                </a:ln>
+                <a:solidFill>
+                  <a:schemeClr val="bg1"/>
+                </a:solidFill>
+                <a:effectLst/>
+                <a:uFillTx/>
+                <a:latin typeface="+mn-lt"/>
+                <a:ea typeface="+mn-ea"/>
+                <a:cs typeface="+mn-cs"/>
+                <a:sym typeface="Arial"/>
+              </a:rPr>
+              <a:t>4 </a:t>
+            </a:r>
+            <a:r>
+              <a:rPr kumimoji="0" lang="da-DK" sz="2400" b="0" i="0" u="none" strike="noStrike" cap="none" spc="0" normalizeH="0" baseline="0" dirty="0" err="1">
+                <a:ln>
+                  <a:noFill/>
+                </a:ln>
+                <a:solidFill>
+                  <a:schemeClr val="bg1"/>
+                </a:solidFill>
+                <a:effectLst/>
+                <a:uFillTx/>
+                <a:latin typeface="+mn-lt"/>
+                <a:ea typeface="+mn-ea"/>
+                <a:cs typeface="+mn-cs"/>
+                <a:sym typeface="Arial"/>
+              </a:rPr>
+              <a:t>meV</a:t>
+            </a:r>
+            <a:r>
+              <a:rPr kumimoji="0" lang="da-DK" sz="2400" b="0" i="0" u="none" strike="noStrike" cap="none" spc="0" normalizeH="0" baseline="0" dirty="0">
+                <a:ln>
+                  <a:noFill/>
+                </a:ln>
+                <a:solidFill>
+                  <a:schemeClr val="bg1"/>
+                </a:solidFill>
+                <a:effectLst/>
+                <a:uFillTx/>
+                <a:latin typeface="+mn-lt"/>
+                <a:ea typeface="+mn-ea"/>
+                <a:cs typeface="+mn-cs"/>
+                <a:sym typeface="Arial"/>
+              </a:rPr>
+              <a:t> </a:t>
+            </a:r>
+            <a:r>
+              <a:rPr kumimoji="0" lang="da-DK" sz="2400" b="0" i="0" u="none" strike="noStrike" cap="none" spc="0" normalizeH="0" baseline="0" dirty="0" err="1">
+                <a:ln>
+                  <a:noFill/>
+                </a:ln>
+                <a:solidFill>
+                  <a:schemeClr val="bg1"/>
+                </a:solidFill>
+                <a:effectLst/>
+                <a:uFillTx/>
+                <a:latin typeface="+mn-lt"/>
+                <a:ea typeface="+mn-ea"/>
+                <a:cs typeface="+mn-cs"/>
+                <a:sym typeface="Arial"/>
+              </a:rPr>
+              <a:t>energy</a:t>
+            </a:r>
+            <a:r>
+              <a:rPr kumimoji="0" lang="da-DK" sz="2400" b="0" i="0" u="none" strike="noStrike" cap="none" spc="0" normalizeH="0" baseline="0" dirty="0">
+                <a:ln>
+                  <a:noFill/>
+                </a:ln>
+                <a:solidFill>
+                  <a:schemeClr val="bg1"/>
+                </a:solidFill>
+                <a:effectLst/>
+                <a:uFillTx/>
+                <a:latin typeface="+mn-lt"/>
+                <a:ea typeface="+mn-ea"/>
+                <a:cs typeface="+mn-cs"/>
+                <a:sym typeface="Arial"/>
+              </a:rPr>
+              <a:t> transfer</a:t>
+            </a:r>
+          </a:p>
+        </p:txBody>
+      </p:sp>
     </p:spTree>
     <p:extLst>
       <p:ext uri="{BB962C8B-B14F-4D97-AF65-F5344CB8AC3E}">
-        <p14:creationId xmlns:p14="http://schemas.microsoft.com/office/powerpoint/2010/main" val="295657600"/>
+        <p14:creationId xmlns:p14="http://schemas.microsoft.com/office/powerpoint/2010/main" val="3881003471"/>
       </p:ext>
     </p:extLst>
   </p:cSld>
@@ -9364,13 +10569,89 @@
           <a:p>
             <a:r>
               <a:rPr lang="da-DK" dirty="0" err="1"/>
-              <a:t>Example</a:t>
+              <a:t>Isotropic</a:t>
             </a:r>
             <a:r>
               <a:rPr lang="da-DK" dirty="0"/>
-              <a:t> of the output</a:t>
-            </a:r>
-            <a:endParaRPr dirty="0"/>
+              <a:t> processes (</a:t>
+            </a:r>
+            <a:r>
+              <a:rPr lang="da-DK" dirty="0" err="1"/>
+              <a:t>powder</a:t>
+            </a:r>
+            <a:r>
+              <a:rPr lang="da-DK" dirty="0"/>
+              <a:t>, </a:t>
+            </a:r>
+            <a:r>
+              <a:rPr lang="da-DK" dirty="0" err="1"/>
+              <a:t>liquid</a:t>
+            </a:r>
+            <a:r>
+              <a:rPr lang="da-DK" dirty="0"/>
+              <a:t>, …)</a:t>
+            </a:r>
+          </a:p>
+          <a:p>
+            <a:r>
+              <a:rPr lang="da-DK" dirty="0" err="1"/>
+              <a:t>Use</a:t>
+            </a:r>
+            <a:r>
+              <a:rPr lang="da-DK" dirty="0"/>
+              <a:t> data files to </a:t>
+            </a:r>
+            <a:r>
+              <a:rPr lang="da-DK" dirty="0" err="1"/>
+              <a:t>describe</a:t>
+            </a:r>
+            <a:r>
+              <a:rPr lang="da-DK" dirty="0"/>
+              <a:t> S(</a:t>
+            </a:r>
+            <a:r>
+              <a:rPr lang="da-DK" dirty="0" err="1"/>
+              <a:t>q,w</a:t>
+            </a:r>
+            <a:r>
+              <a:rPr lang="da-DK" dirty="0"/>
+              <a:t>) </a:t>
+            </a:r>
+            <a:r>
+              <a:rPr lang="da-DK" dirty="0" err="1"/>
+              <a:t>directly</a:t>
+            </a:r>
+            <a:r>
+              <a:rPr lang="da-DK" dirty="0"/>
+              <a:t>, </a:t>
+            </a:r>
+            <a:r>
+              <a:rPr lang="da-DK" dirty="0" err="1"/>
+              <a:t>coherent</a:t>
+            </a:r>
+            <a:r>
+              <a:rPr lang="da-DK" dirty="0"/>
+              <a:t> and </a:t>
+            </a:r>
+            <a:r>
+              <a:rPr lang="da-DK" dirty="0" err="1"/>
+              <a:t>incoherent</a:t>
+            </a:r>
+            <a:endParaRPr lang="da-DK" dirty="0"/>
+          </a:p>
+          <a:p>
+            <a:r>
+              <a:rPr lang="da-DK" dirty="0"/>
+              <a:t>Supports </a:t>
+            </a:r>
+            <a:r>
+              <a:rPr lang="da-DK" dirty="0" err="1"/>
+              <a:t>concentric</a:t>
+            </a:r>
+            <a:endParaRPr lang="da-DK" dirty="0"/>
+          </a:p>
+          <a:p>
+            <a:endParaRPr lang="da-DK" dirty="0"/>
           </a:p>
         </p:txBody>
       </p:sp>
@@ -9394,7 +10675,7 @@
           </a:prstGeom>
           <a:extLst>
             <a:ext uri="{C572A759-6A51-4108-AA02-DFA0A04FC94B}">
-              <ma14:wrappingTextBoxFlag xmlns="" xmlns:m="http://schemas.openxmlformats.org/officeDocument/2006/math" xmlns:a14="http://schemas.microsoft.com/office/drawing/2010/main" xmlns:ma14="http://schemas.microsoft.com/office/mac/drawingml/2011/main" val="1"/>
+              <ma14:wrappingTextBoxFlag xmlns:ma14="http://schemas.microsoft.com/office/mac/drawingml/2011/main" xmlns:a14="http://schemas.microsoft.com/office/drawing/2010/main" xmlns:m="http://schemas.openxmlformats.org/officeDocument/2006/math" xmlns="" val="1"/>
             </a:ext>
           </a:extLst>
         </p:spPr>
@@ -9409,10 +10690,46 @@
           </a:p>
         </p:txBody>
       </p:sp>
+      <p:pic>
+        <p:nvPicPr>
+          <p:cNvPr id="3" name="Picture 2">
+            <a:extLst>
+              <a:ext uri="{FF2B5EF4-FFF2-40B4-BE49-F238E27FC236}">
+                <a16:creationId xmlns:a16="http://schemas.microsoft.com/office/drawing/2014/main" id="{D1A066FC-45D0-C042-BC1B-055840ECE63A}"/>
+              </a:ext>
+            </a:extLst>
+          </p:cNvPr>
+          <p:cNvPicPr>
+            <a:picLocks noChangeAspect="1"/>
+          </p:cNvPicPr>
+          <p:nvPr/>
+        </p:nvPicPr>
+        <p:blipFill>
+          <a:blip r:embed="rId2">
+            <a:extLst>
+              <a:ext uri="{28A0092B-C50C-407E-A947-70E740481C1C}">
+                <a14:useLocalDpi xmlns:a14="http://schemas.microsoft.com/office/drawing/2010/main" val="0"/>
+              </a:ext>
+            </a:extLst>
+          </a:blip>
+          <a:stretch>
+            <a:fillRect/>
+          </a:stretch>
+        </p:blipFill>
+        <p:spPr>
+          <a:xfrm>
+            <a:off x="7315451" y="2539710"/>
+            <a:ext cx="4318000" cy="3962673"/>
+          </a:xfrm>
+          <a:prstGeom prst="rect">
+            <a:avLst/>
+          </a:prstGeom>
+        </p:spPr>
+      </p:pic>
     </p:spTree>
     <p:extLst>
       <p:ext uri="{BB962C8B-B14F-4D97-AF65-F5344CB8AC3E}">
-        <p14:creationId xmlns:p14="http://schemas.microsoft.com/office/powerpoint/2010/main" val="1139390163"/>
+        <p14:creationId xmlns:p14="http://schemas.microsoft.com/office/powerpoint/2010/main" val="295657600"/>
       </p:ext>
     </p:extLst>
   </p:cSld>
@@ -9464,8 +10781,16 @@
           <a:lstStyle/>
           <a:p>
             <a:r>
+              <a:rPr lang="da-DK" dirty="0" err="1"/>
+              <a:t>Popular</a:t>
+            </a:r>
+            <a:r>
               <a:rPr lang="da-DK" dirty="0"/>
-              <a:t>TAS</a:t>
+              <a:t> component: </a:t>
+            </a:r>
+            <a:r>
+              <a:rPr lang="da-DK" dirty="0" err="1"/>
+              <a:t>Isotropic_sqw</a:t>
             </a:r>
             <a:endParaRPr dirty="0"/>
           </a:p>
@@ -9484,7 +10809,7 @@
         <p:spPr>
           <a:xfrm>
             <a:off x="1774799" y="1706399"/>
-            <a:ext cx="4060393" cy="4545579"/>
+            <a:ext cx="9312376" cy="4545579"/>
           </a:xfrm>
           <a:prstGeom prst="rect">
             <a:avLst/>
@@ -9496,48 +10821,88 @@
           <a:p>
             <a:r>
               <a:rPr lang="da-DK" dirty="0" err="1"/>
-              <a:t>Only</a:t>
+              <a:t>Isotropic</a:t>
             </a:r>
             <a:r>
               <a:rPr lang="da-DK" dirty="0"/>
-              <a:t> a small </a:t>
+              <a:t> processes (</a:t>
             </a:r>
             <a:r>
               <a:rPr lang="da-DK" dirty="0" err="1"/>
-              <a:t>fraction</a:t>
+              <a:t>powder</a:t>
             </a:r>
             <a:r>
               <a:rPr lang="da-DK" dirty="0"/>
-              <a:t> of neutrons </a:t>
+              <a:t>, </a:t>
             </a:r>
             <a:r>
               <a:rPr lang="da-DK" dirty="0" err="1"/>
-              <a:t>arrive</a:t>
+              <a:t>liquid</a:t>
             </a:r>
             <a:r>
               <a:rPr lang="da-DK" dirty="0"/>
-              <a:t>, most </a:t>
-            </a:r>
+              <a:t>, …)</a:t>
+            </a:r>
+          </a:p>
+          <a:p>
             <a:r>
               <a:rPr lang="da-DK" dirty="0" err="1"/>
-              <a:t>are</a:t>
+              <a:t>Use</a:t>
             </a:r>
             <a:r>
               <a:rPr lang="da-DK" dirty="0"/>
-              <a:t> </a:t>
+              <a:t> data files to </a:t>
             </a:r>
             <a:r>
               <a:rPr lang="da-DK" dirty="0" err="1"/>
-              <a:t>simulated</a:t>
+              <a:t>describe</a:t>
             </a:r>
             <a:r>
               <a:rPr lang="da-DK" dirty="0"/>
-              <a:t> in </a:t>
+              <a:t> S(</a:t>
             </a:r>
             <a:r>
               <a:rPr lang="da-DK" dirty="0" err="1"/>
-              <a:t>vain</a:t>
-            </a:r>
+              <a:t>q,w</a:t>
+            </a:r>
+            <a:r>
+              <a:rPr lang="da-DK" dirty="0"/>
+              <a:t>) </a:t>
+            </a:r>
+            <a:r>
+              <a:rPr lang="da-DK" dirty="0" err="1"/>
+              <a:t>directly</a:t>
+            </a:r>
+            <a:r>
+              <a:rPr lang="da-DK" dirty="0"/>
+              <a:t>, </a:t>
+            </a:r>
+            <a:r>
+              <a:rPr lang="da-DK" dirty="0" err="1"/>
+              <a:t>coherent</a:t>
+            </a:r>
+            <a:r>
+              <a:rPr lang="da-DK" dirty="0"/>
+              <a:t> and </a:t>
+            </a:r>
+            <a:r>
+              <a:rPr lang="da-DK" dirty="0" err="1"/>
+              <a:t>incoherent</a:t>
+            </a:r>
+            <a:endParaRPr lang="da-DK" dirty="0"/>
+          </a:p>
+          <a:p>
+            <a:r>
+              <a:rPr lang="da-DK" dirty="0"/>
+              <a:t>Supports </a:t>
+            </a:r>
+            <a:r>
+              <a:rPr lang="da-DK" dirty="0" err="1"/>
+              <a:t>concentric</a:t>
+            </a:r>
+            <a:endParaRPr lang="da-DK" dirty="0"/>
+          </a:p>
+          <a:p>
             <a:endParaRPr lang="da-DK" dirty="0"/>
           </a:p>
         </p:txBody>
@@ -9562,7 +10927,7 @@
           </a:prstGeom>
           <a:extLst>
             <a:ext uri="{C572A759-6A51-4108-AA02-DFA0A04FC94B}">
-              <ma14:wrappingTextBoxFlag xmlns="" xmlns:m="http://schemas.openxmlformats.org/officeDocument/2006/math" xmlns:a14="http://schemas.microsoft.com/office/drawing/2010/main" xmlns:ma14="http://schemas.microsoft.com/office/mac/drawingml/2011/main" val="1"/>
+              <ma14:wrappingTextBoxFlag xmlns:ma14="http://schemas.microsoft.com/office/mac/drawingml/2011/main" xmlns:a14="http://schemas.microsoft.com/office/drawing/2010/main" xmlns:m="http://schemas.openxmlformats.org/officeDocument/2006/math" xmlns="" val="1"/>
             </a:ext>
           </a:extLst>
         </p:spPr>
@@ -9579,10 +10944,10 @@
       </p:sp>
       <p:pic>
         <p:nvPicPr>
-          <p:cNvPr id="3" name="Picture 2">
+          <p:cNvPr id="7" name="Picture 6">
             <a:extLst>
               <a:ext uri="{FF2B5EF4-FFF2-40B4-BE49-F238E27FC236}">
-                <a16:creationId xmlns:a16="http://schemas.microsoft.com/office/drawing/2014/main" id="{0F080686-8093-B94D-9F4A-9CE20F5AD4FB}"/>
+                <a16:creationId xmlns:a16="http://schemas.microsoft.com/office/drawing/2014/main" id="{A8649063-0890-714A-BB03-17E0ABB9CD62}"/>
               </a:ext>
             </a:extLst>
           </p:cNvPr>
@@ -9591,31 +10956,442 @@
           </p:cNvPicPr>
           <p:nvPr/>
         </p:nvPicPr>
-        <p:blipFill rotWithShape="1">
-          <a:blip r:embed="rId3">
+        <p:blipFill>
+          <a:blip r:embed="rId2">
             <a:extLst>
               <a:ext uri="{28A0092B-C50C-407E-A947-70E740481C1C}">
                 <a14:useLocalDpi xmlns:a14="http://schemas.microsoft.com/office/drawing/2010/main" val="0"/>
               </a:ext>
             </a:extLst>
           </a:blip>
-          <a:srcRect l="10227" r="11179"/>
-          <a:stretch/>
+          <a:stretch>
+            <a:fillRect/>
+          </a:stretch>
         </p:blipFill>
         <p:spPr>
           <a:xfrm>
-            <a:off x="6572315" y="1398844"/>
-            <a:ext cx="5314885" cy="4455656"/>
+            <a:off x="2411540" y="3070876"/>
+            <a:ext cx="8277586" cy="3181102"/>
           </a:xfrm>
           <a:prstGeom prst="rect">
             <a:avLst/>
           </a:prstGeom>
         </p:spPr>
       </p:pic>
+      <p:sp>
+        <p:nvSpPr>
+          <p:cNvPr id="2" name="TextBox 1">
+            <a:extLst>
+              <a:ext uri="{FF2B5EF4-FFF2-40B4-BE49-F238E27FC236}">
+                <a16:creationId xmlns:a16="http://schemas.microsoft.com/office/drawing/2014/main" id="{F556BC4E-4A1C-9349-A76B-F521333A5949}"/>
+              </a:ext>
+            </a:extLst>
+          </p:cNvPr>
+          <p:cNvSpPr txBox="1"/>
+          <p:nvPr/>
+        </p:nvSpPr>
+        <p:spPr>
+          <a:xfrm>
+            <a:off x="7665256" y="5812718"/>
+            <a:ext cx="375424" cy="484748"/>
+          </a:xfrm>
+          <a:prstGeom prst="rect">
+            <a:avLst/>
+          </a:prstGeom>
+          <a:noFill/>
+          <a:ln w="12700" cap="flat">
+            <a:noFill/>
+            <a:miter lim="400000"/>
+          </a:ln>
+          <a:effectLst/>
+          <a:sp3d/>
+        </p:spPr>
+        <p:style>
+          <a:lnRef idx="0">
+            <a:scrgbClr r="0" g="0" b="0"/>
+          </a:lnRef>
+          <a:fillRef idx="0">
+            <a:scrgbClr r="0" g="0" b="0"/>
+          </a:fillRef>
+          <a:effectRef idx="0">
+            <a:scrgbClr r="0" g="0" b="0"/>
+          </a:effectRef>
+          <a:fontRef idx="none"/>
+        </p:style>
+        <p:txBody>
+          <a:bodyPr rot="0" spcFirstLastPara="1" vertOverflow="overflow" horzOverflow="overflow" vert="horz" wrap="square" lIns="0" tIns="0" rIns="0" bIns="0" numCol="1" spcCol="38100" rtlCol="0" anchor="t">
+            <a:spAutoFit/>
+          </a:bodyPr>
+          <a:lstStyle/>
+          <a:p>
+            <a:pPr marL="0" marR="0" indent="0" algn="l" defTabSz="914400" rtl="0" fontAlgn="auto" latinLnBrk="0" hangingPunct="0">
+              <a:lnSpc>
+                <a:spcPct val="100000"/>
+              </a:lnSpc>
+              <a:spcBef>
+                <a:spcPts val="900"/>
+              </a:spcBef>
+              <a:spcAft>
+                <a:spcPts val="0"/>
+              </a:spcAft>
+              <a:buClrTx/>
+              <a:buSzTx/>
+              <a:buFontTx/>
+              <a:buNone/>
+              <a:tabLst/>
+            </a:pPr>
+            <a:r>
+              <a:rPr kumimoji="0" lang="da-DK" sz="2400" b="0" u="none" strike="noStrike" cap="none" spc="0" normalizeH="0" baseline="0" dirty="0">
+                <a:ln>
+                  <a:noFill/>
+                </a:ln>
+                <a:solidFill>
+                  <a:srgbClr val="000000"/>
+                </a:solidFill>
+                <a:effectLst/>
+                <a:uFillTx/>
+                <a:latin typeface="+mn-lt"/>
+                <a:ea typeface="+mn-ea"/>
+                <a:cs typeface="+mn-cs"/>
+                <a:sym typeface="Arial"/>
+              </a:rPr>
+              <a:t>q</a:t>
+            </a:r>
+          </a:p>
+        </p:txBody>
+      </p:sp>
+      <p:sp>
+        <p:nvSpPr>
+          <p:cNvPr id="8" name="TextBox 7">
+            <a:extLst>
+              <a:ext uri="{FF2B5EF4-FFF2-40B4-BE49-F238E27FC236}">
+                <a16:creationId xmlns:a16="http://schemas.microsoft.com/office/drawing/2014/main" id="{E89B9935-EC06-744F-A73F-1F3777954169}"/>
+              </a:ext>
+            </a:extLst>
+          </p:cNvPr>
+          <p:cNvSpPr txBox="1"/>
+          <p:nvPr/>
+        </p:nvSpPr>
+        <p:spPr>
+          <a:xfrm>
+            <a:off x="10637248" y="5789974"/>
+            <a:ext cx="375424" cy="484748"/>
+          </a:xfrm>
+          <a:prstGeom prst="rect">
+            <a:avLst/>
+          </a:prstGeom>
+          <a:noFill/>
+          <a:ln w="12700" cap="flat">
+            <a:noFill/>
+            <a:miter lim="400000"/>
+          </a:ln>
+          <a:effectLst/>
+          <a:sp3d/>
+        </p:spPr>
+        <p:style>
+          <a:lnRef idx="0">
+            <a:scrgbClr r="0" g="0" b="0"/>
+          </a:lnRef>
+          <a:fillRef idx="0">
+            <a:scrgbClr r="0" g="0" b="0"/>
+          </a:fillRef>
+          <a:effectRef idx="0">
+            <a:scrgbClr r="0" g="0" b="0"/>
+          </a:effectRef>
+          <a:fontRef idx="none"/>
+        </p:style>
+        <p:txBody>
+          <a:bodyPr rot="0" spcFirstLastPara="1" vertOverflow="overflow" horzOverflow="overflow" vert="horz" wrap="square" lIns="0" tIns="0" rIns="0" bIns="0" numCol="1" spcCol="38100" rtlCol="0" anchor="t">
+            <a:spAutoFit/>
+          </a:bodyPr>
+          <a:lstStyle/>
+          <a:p>
+            <a:pPr marL="0" marR="0" indent="0" algn="l" defTabSz="914400" rtl="0" fontAlgn="auto" latinLnBrk="0" hangingPunct="0">
+              <a:lnSpc>
+                <a:spcPct val="100000"/>
+              </a:lnSpc>
+              <a:spcBef>
+                <a:spcPts val="900"/>
+              </a:spcBef>
+              <a:spcAft>
+                <a:spcPts val="0"/>
+              </a:spcAft>
+              <a:buClrTx/>
+              <a:buSzTx/>
+              <a:buFontTx/>
+              <a:buNone/>
+              <a:tabLst/>
+            </a:pPr>
+            <a:r>
+              <a:rPr kumimoji="0" lang="da-DK" sz="2400" b="0" u="none" strike="noStrike" cap="none" spc="0" normalizeH="0" baseline="0" dirty="0">
+                <a:ln>
+                  <a:noFill/>
+                </a:ln>
+                <a:solidFill>
+                  <a:srgbClr val="000000"/>
+                </a:solidFill>
+                <a:effectLst/>
+                <a:uFillTx/>
+                <a:latin typeface="+mn-lt"/>
+                <a:ea typeface="+mn-ea"/>
+                <a:cs typeface="+mn-cs"/>
+                <a:sym typeface="Arial"/>
+              </a:rPr>
+              <a:t>q</a:t>
+            </a:r>
+          </a:p>
+        </p:txBody>
+      </p:sp>
+      <p:sp>
+        <p:nvSpPr>
+          <p:cNvPr id="9" name="TextBox 8">
+            <a:extLst>
+              <a:ext uri="{FF2B5EF4-FFF2-40B4-BE49-F238E27FC236}">
+                <a16:creationId xmlns:a16="http://schemas.microsoft.com/office/drawing/2014/main" id="{14377D9C-4FBB-7A44-B524-B77F417952D6}"/>
+              </a:ext>
+            </a:extLst>
+          </p:cNvPr>
+          <p:cNvSpPr txBox="1"/>
+          <p:nvPr/>
+        </p:nvSpPr>
+        <p:spPr>
+          <a:xfrm>
+            <a:off x="5228573" y="3323296"/>
+            <a:ext cx="729205" cy="577081"/>
+          </a:xfrm>
+          <a:prstGeom prst="rect">
+            <a:avLst/>
+          </a:prstGeom>
+          <a:noFill/>
+          <a:ln w="12700" cap="flat">
+            <a:noFill/>
+            <a:miter lim="400000"/>
+          </a:ln>
+          <a:effectLst/>
+          <a:sp3d/>
+        </p:spPr>
+        <p:style>
+          <a:lnRef idx="0">
+            <a:scrgbClr r="0" g="0" b="0"/>
+          </a:lnRef>
+          <a:fillRef idx="0">
+            <a:scrgbClr r="0" g="0" b="0"/>
+          </a:fillRef>
+          <a:effectRef idx="0">
+            <a:scrgbClr r="0" g="0" b="0"/>
+          </a:effectRef>
+          <a:fontRef idx="none"/>
+        </p:style>
+        <p:txBody>
+          <a:bodyPr rot="0" spcFirstLastPara="1" vertOverflow="overflow" horzOverflow="overflow" vert="horz" wrap="square" lIns="0" tIns="0" rIns="0" bIns="0" numCol="1" spcCol="38100" rtlCol="0" anchor="t">
+            <a:spAutoFit/>
+          </a:bodyPr>
+          <a:lstStyle/>
+          <a:p>
+            <a:pPr marL="0" marR="0" indent="0" algn="l" defTabSz="914400" rtl="0" fontAlgn="auto" latinLnBrk="0" hangingPunct="0">
+              <a:lnSpc>
+                <a:spcPct val="100000"/>
+              </a:lnSpc>
+              <a:spcBef>
+                <a:spcPts val="900"/>
+              </a:spcBef>
+              <a:spcAft>
+                <a:spcPts val="0"/>
+              </a:spcAft>
+              <a:buClrTx/>
+              <a:buSzTx/>
+              <a:buFontTx/>
+              <a:buNone/>
+              <a:tabLst/>
+            </a:pPr>
+            <a:r>
+              <a:rPr kumimoji="0" lang="da-DK" sz="3000" b="0" i="0" u="none" strike="noStrike" cap="none" spc="0" normalizeH="0" baseline="0" dirty="0">
+                <a:ln>
+                  <a:noFill/>
+                </a:ln>
+                <a:solidFill>
+                  <a:srgbClr val="000000"/>
+                </a:solidFill>
+                <a:effectLst/>
+                <a:uFillTx/>
+                <a:latin typeface="+mn-lt"/>
+                <a:ea typeface="+mn-ea"/>
+                <a:cs typeface="+mn-cs"/>
+                <a:sym typeface="Arial"/>
+              </a:rPr>
+              <a:t>⍵</a:t>
+            </a:r>
+          </a:p>
+        </p:txBody>
+      </p:sp>
+      <p:sp>
+        <p:nvSpPr>
+          <p:cNvPr id="11" name="TextBox 10">
+            <a:extLst>
+              <a:ext uri="{FF2B5EF4-FFF2-40B4-BE49-F238E27FC236}">
+                <a16:creationId xmlns:a16="http://schemas.microsoft.com/office/drawing/2014/main" id="{8FF78A3C-3604-9247-8634-971E742C8BA6}"/>
+              </a:ext>
+            </a:extLst>
+          </p:cNvPr>
+          <p:cNvSpPr txBox="1"/>
+          <p:nvPr/>
+        </p:nvSpPr>
+        <p:spPr>
+          <a:xfrm>
+            <a:off x="4332053" y="5892844"/>
+            <a:ext cx="1040047" cy="484748"/>
+          </a:xfrm>
+          <a:prstGeom prst="rect">
+            <a:avLst/>
+          </a:prstGeom>
+          <a:noFill/>
+          <a:ln w="12700" cap="flat">
+            <a:noFill/>
+            <a:miter lim="400000"/>
+          </a:ln>
+          <a:effectLst/>
+          <a:sp3d/>
+        </p:spPr>
+        <p:style>
+          <a:lnRef idx="0">
+            <a:scrgbClr r="0" g="0" b="0"/>
+          </a:lnRef>
+          <a:fillRef idx="0">
+            <a:scrgbClr r="0" g="0" b="0"/>
+          </a:fillRef>
+          <a:effectRef idx="0">
+            <a:scrgbClr r="0" g="0" b="0"/>
+          </a:effectRef>
+          <a:fontRef idx="none"/>
+        </p:style>
+        <p:txBody>
+          <a:bodyPr rot="0" spcFirstLastPara="1" vertOverflow="overflow" horzOverflow="overflow" vert="horz" wrap="square" lIns="0" tIns="0" rIns="0" bIns="0" numCol="1" spcCol="38100" rtlCol="0" anchor="t">
+            <a:spAutoFit/>
+          </a:bodyPr>
+          <a:lstStyle/>
+          <a:p>
+            <a:pPr marL="0" marR="0" indent="0" algn="l" defTabSz="914400" rtl="0" fontAlgn="auto" latinLnBrk="0" hangingPunct="0">
+              <a:lnSpc>
+                <a:spcPct val="100000"/>
+              </a:lnSpc>
+              <a:spcBef>
+                <a:spcPts val="900"/>
+              </a:spcBef>
+              <a:spcAft>
+                <a:spcPts val="0"/>
+              </a:spcAft>
+              <a:buClrTx/>
+              <a:buSzTx/>
+              <a:buFontTx/>
+              <a:buNone/>
+              <a:tabLst/>
+            </a:pPr>
+            <a:r>
+              <a:rPr kumimoji="0" lang="da-DK" sz="2400" b="0" i="0" u="none" strike="noStrike" cap="none" spc="0" normalizeH="0" baseline="0" dirty="0">
+                <a:ln>
+                  <a:noFill/>
+                </a:ln>
+                <a:solidFill>
+                  <a:srgbClr val="000000"/>
+                </a:solidFill>
+                <a:effectLst/>
+                <a:uFillTx/>
+                <a:latin typeface="+mn-lt"/>
+                <a:ea typeface="+mn-ea"/>
+                <a:cs typeface="+mn-cs"/>
+                <a:sym typeface="Arial"/>
+              </a:rPr>
+              <a:t>P(⍵)</a:t>
+            </a:r>
+          </a:p>
+        </p:txBody>
+      </p:sp>
+      <p:sp>
+        <p:nvSpPr>
+          <p:cNvPr id="12" name="TextBox 11">
+            <a:extLst>
+              <a:ext uri="{FF2B5EF4-FFF2-40B4-BE49-F238E27FC236}">
+                <a16:creationId xmlns:a16="http://schemas.microsoft.com/office/drawing/2014/main" id="{B8EA6A1B-DAEE-8547-9218-107888A62985}"/>
+              </a:ext>
+            </a:extLst>
+          </p:cNvPr>
+          <p:cNvSpPr txBox="1"/>
+          <p:nvPr/>
+        </p:nvSpPr>
+        <p:spPr>
+          <a:xfrm rot="19151016">
+            <a:off x="7740136" y="3089596"/>
+            <a:ext cx="1302071" cy="484748"/>
+          </a:xfrm>
+          <a:prstGeom prst="rect">
+            <a:avLst/>
+          </a:prstGeom>
+          <a:noFill/>
+          <a:ln w="12700" cap="flat">
+            <a:noFill/>
+            <a:miter lim="400000"/>
+          </a:ln>
+          <a:effectLst/>
+          <a:sp3d/>
+        </p:spPr>
+        <p:style>
+          <a:lnRef idx="0">
+            <a:scrgbClr r="0" g="0" b="0"/>
+          </a:lnRef>
+          <a:fillRef idx="0">
+            <a:scrgbClr r="0" g="0" b="0"/>
+          </a:fillRef>
+          <a:effectRef idx="0">
+            <a:scrgbClr r="0" g="0" b="0"/>
+          </a:effectRef>
+          <a:fontRef idx="none"/>
+        </p:style>
+        <p:txBody>
+          <a:bodyPr rot="0" spcFirstLastPara="1" vertOverflow="overflow" horzOverflow="overflow" vert="horz" wrap="square" lIns="0" tIns="0" rIns="0" bIns="0" numCol="1" spcCol="38100" rtlCol="0" anchor="t">
+            <a:spAutoFit/>
+          </a:bodyPr>
+          <a:lstStyle/>
+          <a:p>
+            <a:pPr marL="0" marR="0" indent="0" algn="l" defTabSz="914400" rtl="0" fontAlgn="auto" latinLnBrk="0" hangingPunct="0">
+              <a:lnSpc>
+                <a:spcPct val="100000"/>
+              </a:lnSpc>
+              <a:spcBef>
+                <a:spcPts val="900"/>
+              </a:spcBef>
+              <a:spcAft>
+                <a:spcPts val="0"/>
+              </a:spcAft>
+              <a:buClrTx/>
+              <a:buSzTx/>
+              <a:buFontTx/>
+              <a:buNone/>
+              <a:tabLst/>
+            </a:pPr>
+            <a:r>
+              <a:rPr kumimoji="0" lang="da-DK" sz="2400" b="0" i="0" u="none" strike="noStrike" cap="none" spc="0" normalizeH="0" baseline="0" dirty="0">
+                <a:ln>
+                  <a:noFill/>
+                </a:ln>
+                <a:solidFill>
+                  <a:srgbClr val="000000"/>
+                </a:solidFill>
+                <a:effectLst/>
+                <a:uFillTx/>
+                <a:latin typeface="+mn-lt"/>
+                <a:ea typeface="+mn-ea"/>
+                <a:cs typeface="+mn-cs"/>
+                <a:sym typeface="Arial"/>
+              </a:rPr>
+              <a:t>P(Q|⍵)</a:t>
+            </a:r>
+          </a:p>
+        </p:txBody>
+      </p:sp>
     </p:spTree>
     <p:extLst>
       <p:ext uri="{BB962C8B-B14F-4D97-AF65-F5344CB8AC3E}">
-        <p14:creationId xmlns:p14="http://schemas.microsoft.com/office/powerpoint/2010/main" val="3025174763"/>
+        <p14:creationId xmlns:p14="http://schemas.microsoft.com/office/powerpoint/2010/main" val="2261644890"/>
       </p:ext>
     </p:extLst>
   </p:cSld>

</xml_diff>

<commit_message>
Updates for Union talks with an overview and more text for exercises
small updates on inelastic scattering talk
</commit_message>
<xml_diff>
--- a/CSNS_March_2019/4_Thursday_March_28th/5_inelastic_scattering/inelastic_scattering.pptx
+++ b/CSNS_March_2019/4_Thursday_March_28th/5_inelastic_scattering/inelastic_scattering.pptx
@@ -8185,6 +8185,1111 @@
               <a:t>4</a:t>
             </a:fld>
             <a:endParaRPr/>
+          </a:p>
+        </p:txBody>
+      </p:sp>
+      <p:cxnSp>
+        <p:nvCxnSpPr>
+          <p:cNvPr id="3" name="Straight Arrow Connector 2">
+            <a:extLst>
+              <a:ext uri="{FF2B5EF4-FFF2-40B4-BE49-F238E27FC236}">
+                <a16:creationId xmlns:a16="http://schemas.microsoft.com/office/drawing/2014/main" id="{9D942AA1-ABC7-E847-90F4-3F9B6D90D209}"/>
+              </a:ext>
+            </a:extLst>
+          </p:cNvPr>
+          <p:cNvCxnSpPr>
+            <a:cxnSpLocks/>
+          </p:cNvCxnSpPr>
+          <p:nvPr/>
+        </p:nvCxnSpPr>
+        <p:spPr>
+          <a:xfrm flipV="1">
+            <a:off x="2509787" y="4857750"/>
+            <a:ext cx="5669280" cy="1120140"/>
+          </a:xfrm>
+          <a:prstGeom prst="straightConnector1">
+            <a:avLst/>
+          </a:prstGeom>
+          <a:noFill/>
+          <a:ln w="50800" cap="flat">
+            <a:solidFill>
+              <a:schemeClr val="accent1"/>
+            </a:solidFill>
+            <a:prstDash val="solid"/>
+            <a:round/>
+            <a:tailEnd type="triangle"/>
+          </a:ln>
+          <a:effectLst/>
+          <a:sp3d/>
+        </p:spPr>
+        <p:style>
+          <a:lnRef idx="0">
+            <a:scrgbClr r="0" g="0" b="0"/>
+          </a:lnRef>
+          <a:fillRef idx="0">
+            <a:scrgbClr r="0" g="0" b="0"/>
+          </a:fillRef>
+          <a:effectRef idx="0">
+            <a:scrgbClr r="0" g="0" b="0"/>
+          </a:effectRef>
+          <a:fontRef idx="none"/>
+        </p:style>
+      </p:cxnSp>
+      <p:cxnSp>
+        <p:nvCxnSpPr>
+          <p:cNvPr id="8" name="Straight Arrow Connector 7">
+            <a:extLst>
+              <a:ext uri="{FF2B5EF4-FFF2-40B4-BE49-F238E27FC236}">
+                <a16:creationId xmlns:a16="http://schemas.microsoft.com/office/drawing/2014/main" id="{BAA5D1DE-9E1F-BD42-A70D-AD5493B44BFB}"/>
+              </a:ext>
+            </a:extLst>
+          </p:cNvPr>
+          <p:cNvCxnSpPr>
+            <a:cxnSpLocks/>
+          </p:cNvCxnSpPr>
+          <p:nvPr/>
+        </p:nvCxnSpPr>
+        <p:spPr>
+          <a:xfrm flipH="1" flipV="1">
+            <a:off x="1774725" y="4229100"/>
+            <a:ext cx="2624822" cy="1924050"/>
+          </a:xfrm>
+          <a:prstGeom prst="straightConnector1">
+            <a:avLst/>
+          </a:prstGeom>
+          <a:noFill/>
+          <a:ln w="50800" cap="flat">
+            <a:solidFill>
+              <a:schemeClr val="accent1"/>
+            </a:solidFill>
+            <a:prstDash val="solid"/>
+            <a:round/>
+            <a:tailEnd type="triangle"/>
+          </a:ln>
+          <a:effectLst/>
+          <a:sp3d/>
+        </p:spPr>
+        <p:style>
+          <a:lnRef idx="0">
+            <a:scrgbClr r="0" g="0" b="0"/>
+          </a:lnRef>
+          <a:fillRef idx="0">
+            <a:scrgbClr r="0" g="0" b="0"/>
+          </a:fillRef>
+          <a:effectRef idx="0">
+            <a:scrgbClr r="0" g="0" b="0"/>
+          </a:effectRef>
+          <a:fontRef idx="none"/>
+        </p:style>
+      </p:cxnSp>
+      <p:cxnSp>
+        <p:nvCxnSpPr>
+          <p:cNvPr id="10" name="Straight Arrow Connector 9">
+            <a:extLst>
+              <a:ext uri="{FF2B5EF4-FFF2-40B4-BE49-F238E27FC236}">
+                <a16:creationId xmlns:a16="http://schemas.microsoft.com/office/drawing/2014/main" id="{5710A84B-4A6D-3C45-B763-A8819A2FA77D}"/>
+              </a:ext>
+            </a:extLst>
+          </p:cNvPr>
+          <p:cNvCxnSpPr>
+            <a:cxnSpLocks/>
+          </p:cNvCxnSpPr>
+          <p:nvPr/>
+        </p:nvCxnSpPr>
+        <p:spPr>
+          <a:xfrm flipV="1">
+            <a:off x="3786137" y="2948940"/>
+            <a:ext cx="0" cy="3379470"/>
+          </a:xfrm>
+          <a:prstGeom prst="straightConnector1">
+            <a:avLst/>
+          </a:prstGeom>
+          <a:noFill/>
+          <a:ln w="50800" cap="flat">
+            <a:solidFill>
+              <a:schemeClr val="accent1"/>
+            </a:solidFill>
+            <a:prstDash val="solid"/>
+            <a:round/>
+            <a:tailEnd type="triangle"/>
+          </a:ln>
+          <a:effectLst/>
+          <a:sp3d/>
+        </p:spPr>
+        <p:style>
+          <a:lnRef idx="0">
+            <a:scrgbClr r="0" g="0" b="0"/>
+          </a:lnRef>
+          <a:fillRef idx="0">
+            <a:scrgbClr r="0" g="0" b="0"/>
+          </a:fillRef>
+          <a:effectRef idx="0">
+            <a:scrgbClr r="0" g="0" b="0"/>
+          </a:effectRef>
+          <a:fontRef idx="none"/>
+        </p:style>
+      </p:cxnSp>
+      <p:cxnSp>
+        <p:nvCxnSpPr>
+          <p:cNvPr id="16" name="Straight Connector 15">
+            <a:extLst>
+              <a:ext uri="{FF2B5EF4-FFF2-40B4-BE49-F238E27FC236}">
+                <a16:creationId xmlns:a16="http://schemas.microsoft.com/office/drawing/2014/main" id="{B0952240-06A7-9740-AADC-8A362F72307E}"/>
+              </a:ext>
+            </a:extLst>
+          </p:cNvPr>
+          <p:cNvCxnSpPr>
+            <a:cxnSpLocks/>
+          </p:cNvCxnSpPr>
+          <p:nvPr/>
+        </p:nvCxnSpPr>
+        <p:spPr>
+          <a:xfrm>
+            <a:off x="4297680" y="4057650"/>
+            <a:ext cx="502920" cy="240030"/>
+          </a:xfrm>
+          <a:prstGeom prst="line">
+            <a:avLst/>
+          </a:prstGeom>
+          <a:noFill/>
+          <a:ln w="25400" cap="flat">
+            <a:solidFill>
+              <a:schemeClr val="accent1"/>
+            </a:solidFill>
+            <a:prstDash val="solid"/>
+            <a:round/>
+          </a:ln>
+          <a:effectLst/>
+          <a:sp3d/>
+        </p:spPr>
+        <p:style>
+          <a:lnRef idx="0">
+            <a:scrgbClr r="0" g="0" b="0"/>
+          </a:lnRef>
+          <a:fillRef idx="0">
+            <a:scrgbClr r="0" g="0" b="0"/>
+          </a:fillRef>
+          <a:effectRef idx="0">
+            <a:scrgbClr r="0" g="0" b="0"/>
+          </a:effectRef>
+          <a:fontRef idx="none"/>
+        </p:style>
+      </p:cxnSp>
+      <p:cxnSp>
+        <p:nvCxnSpPr>
+          <p:cNvPr id="21" name="Straight Connector 20">
+            <a:extLst>
+              <a:ext uri="{FF2B5EF4-FFF2-40B4-BE49-F238E27FC236}">
+                <a16:creationId xmlns:a16="http://schemas.microsoft.com/office/drawing/2014/main" id="{ED80E296-55A5-5943-B61E-E0180F49E9A0}"/>
+              </a:ext>
+            </a:extLst>
+          </p:cNvPr>
+          <p:cNvCxnSpPr>
+            <a:cxnSpLocks/>
+          </p:cNvCxnSpPr>
+          <p:nvPr/>
+        </p:nvCxnSpPr>
+        <p:spPr>
+          <a:xfrm>
+            <a:off x="4791009" y="4060848"/>
+            <a:ext cx="0" cy="234199"/>
+          </a:xfrm>
+          <a:prstGeom prst="line">
+            <a:avLst/>
+          </a:prstGeom>
+          <a:noFill/>
+          <a:ln w="25400" cap="flat">
+            <a:solidFill>
+              <a:schemeClr val="accent1"/>
+            </a:solidFill>
+            <a:prstDash val="solid"/>
+            <a:round/>
+          </a:ln>
+          <a:effectLst/>
+          <a:sp3d/>
+        </p:spPr>
+        <p:style>
+          <a:lnRef idx="0">
+            <a:scrgbClr r="0" g="0" b="0"/>
+          </a:lnRef>
+          <a:fillRef idx="0">
+            <a:scrgbClr r="0" g="0" b="0"/>
+          </a:fillRef>
+          <a:effectRef idx="0">
+            <a:scrgbClr r="0" g="0" b="0"/>
+          </a:effectRef>
+          <a:fontRef idx="none"/>
+        </p:style>
+      </p:cxnSp>
+      <p:cxnSp>
+        <p:nvCxnSpPr>
+          <p:cNvPr id="23" name="Straight Connector 22">
+            <a:extLst>
+              <a:ext uri="{FF2B5EF4-FFF2-40B4-BE49-F238E27FC236}">
+                <a16:creationId xmlns:a16="http://schemas.microsoft.com/office/drawing/2014/main" id="{3E432D1A-2A7F-324E-9CBA-BCF1B67C573F}"/>
+              </a:ext>
+            </a:extLst>
+          </p:cNvPr>
+          <p:cNvCxnSpPr>
+            <a:cxnSpLocks/>
+          </p:cNvCxnSpPr>
+          <p:nvPr/>
+        </p:nvCxnSpPr>
+        <p:spPr>
+          <a:xfrm>
+            <a:off x="4307165" y="3839175"/>
+            <a:ext cx="0" cy="234199"/>
+          </a:xfrm>
+          <a:prstGeom prst="line">
+            <a:avLst/>
+          </a:prstGeom>
+          <a:noFill/>
+          <a:ln w="25400" cap="flat">
+            <a:solidFill>
+              <a:schemeClr val="accent1"/>
+            </a:solidFill>
+            <a:prstDash val="solid"/>
+            <a:round/>
+          </a:ln>
+          <a:effectLst/>
+          <a:sp3d/>
+        </p:spPr>
+        <p:style>
+          <a:lnRef idx="0">
+            <a:scrgbClr r="0" g="0" b="0"/>
+          </a:lnRef>
+          <a:fillRef idx="0">
+            <a:scrgbClr r="0" g="0" b="0"/>
+          </a:fillRef>
+          <a:effectRef idx="0">
+            <a:scrgbClr r="0" g="0" b="0"/>
+          </a:effectRef>
+          <a:fontRef idx="none"/>
+        </p:style>
+      </p:cxnSp>
+      <p:cxnSp>
+        <p:nvCxnSpPr>
+          <p:cNvPr id="24" name="Straight Connector 23">
+            <a:extLst>
+              <a:ext uri="{FF2B5EF4-FFF2-40B4-BE49-F238E27FC236}">
+                <a16:creationId xmlns:a16="http://schemas.microsoft.com/office/drawing/2014/main" id="{AE27D66E-02D2-9742-A2D5-F5FE980100E5}"/>
+              </a:ext>
+            </a:extLst>
+          </p:cNvPr>
+          <p:cNvCxnSpPr>
+            <a:cxnSpLocks/>
+          </p:cNvCxnSpPr>
+          <p:nvPr/>
+        </p:nvCxnSpPr>
+        <p:spPr>
+          <a:xfrm>
+            <a:off x="4959395" y="4026871"/>
+            <a:ext cx="0" cy="234199"/>
+          </a:xfrm>
+          <a:prstGeom prst="line">
+            <a:avLst/>
+          </a:prstGeom>
+          <a:noFill/>
+          <a:ln w="25400" cap="flat">
+            <a:solidFill>
+              <a:schemeClr val="accent1"/>
+            </a:solidFill>
+            <a:prstDash val="solid"/>
+            <a:round/>
+          </a:ln>
+          <a:effectLst/>
+          <a:sp3d/>
+        </p:spPr>
+        <p:style>
+          <a:lnRef idx="0">
+            <a:scrgbClr r="0" g="0" b="0"/>
+          </a:lnRef>
+          <a:fillRef idx="0">
+            <a:scrgbClr r="0" g="0" b="0"/>
+          </a:fillRef>
+          <a:effectRef idx="0">
+            <a:scrgbClr r="0" g="0" b="0"/>
+          </a:effectRef>
+          <a:fontRef idx="none"/>
+        </p:style>
+      </p:cxnSp>
+      <p:cxnSp>
+        <p:nvCxnSpPr>
+          <p:cNvPr id="25" name="Straight Connector 24">
+            <a:extLst>
+              <a:ext uri="{FF2B5EF4-FFF2-40B4-BE49-F238E27FC236}">
+                <a16:creationId xmlns:a16="http://schemas.microsoft.com/office/drawing/2014/main" id="{43D9862D-A9DD-8648-9000-41E40BC537A7}"/>
+              </a:ext>
+            </a:extLst>
+          </p:cNvPr>
+          <p:cNvCxnSpPr>
+            <a:cxnSpLocks/>
+          </p:cNvCxnSpPr>
+          <p:nvPr/>
+        </p:nvCxnSpPr>
+        <p:spPr>
+          <a:xfrm>
+            <a:off x="4465960" y="3792412"/>
+            <a:ext cx="0" cy="234199"/>
+          </a:xfrm>
+          <a:prstGeom prst="line">
+            <a:avLst/>
+          </a:prstGeom>
+          <a:noFill/>
+          <a:ln w="25400" cap="flat">
+            <a:solidFill>
+              <a:schemeClr val="accent1"/>
+            </a:solidFill>
+            <a:prstDash val="solid"/>
+            <a:round/>
+          </a:ln>
+          <a:effectLst/>
+          <a:sp3d/>
+        </p:spPr>
+        <p:style>
+          <a:lnRef idx="0">
+            <a:scrgbClr r="0" g="0" b="0"/>
+          </a:lnRef>
+          <a:fillRef idx="0">
+            <a:scrgbClr r="0" g="0" b="0"/>
+          </a:fillRef>
+          <a:effectRef idx="0">
+            <a:scrgbClr r="0" g="0" b="0"/>
+          </a:effectRef>
+          <a:fontRef idx="none"/>
+        </p:style>
+      </p:cxnSp>
+      <p:cxnSp>
+        <p:nvCxnSpPr>
+          <p:cNvPr id="26" name="Straight Connector 25">
+            <a:extLst>
+              <a:ext uri="{FF2B5EF4-FFF2-40B4-BE49-F238E27FC236}">
+                <a16:creationId xmlns:a16="http://schemas.microsoft.com/office/drawing/2014/main" id="{0B18C706-F254-0249-A648-FC967E60DD8D}"/>
+              </a:ext>
+            </a:extLst>
+          </p:cNvPr>
+          <p:cNvCxnSpPr>
+            <a:cxnSpLocks/>
+          </p:cNvCxnSpPr>
+          <p:nvPr/>
+        </p:nvCxnSpPr>
+        <p:spPr>
+          <a:xfrm>
+            <a:off x="4296614" y="3835977"/>
+            <a:ext cx="502920" cy="240030"/>
+          </a:xfrm>
+          <a:prstGeom prst="line">
+            <a:avLst/>
+          </a:prstGeom>
+          <a:noFill/>
+          <a:ln w="25400" cap="flat">
+            <a:solidFill>
+              <a:schemeClr val="accent1"/>
+            </a:solidFill>
+            <a:prstDash val="solid"/>
+            <a:round/>
+          </a:ln>
+          <a:effectLst/>
+          <a:sp3d/>
+        </p:spPr>
+        <p:style>
+          <a:lnRef idx="0">
+            <a:scrgbClr r="0" g="0" b="0"/>
+          </a:lnRef>
+          <a:fillRef idx="0">
+            <a:scrgbClr r="0" g="0" b="0"/>
+          </a:fillRef>
+          <a:effectRef idx="0">
+            <a:scrgbClr r="0" g="0" b="0"/>
+          </a:effectRef>
+          <a:fontRef idx="none"/>
+        </p:style>
+      </p:cxnSp>
+      <p:cxnSp>
+        <p:nvCxnSpPr>
+          <p:cNvPr id="27" name="Straight Connector 26">
+            <a:extLst>
+              <a:ext uri="{FF2B5EF4-FFF2-40B4-BE49-F238E27FC236}">
+                <a16:creationId xmlns:a16="http://schemas.microsoft.com/office/drawing/2014/main" id="{DF82A292-25C1-8C45-B371-12DD7B26DABD}"/>
+              </a:ext>
+            </a:extLst>
+          </p:cNvPr>
+          <p:cNvCxnSpPr>
+            <a:cxnSpLocks/>
+          </p:cNvCxnSpPr>
+          <p:nvPr/>
+        </p:nvCxnSpPr>
+        <p:spPr>
+          <a:xfrm>
+            <a:off x="4455409" y="3796545"/>
+            <a:ext cx="502920" cy="240030"/>
+          </a:xfrm>
+          <a:prstGeom prst="line">
+            <a:avLst/>
+          </a:prstGeom>
+          <a:noFill/>
+          <a:ln w="25400" cap="flat">
+            <a:solidFill>
+              <a:schemeClr val="accent1"/>
+            </a:solidFill>
+            <a:prstDash val="solid"/>
+            <a:round/>
+          </a:ln>
+          <a:effectLst/>
+          <a:sp3d/>
+        </p:spPr>
+        <p:style>
+          <a:lnRef idx="0">
+            <a:scrgbClr r="0" g="0" b="0"/>
+          </a:lnRef>
+          <a:fillRef idx="0">
+            <a:scrgbClr r="0" g="0" b="0"/>
+          </a:fillRef>
+          <a:effectRef idx="0">
+            <a:scrgbClr r="0" g="0" b="0"/>
+          </a:effectRef>
+          <a:fontRef idx="none"/>
+        </p:style>
+      </p:cxnSp>
+      <p:cxnSp>
+        <p:nvCxnSpPr>
+          <p:cNvPr id="28" name="Straight Connector 27">
+            <a:extLst>
+              <a:ext uri="{FF2B5EF4-FFF2-40B4-BE49-F238E27FC236}">
+                <a16:creationId xmlns:a16="http://schemas.microsoft.com/office/drawing/2014/main" id="{166C27FD-E220-B84A-8028-C648588A4FD8}"/>
+              </a:ext>
+            </a:extLst>
+          </p:cNvPr>
+          <p:cNvCxnSpPr>
+            <a:cxnSpLocks/>
+          </p:cNvCxnSpPr>
+          <p:nvPr/>
+        </p:nvCxnSpPr>
+        <p:spPr>
+          <a:xfrm>
+            <a:off x="4460738" y="4012889"/>
+            <a:ext cx="502920" cy="240030"/>
+          </a:xfrm>
+          <a:prstGeom prst="line">
+            <a:avLst/>
+          </a:prstGeom>
+          <a:noFill/>
+          <a:ln w="25400" cap="flat">
+            <a:solidFill>
+              <a:schemeClr val="accent1"/>
+            </a:solidFill>
+            <a:prstDash val="solid"/>
+            <a:round/>
+          </a:ln>
+          <a:effectLst/>
+          <a:sp3d/>
+        </p:spPr>
+        <p:style>
+          <a:lnRef idx="0">
+            <a:scrgbClr r="0" g="0" b="0"/>
+          </a:lnRef>
+          <a:fillRef idx="0">
+            <a:scrgbClr r="0" g="0" b="0"/>
+          </a:fillRef>
+          <a:effectRef idx="0">
+            <a:scrgbClr r="0" g="0" b="0"/>
+          </a:effectRef>
+          <a:fontRef idx="none"/>
+        </p:style>
+      </p:cxnSp>
+      <p:cxnSp>
+        <p:nvCxnSpPr>
+          <p:cNvPr id="31" name="Straight Connector 30">
+            <a:extLst>
+              <a:ext uri="{FF2B5EF4-FFF2-40B4-BE49-F238E27FC236}">
+                <a16:creationId xmlns:a16="http://schemas.microsoft.com/office/drawing/2014/main" id="{6D962057-5325-1E4B-B6EC-A4F93FC8A104}"/>
+              </a:ext>
+            </a:extLst>
+          </p:cNvPr>
+          <p:cNvCxnSpPr>
+            <a:cxnSpLocks/>
+          </p:cNvCxnSpPr>
+          <p:nvPr/>
+        </p:nvCxnSpPr>
+        <p:spPr>
+          <a:xfrm flipH="1">
+            <a:off x="4782217" y="4252280"/>
+            <a:ext cx="183039" cy="44749"/>
+          </a:xfrm>
+          <a:prstGeom prst="line">
+            <a:avLst/>
+          </a:prstGeom>
+          <a:noFill/>
+          <a:ln w="25400" cap="flat">
+            <a:solidFill>
+              <a:schemeClr val="accent1"/>
+            </a:solidFill>
+            <a:prstDash val="solid"/>
+            <a:round/>
+          </a:ln>
+          <a:effectLst/>
+          <a:sp3d/>
+        </p:spPr>
+        <p:style>
+          <a:lnRef idx="0">
+            <a:scrgbClr r="0" g="0" b="0"/>
+          </a:lnRef>
+          <a:fillRef idx="0">
+            <a:scrgbClr r="0" g="0" b="0"/>
+          </a:fillRef>
+          <a:effectRef idx="0">
+            <a:scrgbClr r="0" g="0" b="0"/>
+          </a:effectRef>
+          <a:fontRef idx="none"/>
+        </p:style>
+      </p:cxnSp>
+      <p:cxnSp>
+        <p:nvCxnSpPr>
+          <p:cNvPr id="35" name="Straight Connector 34">
+            <a:extLst>
+              <a:ext uri="{FF2B5EF4-FFF2-40B4-BE49-F238E27FC236}">
+                <a16:creationId xmlns:a16="http://schemas.microsoft.com/office/drawing/2014/main" id="{31549B4B-2988-794F-B86D-390160BF15D7}"/>
+              </a:ext>
+            </a:extLst>
+          </p:cNvPr>
+          <p:cNvCxnSpPr>
+            <a:cxnSpLocks/>
+          </p:cNvCxnSpPr>
+          <p:nvPr/>
+        </p:nvCxnSpPr>
+        <p:spPr>
+          <a:xfrm flipH="1">
+            <a:off x="4785948" y="4033917"/>
+            <a:ext cx="183039" cy="44749"/>
+          </a:xfrm>
+          <a:prstGeom prst="line">
+            <a:avLst/>
+          </a:prstGeom>
+          <a:noFill/>
+          <a:ln w="25400" cap="flat">
+            <a:solidFill>
+              <a:schemeClr val="accent1"/>
+            </a:solidFill>
+            <a:prstDash val="solid"/>
+            <a:round/>
+          </a:ln>
+          <a:effectLst/>
+          <a:sp3d/>
+        </p:spPr>
+        <p:style>
+          <a:lnRef idx="0">
+            <a:scrgbClr r="0" g="0" b="0"/>
+          </a:lnRef>
+          <a:fillRef idx="0">
+            <a:scrgbClr r="0" g="0" b="0"/>
+          </a:fillRef>
+          <a:effectRef idx="0">
+            <a:scrgbClr r="0" g="0" b="0"/>
+          </a:effectRef>
+          <a:fontRef idx="none"/>
+        </p:style>
+      </p:cxnSp>
+      <p:cxnSp>
+        <p:nvCxnSpPr>
+          <p:cNvPr id="36" name="Straight Connector 35">
+            <a:extLst>
+              <a:ext uri="{FF2B5EF4-FFF2-40B4-BE49-F238E27FC236}">
+                <a16:creationId xmlns:a16="http://schemas.microsoft.com/office/drawing/2014/main" id="{46F49748-A9A6-6C4A-AB48-4C8CA0069B62}"/>
+              </a:ext>
+            </a:extLst>
+          </p:cNvPr>
+          <p:cNvCxnSpPr>
+            <a:cxnSpLocks/>
+          </p:cNvCxnSpPr>
+          <p:nvPr/>
+        </p:nvCxnSpPr>
+        <p:spPr>
+          <a:xfrm flipH="1">
+            <a:off x="4295710" y="3799456"/>
+            <a:ext cx="183039" cy="44749"/>
+          </a:xfrm>
+          <a:prstGeom prst="line">
+            <a:avLst/>
+          </a:prstGeom>
+          <a:noFill/>
+          <a:ln w="25400" cap="flat">
+            <a:solidFill>
+              <a:schemeClr val="accent1"/>
+            </a:solidFill>
+            <a:prstDash val="solid"/>
+            <a:round/>
+          </a:ln>
+          <a:effectLst/>
+          <a:sp3d/>
+        </p:spPr>
+        <p:style>
+          <a:lnRef idx="0">
+            <a:scrgbClr r="0" g="0" b="0"/>
+          </a:lnRef>
+          <a:fillRef idx="0">
+            <a:scrgbClr r="0" g="0" b="0"/>
+          </a:fillRef>
+          <a:effectRef idx="0">
+            <a:scrgbClr r="0" g="0" b="0"/>
+          </a:effectRef>
+          <a:fontRef idx="none"/>
+        </p:style>
+      </p:cxnSp>
+      <p:cxnSp>
+        <p:nvCxnSpPr>
+          <p:cNvPr id="37" name="Straight Connector 36">
+            <a:extLst>
+              <a:ext uri="{FF2B5EF4-FFF2-40B4-BE49-F238E27FC236}">
+                <a16:creationId xmlns:a16="http://schemas.microsoft.com/office/drawing/2014/main" id="{2725606E-3E81-C248-8AC8-AF1B513A4B15}"/>
+              </a:ext>
+            </a:extLst>
+          </p:cNvPr>
+          <p:cNvCxnSpPr>
+            <a:cxnSpLocks/>
+          </p:cNvCxnSpPr>
+          <p:nvPr/>
+        </p:nvCxnSpPr>
+        <p:spPr>
+          <a:xfrm flipH="1">
+            <a:off x="4301039" y="4012603"/>
+            <a:ext cx="183039" cy="44749"/>
+          </a:xfrm>
+          <a:prstGeom prst="line">
+            <a:avLst/>
+          </a:prstGeom>
+          <a:noFill/>
+          <a:ln w="25400" cap="flat">
+            <a:solidFill>
+              <a:schemeClr val="accent1"/>
+            </a:solidFill>
+            <a:prstDash val="solid"/>
+            <a:round/>
+          </a:ln>
+          <a:effectLst/>
+          <a:sp3d/>
+        </p:spPr>
+        <p:style>
+          <a:lnRef idx="0">
+            <a:scrgbClr r="0" g="0" b="0"/>
+          </a:lnRef>
+          <a:fillRef idx="0">
+            <a:scrgbClr r="0" g="0" b="0"/>
+          </a:fillRef>
+          <a:effectRef idx="0">
+            <a:scrgbClr r="0" g="0" b="0"/>
+          </a:effectRef>
+          <a:fontRef idx="none"/>
+        </p:style>
+      </p:cxnSp>
+      <p:sp>
+        <p:nvSpPr>
+          <p:cNvPr id="38" name="TextBox 37">
+            <a:extLst>
+              <a:ext uri="{FF2B5EF4-FFF2-40B4-BE49-F238E27FC236}">
+                <a16:creationId xmlns:a16="http://schemas.microsoft.com/office/drawing/2014/main" id="{2D0555A9-3695-1B48-9AB3-61EDB11D820D}"/>
+              </a:ext>
+            </a:extLst>
+          </p:cNvPr>
+          <p:cNvSpPr txBox="1"/>
+          <p:nvPr/>
+        </p:nvSpPr>
+        <p:spPr>
+          <a:xfrm>
+            <a:off x="8241278" y="4528759"/>
+            <a:ext cx="672777" cy="577081"/>
+          </a:xfrm>
+          <a:prstGeom prst="rect">
+            <a:avLst/>
+          </a:prstGeom>
+          <a:noFill/>
+          <a:ln w="12700" cap="flat">
+            <a:noFill/>
+            <a:miter lim="400000"/>
+          </a:ln>
+          <a:effectLst/>
+          <a:sp3d/>
+        </p:spPr>
+        <p:style>
+          <a:lnRef idx="0">
+            <a:scrgbClr r="0" g="0" b="0"/>
+          </a:lnRef>
+          <a:fillRef idx="0">
+            <a:scrgbClr r="0" g="0" b="0"/>
+          </a:fillRef>
+          <a:effectRef idx="0">
+            <a:scrgbClr r="0" g="0" b="0"/>
+          </a:effectRef>
+          <a:fontRef idx="none"/>
+        </p:style>
+        <p:txBody>
+          <a:bodyPr rot="0" spcFirstLastPara="1" vertOverflow="overflow" horzOverflow="overflow" vert="horz" wrap="square" lIns="0" tIns="0" rIns="0" bIns="0" numCol="1" spcCol="38100" rtlCol="0" anchor="t">
+            <a:spAutoFit/>
+          </a:bodyPr>
+          <a:lstStyle/>
+          <a:p>
+            <a:pPr marL="0" marR="0" indent="0" algn="l" defTabSz="914400" rtl="0" fontAlgn="auto" latinLnBrk="0" hangingPunct="0">
+              <a:lnSpc>
+                <a:spcPct val="100000"/>
+              </a:lnSpc>
+              <a:spcBef>
+                <a:spcPts val="900"/>
+              </a:spcBef>
+              <a:spcAft>
+                <a:spcPts val="0"/>
+              </a:spcAft>
+              <a:buClrTx/>
+              <a:buSzTx/>
+              <a:buFontTx/>
+              <a:buNone/>
+              <a:tabLst/>
+            </a:pPr>
+            <a:r>
+              <a:rPr kumimoji="0" lang="da-DK" sz="3000" b="0" i="0" u="none" strike="noStrike" cap="none" spc="0" normalizeH="0" dirty="0" err="1">
+                <a:ln>
+                  <a:noFill/>
+                </a:ln>
+                <a:solidFill>
+                  <a:srgbClr val="000000"/>
+                </a:solidFill>
+                <a:effectLst/>
+                <a:uFillTx/>
+                <a:latin typeface="+mn-lt"/>
+                <a:ea typeface="+mn-ea"/>
+                <a:cs typeface="+mn-cs"/>
+                <a:sym typeface="Arial"/>
+              </a:rPr>
+              <a:t>q</a:t>
+            </a:r>
+            <a:r>
+              <a:rPr kumimoji="0" lang="da-DK" sz="3000" b="0" i="0" u="none" strike="noStrike" cap="none" spc="0" normalizeH="0" baseline="-25000" dirty="0" err="1">
+                <a:ln>
+                  <a:noFill/>
+                </a:ln>
+                <a:solidFill>
+                  <a:srgbClr val="000000"/>
+                </a:solidFill>
+                <a:effectLst/>
+                <a:uFillTx/>
+                <a:latin typeface="+mn-lt"/>
+                <a:ea typeface="+mn-ea"/>
+                <a:cs typeface="+mn-cs"/>
+                <a:sym typeface="Arial"/>
+              </a:rPr>
+              <a:t>z</a:t>
+            </a:r>
+            <a:endParaRPr kumimoji="0" lang="da-DK" sz="3000" b="0" i="0" u="none" strike="noStrike" cap="none" spc="0" normalizeH="0" baseline="-25000" dirty="0">
+              <a:ln>
+                <a:noFill/>
+              </a:ln>
+              <a:solidFill>
+                <a:srgbClr val="000000"/>
+              </a:solidFill>
+              <a:effectLst/>
+              <a:uFillTx/>
+              <a:latin typeface="+mn-lt"/>
+              <a:ea typeface="+mn-ea"/>
+              <a:cs typeface="+mn-cs"/>
+              <a:sym typeface="Arial"/>
+            </a:endParaRPr>
+          </a:p>
+        </p:txBody>
+      </p:sp>
+      <p:sp>
+        <p:nvSpPr>
+          <p:cNvPr id="39" name="TextBox 38">
+            <a:extLst>
+              <a:ext uri="{FF2B5EF4-FFF2-40B4-BE49-F238E27FC236}">
+                <a16:creationId xmlns:a16="http://schemas.microsoft.com/office/drawing/2014/main" id="{D630AFF0-CB5F-AB4E-9B0A-91B2663BA335}"/>
+              </a:ext>
+            </a:extLst>
+          </p:cNvPr>
+          <p:cNvSpPr txBox="1"/>
+          <p:nvPr/>
+        </p:nvSpPr>
+        <p:spPr>
+          <a:xfrm>
+            <a:off x="1837010" y="3595462"/>
+            <a:ext cx="672777" cy="577081"/>
+          </a:xfrm>
+          <a:prstGeom prst="rect">
+            <a:avLst/>
+          </a:prstGeom>
+          <a:noFill/>
+          <a:ln w="12700" cap="flat">
+            <a:noFill/>
+            <a:miter lim="400000"/>
+          </a:ln>
+          <a:effectLst/>
+          <a:sp3d/>
+        </p:spPr>
+        <p:style>
+          <a:lnRef idx="0">
+            <a:scrgbClr r="0" g="0" b="0"/>
+          </a:lnRef>
+          <a:fillRef idx="0">
+            <a:scrgbClr r="0" g="0" b="0"/>
+          </a:fillRef>
+          <a:effectRef idx="0">
+            <a:scrgbClr r="0" g="0" b="0"/>
+          </a:effectRef>
+          <a:fontRef idx="none"/>
+        </p:style>
+        <p:txBody>
+          <a:bodyPr rot="0" spcFirstLastPara="1" vertOverflow="overflow" horzOverflow="overflow" vert="horz" wrap="square" lIns="0" tIns="0" rIns="0" bIns="0" numCol="1" spcCol="38100" rtlCol="0" anchor="t">
+            <a:spAutoFit/>
+          </a:bodyPr>
+          <a:lstStyle/>
+          <a:p>
+            <a:pPr marL="0" marR="0" indent="0" algn="l" defTabSz="914400" rtl="0" fontAlgn="auto" latinLnBrk="0" hangingPunct="0">
+              <a:lnSpc>
+                <a:spcPct val="100000"/>
+              </a:lnSpc>
+              <a:spcBef>
+                <a:spcPts val="900"/>
+              </a:spcBef>
+              <a:spcAft>
+                <a:spcPts val="0"/>
+              </a:spcAft>
+              <a:buClrTx/>
+              <a:buSzTx/>
+              <a:buFontTx/>
+              <a:buNone/>
+              <a:tabLst/>
+            </a:pPr>
+            <a:r>
+              <a:rPr kumimoji="0" lang="da-DK" sz="3000" b="0" i="0" u="none" strike="noStrike" cap="none" spc="0" normalizeH="0" dirty="0" err="1">
+                <a:ln>
+                  <a:noFill/>
+                </a:ln>
+                <a:solidFill>
+                  <a:srgbClr val="000000"/>
+                </a:solidFill>
+                <a:effectLst/>
+                <a:uFillTx/>
+                <a:latin typeface="+mn-lt"/>
+                <a:ea typeface="+mn-ea"/>
+                <a:cs typeface="+mn-cs"/>
+                <a:sym typeface="Arial"/>
+              </a:rPr>
+              <a:t>q</a:t>
+            </a:r>
+            <a:r>
+              <a:rPr lang="da-DK" sz="3000" baseline="-25000" dirty="0" err="1"/>
+              <a:t>x</a:t>
+            </a:r>
+            <a:endParaRPr kumimoji="0" lang="da-DK" sz="3000" b="0" i="0" u="none" strike="noStrike" cap="none" spc="0" normalizeH="0" baseline="-25000" dirty="0">
+              <a:ln>
+                <a:noFill/>
+              </a:ln>
+              <a:solidFill>
+                <a:srgbClr val="000000"/>
+              </a:solidFill>
+              <a:effectLst/>
+              <a:uFillTx/>
+              <a:latin typeface="+mn-lt"/>
+              <a:ea typeface="+mn-ea"/>
+              <a:cs typeface="+mn-cs"/>
+              <a:sym typeface="Arial"/>
+            </a:endParaRPr>
+          </a:p>
+        </p:txBody>
+      </p:sp>
+      <p:sp>
+        <p:nvSpPr>
+          <p:cNvPr id="40" name="TextBox 39">
+            <a:extLst>
+              <a:ext uri="{FF2B5EF4-FFF2-40B4-BE49-F238E27FC236}">
+                <a16:creationId xmlns:a16="http://schemas.microsoft.com/office/drawing/2014/main" id="{DF4C6F6D-C248-FE4D-8792-B22DA0894CA8}"/>
+              </a:ext>
+            </a:extLst>
+          </p:cNvPr>
+          <p:cNvSpPr txBox="1"/>
+          <p:nvPr/>
+        </p:nvSpPr>
+        <p:spPr>
+          <a:xfrm>
+            <a:off x="3269570" y="2641385"/>
+            <a:ext cx="672777" cy="577081"/>
+          </a:xfrm>
+          <a:prstGeom prst="rect">
+            <a:avLst/>
+          </a:prstGeom>
+          <a:noFill/>
+          <a:ln w="12700" cap="flat">
+            <a:noFill/>
+            <a:miter lim="400000"/>
+          </a:ln>
+          <a:effectLst/>
+          <a:sp3d/>
+        </p:spPr>
+        <p:style>
+          <a:lnRef idx="0">
+            <a:scrgbClr r="0" g="0" b="0"/>
+          </a:lnRef>
+          <a:fillRef idx="0">
+            <a:scrgbClr r="0" g="0" b="0"/>
+          </a:fillRef>
+          <a:effectRef idx="0">
+            <a:scrgbClr r="0" g="0" b="0"/>
+          </a:effectRef>
+          <a:fontRef idx="none"/>
+        </p:style>
+        <p:txBody>
+          <a:bodyPr rot="0" spcFirstLastPara="1" vertOverflow="overflow" horzOverflow="overflow" vert="horz" wrap="square" lIns="0" tIns="0" rIns="0" bIns="0" numCol="1" spcCol="38100" rtlCol="0" anchor="t">
+            <a:spAutoFit/>
+          </a:bodyPr>
+          <a:lstStyle/>
+          <a:p>
+            <a:pPr marL="0" marR="0" indent="0" algn="l" defTabSz="914400" rtl="0" fontAlgn="auto" latinLnBrk="0" hangingPunct="0">
+              <a:lnSpc>
+                <a:spcPct val="100000"/>
+              </a:lnSpc>
+              <a:spcBef>
+                <a:spcPts val="900"/>
+              </a:spcBef>
+              <a:spcAft>
+                <a:spcPts val="0"/>
+              </a:spcAft>
+              <a:buClrTx/>
+              <a:buSzTx/>
+              <a:buFontTx/>
+              <a:buNone/>
+              <a:tabLst/>
+            </a:pPr>
+            <a:r>
+              <a:rPr kumimoji="0" lang="da-DK" sz="3000" b="0" i="0" u="none" strike="noStrike" cap="none" spc="0" normalizeH="0" dirty="0" err="1">
+                <a:ln>
+                  <a:noFill/>
+                </a:ln>
+                <a:solidFill>
+                  <a:srgbClr val="000000"/>
+                </a:solidFill>
+                <a:effectLst/>
+                <a:uFillTx/>
+                <a:latin typeface="+mn-lt"/>
+                <a:ea typeface="+mn-ea"/>
+                <a:cs typeface="+mn-cs"/>
+                <a:sym typeface="Arial"/>
+              </a:rPr>
+              <a:t>q</a:t>
+            </a:r>
+            <a:r>
+              <a:rPr lang="da-DK" sz="3000" baseline="-25000" dirty="0" err="1"/>
+              <a:t>y</a:t>
+            </a:r>
+            <a:endParaRPr kumimoji="0" lang="da-DK" sz="3000" b="0" i="0" u="none" strike="noStrike" cap="none" spc="0" normalizeH="0" baseline="-25000" dirty="0">
+              <a:ln>
+                <a:noFill/>
+              </a:ln>
+              <a:solidFill>
+                <a:srgbClr val="000000"/>
+              </a:solidFill>
+              <a:effectLst/>
+              <a:uFillTx/>
+              <a:latin typeface="+mn-lt"/>
+              <a:ea typeface="+mn-ea"/>
+              <a:cs typeface="+mn-cs"/>
+              <a:sym typeface="Arial"/>
+            </a:endParaRPr>
+          </a:p>
+        </p:txBody>
+      </p:sp>
+      <p:sp>
+        <p:nvSpPr>
+          <p:cNvPr id="41" name="TextBox 40">
+            <a:extLst>
+              <a:ext uri="{FF2B5EF4-FFF2-40B4-BE49-F238E27FC236}">
+                <a16:creationId xmlns:a16="http://schemas.microsoft.com/office/drawing/2014/main" id="{4C3E462C-91B2-B040-9628-E488B0DBD2DE}"/>
+              </a:ext>
+            </a:extLst>
+          </p:cNvPr>
+          <p:cNvSpPr txBox="1"/>
+          <p:nvPr/>
+        </p:nvSpPr>
+        <p:spPr>
+          <a:xfrm>
+            <a:off x="9223269" y="3395406"/>
+            <a:ext cx="2373478" cy="977191"/>
+          </a:xfrm>
+          <a:prstGeom prst="rect">
+            <a:avLst/>
+          </a:prstGeom>
+          <a:noFill/>
+          <a:ln w="12700" cap="flat">
+            <a:noFill/>
+            <a:miter lim="400000"/>
+          </a:ln>
+          <a:effectLst/>
+          <a:sp3d/>
+        </p:spPr>
+        <p:style>
+          <a:lnRef idx="0">
+            <a:scrgbClr r="0" g="0" b="0"/>
+          </a:lnRef>
+          <a:fillRef idx="0">
+            <a:scrgbClr r="0" g="0" b="0"/>
+          </a:fillRef>
+          <a:effectRef idx="0">
+            <a:scrgbClr r="0" g="0" b="0"/>
+          </a:effectRef>
+          <a:fontRef idx="none"/>
+        </p:style>
+        <p:txBody>
+          <a:bodyPr rot="0" spcFirstLastPara="1" vertOverflow="overflow" horzOverflow="overflow" vert="horz" wrap="square" lIns="0" tIns="0" rIns="0" bIns="0" numCol="1" spcCol="38100" rtlCol="0" anchor="t">
+            <a:spAutoFit/>
+          </a:bodyPr>
+          <a:lstStyle/>
+          <a:p>
+            <a:pPr marL="0" marR="0" indent="0" algn="l" defTabSz="914400" rtl="0" fontAlgn="auto" latinLnBrk="0" hangingPunct="0">
+              <a:lnSpc>
+                <a:spcPct val="100000"/>
+              </a:lnSpc>
+              <a:spcBef>
+                <a:spcPts val="900"/>
+              </a:spcBef>
+              <a:spcAft>
+                <a:spcPts val="0"/>
+              </a:spcAft>
+              <a:buClrTx/>
+              <a:buSzTx/>
+              <a:buFontTx/>
+              <a:buNone/>
+              <a:tabLst/>
+            </a:pPr>
+            <a:r>
+              <a:rPr kumimoji="0" lang="da-DK" sz="3000" b="0" i="0" u="none" strike="noStrike" cap="none" spc="0" normalizeH="0" baseline="0" dirty="0">
+                <a:ln>
+                  <a:noFill/>
+                </a:ln>
+                <a:solidFill>
+                  <a:srgbClr val="000000"/>
+                </a:solidFill>
+                <a:effectLst/>
+                <a:uFillTx/>
+                <a:latin typeface="+mn-lt"/>
+                <a:ea typeface="+mn-ea"/>
+                <a:cs typeface="+mn-cs"/>
+                <a:sym typeface="Arial"/>
+              </a:rPr>
+              <a:t>+</a:t>
+            </a:r>
+            <a:r>
+              <a:rPr kumimoji="0" lang="da-DK" sz="5600" b="0" i="0" u="none" strike="noStrike" cap="none" spc="0" normalizeH="0" baseline="0" dirty="0">
+                <a:ln>
+                  <a:noFill/>
+                </a:ln>
+                <a:solidFill>
+                  <a:srgbClr val="000000"/>
+                </a:solidFill>
+                <a:effectLst/>
+                <a:uFillTx/>
+                <a:latin typeface="+mn-lt"/>
+                <a:ea typeface="+mn-ea"/>
+                <a:cs typeface="+mn-cs"/>
+                <a:sym typeface="Arial"/>
+              </a:rPr>
+              <a:t>⍵</a:t>
+            </a:r>
           </a:p>
         </p:txBody>
       </p:sp>

</xml_diff>

<commit_message>
Reorganized the inelastic talk
</commit_message>
<xml_diff>
--- a/CSNS_March_2019/4_Thursday_March_28th/5_inelastic_scattering/inelastic_scattering.pptx
+++ b/CSNS_March_2019/4_Thursday_March_28th/5_inelastic_scattering/inelastic_scattering.pptx
@@ -11,13 +11,13 @@
     <p:sldId id="256" r:id="rId2"/>
     <p:sldId id="257" r:id="rId3"/>
     <p:sldId id="265" r:id="rId4"/>
-    <p:sldId id="266" r:id="rId5"/>
-    <p:sldId id="267" r:id="rId6"/>
-    <p:sldId id="268" r:id="rId7"/>
-    <p:sldId id="276" r:id="rId8"/>
-    <p:sldId id="269" r:id="rId9"/>
-    <p:sldId id="277" r:id="rId10"/>
-    <p:sldId id="273" r:id="rId11"/>
+    <p:sldId id="267" r:id="rId5"/>
+    <p:sldId id="268" r:id="rId6"/>
+    <p:sldId id="276" r:id="rId7"/>
+    <p:sldId id="269" r:id="rId8"/>
+    <p:sldId id="277" r:id="rId9"/>
+    <p:sldId id="273" r:id="rId10"/>
+    <p:sldId id="266" r:id="rId11"/>
     <p:sldId id="271" r:id="rId12"/>
     <p:sldId id="272" r:id="rId13"/>
     <p:sldId id="274" r:id="rId14"/>
@@ -1205,7 +1205,7 @@
           </a:ln>
           <a:extLst>
             <a:ext uri="{C572A759-6A51-4108-AA02-DFA0A04FC94B}">
-              <ma14:wrappingTextBoxFlag xmlns:ma14="http://schemas.microsoft.com/office/mac/drawingml/2011/main" xmlns:a14="http://schemas.microsoft.com/office/drawing/2010/main" xmlns:m="http://schemas.openxmlformats.org/officeDocument/2006/math" xmlns="" val="1"/>
+              <ma14:wrappingTextBoxFlag xmlns="" xmlns:m="http://schemas.openxmlformats.org/officeDocument/2006/math" xmlns:a14="http://schemas.microsoft.com/office/drawing/2010/main" xmlns:ma14="http://schemas.microsoft.com/office/mac/drawingml/2011/main" val="1"/>
             </a:ext>
           </a:extLst>
         </p:spPr>
@@ -1251,7 +1251,7 @@
           </a:ln>
           <a:extLst>
             <a:ext uri="{C572A759-6A51-4108-AA02-DFA0A04FC94B}">
-              <ma14:wrappingTextBoxFlag xmlns:ma14="http://schemas.microsoft.com/office/mac/drawingml/2011/main" xmlns:a14="http://schemas.microsoft.com/office/drawing/2010/main" xmlns:m="http://schemas.openxmlformats.org/officeDocument/2006/math" xmlns="" val="1"/>
+              <ma14:wrappingTextBoxFlag xmlns="" xmlns:m="http://schemas.openxmlformats.org/officeDocument/2006/math" xmlns:a14="http://schemas.microsoft.com/office/drawing/2010/main" xmlns:ma14="http://schemas.microsoft.com/office/mac/drawingml/2011/main" val="1"/>
             </a:ext>
           </a:extLst>
         </p:spPr>
@@ -2239,7 +2239,7 @@
             <a:effectLst/>
             <a:extLst>
               <a:ext uri="{C572A759-6A51-4108-AA02-DFA0A04FC94B}">
-                <ma14:wrappingTextBoxFlag xmlns:ma14="http://schemas.microsoft.com/office/mac/drawingml/2011/main" xmlns:a14="http://schemas.microsoft.com/office/drawing/2010/main" xmlns:m="http://schemas.openxmlformats.org/officeDocument/2006/math" xmlns="" val="1"/>
+                <ma14:wrappingTextBoxFlag xmlns="" xmlns:m="http://schemas.openxmlformats.org/officeDocument/2006/math" xmlns:a14="http://schemas.microsoft.com/office/drawing/2010/main" xmlns:ma14="http://schemas.microsoft.com/office/mac/drawingml/2011/main" val="1"/>
               </a:ext>
             </a:extLst>
           </p:spPr>
@@ -2837,7 +2837,7 @@
           </a:ln>
           <a:extLst>
             <a:ext uri="{C572A759-6A51-4108-AA02-DFA0A04FC94B}">
-              <ma14:wrappingTextBoxFlag xmlns:ma14="http://schemas.microsoft.com/office/mac/drawingml/2011/main" xmlns:a14="http://schemas.microsoft.com/office/drawing/2010/main" xmlns:m="http://schemas.openxmlformats.org/officeDocument/2006/math" xmlns="" val="1"/>
+              <ma14:wrappingTextBoxFlag xmlns="" xmlns:m="http://schemas.openxmlformats.org/officeDocument/2006/math" xmlns:a14="http://schemas.microsoft.com/office/drawing/2010/main" xmlns:ma14="http://schemas.microsoft.com/office/mac/drawingml/2011/main" val="1"/>
             </a:ext>
           </a:extLst>
         </p:spPr>
@@ -2883,7 +2883,7 @@
           </a:ln>
           <a:extLst>
             <a:ext uri="{C572A759-6A51-4108-AA02-DFA0A04FC94B}">
-              <ma14:wrappingTextBoxFlag xmlns:ma14="http://schemas.microsoft.com/office/mac/drawingml/2011/main" xmlns:a14="http://schemas.microsoft.com/office/drawing/2010/main" xmlns:m="http://schemas.openxmlformats.org/officeDocument/2006/math" xmlns="" val="1"/>
+              <ma14:wrappingTextBoxFlag xmlns="" xmlns:m="http://schemas.openxmlformats.org/officeDocument/2006/math" xmlns:a14="http://schemas.microsoft.com/office/drawing/2010/main" xmlns:ma14="http://schemas.microsoft.com/office/mac/drawingml/2011/main" val="1"/>
             </a:ext>
           </a:extLst>
         </p:spPr>
@@ -3787,7 +3787,7 @@
             <a:effectLst/>
             <a:extLst>
               <a:ext uri="{C572A759-6A51-4108-AA02-DFA0A04FC94B}">
-                <ma14:wrappingTextBoxFlag xmlns:ma14="http://schemas.microsoft.com/office/mac/drawingml/2011/main" xmlns:a14="http://schemas.microsoft.com/office/drawing/2010/main" xmlns:m="http://schemas.openxmlformats.org/officeDocument/2006/math" xmlns="" val="1"/>
+                <ma14:wrappingTextBoxFlag xmlns="" xmlns:m="http://schemas.openxmlformats.org/officeDocument/2006/math" xmlns:a14="http://schemas.microsoft.com/office/drawing/2010/main" xmlns:ma14="http://schemas.microsoft.com/office/mac/drawingml/2011/main" val="1"/>
               </a:ext>
             </a:extLst>
           </p:spPr>
@@ -4422,7 +4422,7 @@
           </a:ln>
           <a:extLst>
             <a:ext uri="{C572A759-6A51-4108-AA02-DFA0A04FC94B}">
-              <ma14:wrappingTextBoxFlag xmlns:ma14="http://schemas.microsoft.com/office/mac/drawingml/2011/main" xmlns:a14="http://schemas.microsoft.com/office/drawing/2010/main" xmlns:m="http://schemas.openxmlformats.org/officeDocument/2006/math" xmlns="" val="1"/>
+              <ma14:wrappingTextBoxFlag xmlns="" xmlns:m="http://schemas.openxmlformats.org/officeDocument/2006/math" xmlns:a14="http://schemas.microsoft.com/office/drawing/2010/main" xmlns:ma14="http://schemas.microsoft.com/office/mac/drawingml/2011/main" val="1"/>
             </a:ext>
           </a:extLst>
         </p:spPr>
@@ -4468,7 +4468,7 @@
           </a:ln>
           <a:extLst>
             <a:ext uri="{C572A759-6A51-4108-AA02-DFA0A04FC94B}">
-              <ma14:wrappingTextBoxFlag xmlns:ma14="http://schemas.microsoft.com/office/mac/drawingml/2011/main" xmlns:a14="http://schemas.microsoft.com/office/drawing/2010/main" xmlns:m="http://schemas.openxmlformats.org/officeDocument/2006/math" xmlns="" val="1"/>
+              <ma14:wrappingTextBoxFlag xmlns="" xmlns:m="http://schemas.openxmlformats.org/officeDocument/2006/math" xmlns:a14="http://schemas.microsoft.com/office/drawing/2010/main" xmlns:ma14="http://schemas.microsoft.com/office/mac/drawingml/2011/main" val="1"/>
             </a:ext>
           </a:extLst>
         </p:spPr>
@@ -5335,7 +5335,7 @@
             <a:effectLst/>
             <a:extLst>
               <a:ext uri="{C572A759-6A51-4108-AA02-DFA0A04FC94B}">
-                <ma14:wrappingTextBoxFlag xmlns:ma14="http://schemas.microsoft.com/office/mac/drawingml/2011/main" xmlns:a14="http://schemas.microsoft.com/office/drawing/2010/main" xmlns:m="http://schemas.openxmlformats.org/officeDocument/2006/math" xmlns="" val="1"/>
+                <ma14:wrappingTextBoxFlag xmlns="" xmlns:m="http://schemas.openxmlformats.org/officeDocument/2006/math" xmlns:a14="http://schemas.microsoft.com/office/drawing/2010/main" xmlns:ma14="http://schemas.microsoft.com/office/mac/drawingml/2011/main" val="1"/>
               </a:ext>
             </a:extLst>
           </p:spPr>
@@ -5388,7 +5388,7 @@
           </a:ln>
           <a:extLst>
             <a:ext uri="{C572A759-6A51-4108-AA02-DFA0A04FC94B}">
-              <ma14:wrappingTextBoxFlag xmlns:ma14="http://schemas.microsoft.com/office/mac/drawingml/2011/main" xmlns:a14="http://schemas.microsoft.com/office/drawing/2010/main" xmlns:m="http://schemas.openxmlformats.org/officeDocument/2006/math" xmlns="" val="1"/>
+              <ma14:wrappingTextBoxFlag xmlns="" xmlns:m="http://schemas.openxmlformats.org/officeDocument/2006/math" xmlns:a14="http://schemas.microsoft.com/office/drawing/2010/main" xmlns:ma14="http://schemas.microsoft.com/office/mac/drawingml/2011/main" val="1"/>
             </a:ext>
           </a:extLst>
         </p:spPr>
@@ -5425,7 +5425,7 @@
           </a:ln>
           <a:extLst>
             <a:ext uri="{C572A759-6A51-4108-AA02-DFA0A04FC94B}">
-              <ma14:wrappingTextBoxFlag xmlns:ma14="http://schemas.microsoft.com/office/mac/drawingml/2011/main" xmlns:a14="http://schemas.microsoft.com/office/drawing/2010/main" xmlns:m="http://schemas.openxmlformats.org/officeDocument/2006/math" xmlns="" val="1"/>
+              <ma14:wrappingTextBoxFlag xmlns="" xmlns:m="http://schemas.openxmlformats.org/officeDocument/2006/math" xmlns:a14="http://schemas.microsoft.com/office/drawing/2010/main" xmlns:ma14="http://schemas.microsoft.com/office/mac/drawingml/2011/main" val="1"/>
             </a:ext>
           </a:extLst>
         </p:spPr>
@@ -6368,7 +6368,7 @@
           </a:prstGeom>
           <a:extLst>
             <a:ext uri="{C572A759-6A51-4108-AA02-DFA0A04FC94B}">
-              <ma14:wrappingTextBoxFlag xmlns:ma14="http://schemas.microsoft.com/office/mac/drawingml/2011/main" xmlns:a14="http://schemas.microsoft.com/office/drawing/2010/main" xmlns:m="http://schemas.openxmlformats.org/officeDocument/2006/math" xmlns="" val="1"/>
+              <ma14:wrappingTextBoxFlag xmlns="" xmlns:m="http://schemas.openxmlformats.org/officeDocument/2006/math" xmlns:a14="http://schemas.microsoft.com/office/drawing/2010/main" xmlns:ma14="http://schemas.microsoft.com/office/mac/drawingml/2011/main" val="1"/>
             </a:ext>
           </a:extLst>
         </p:spPr>
@@ -6434,15 +6434,23 @@
           <a:p>
             <a:r>
               <a:rPr lang="da-DK" dirty="0" err="1"/>
-              <a:t>Popular</a:t>
+              <a:t>Inelastic</a:t>
             </a:r>
             <a:r>
               <a:rPr lang="da-DK" dirty="0"/>
-              <a:t> component: </a:t>
+              <a:t> </a:t>
             </a:r>
             <a:r>
               <a:rPr lang="da-DK" dirty="0" err="1"/>
-              <a:t>Isotropic_sqw</a:t>
+              <a:t>scattering</a:t>
+            </a:r>
+            <a:r>
+              <a:rPr lang="da-DK" dirty="0"/>
+              <a:t> in </a:t>
+            </a:r>
+            <a:r>
+              <a:rPr lang="da-DK" dirty="0" err="1"/>
+              <a:t>McStas</a:t>
             </a:r>
             <a:endParaRPr dirty="0"/>
           </a:p>
@@ -6473,41 +6481,94 @@
           <a:p>
             <a:r>
               <a:rPr lang="da-DK" dirty="0"/>
-              <a:t>Rb </a:t>
+              <a:t>Monte </a:t>
             </a:r>
             <a:r>
               <a:rPr lang="da-DK" dirty="0" err="1"/>
-              <a:t>liquid</a:t>
+              <a:t>carlo</a:t>
             </a:r>
             <a:r>
               <a:rPr lang="da-DK" dirty="0"/>
-              <a:t> in time of </a:t>
+              <a:t> sampling </a:t>
             </a:r>
             <a:r>
               <a:rPr lang="da-DK" dirty="0" err="1"/>
-              <a:t>flight</a:t>
+              <a:t>issues</a:t>
             </a:r>
             <a:endParaRPr lang="da-DK" dirty="0"/>
           </a:p>
           <a:p>
             <a:r>
               <a:rPr lang="da-DK" dirty="0" err="1"/>
-              <a:t>Coherent</a:t>
+              <a:t>Need</a:t>
             </a:r>
             <a:r>
               <a:rPr lang="da-DK" dirty="0"/>
-              <a:t> and </a:t>
+              <a:t> to sum over large </a:t>
             </a:r>
             <a:r>
               <a:rPr lang="da-DK" dirty="0" err="1"/>
-              <a:t>incoherent</a:t>
+              <a:t>amount</a:t>
+            </a:r>
+            <a:r>
+              <a:rPr lang="da-DK" dirty="0"/>
+              <a:t> of </a:t>
+            </a:r>
+            <a:r>
+              <a:rPr lang="da-DK" dirty="0" err="1"/>
+              <a:t>possible</a:t>
+            </a:r>
+            <a:r>
+              <a:rPr lang="da-DK" dirty="0"/>
+              <a:t> final </a:t>
+            </a:r>
+            <a:r>
+              <a:rPr lang="da-DK" dirty="0" err="1"/>
+              <a:t>states</a:t>
+            </a:r>
+            <a:r>
+              <a:rPr lang="da-DK" dirty="0"/>
+              <a:t> to find </a:t>
+            </a:r>
+            <a:r>
+              <a:rPr lang="da-DK" dirty="0" err="1"/>
+              <a:t>cross</a:t>
+            </a:r>
+            <a:r>
+              <a:rPr lang="da-DK" dirty="0"/>
+              <a:t> </a:t>
+            </a:r>
+            <a:r>
+              <a:rPr lang="da-DK" dirty="0" err="1"/>
+              <a:t>section</a:t>
             </a:r>
             <a:endParaRPr lang="da-DK" dirty="0"/>
           </a:p>
           <a:p>
-            <a:pPr marL="0" indent="0">
-              <a:buNone/>
-            </a:pPr>
+            <a:r>
+              <a:rPr lang="da-DK" dirty="0" err="1"/>
+              <a:t>Need</a:t>
+            </a:r>
+            <a:r>
+              <a:rPr lang="da-DK" dirty="0"/>
+              <a:t> large </a:t>
+            </a:r>
+            <a:r>
+              <a:rPr lang="da-DK" dirty="0" err="1"/>
+              <a:t>amount</a:t>
+            </a:r>
+            <a:r>
+              <a:rPr lang="da-DK" dirty="0"/>
+              <a:t> of </a:t>
+            </a:r>
+            <a:r>
+              <a:rPr lang="da-DK" dirty="0" err="1"/>
+              <a:t>rays</a:t>
+            </a:r>
+            <a:r>
+              <a:rPr lang="da-DK" dirty="0"/>
+              <a:t> to sample all the options</a:t>
+            </a:r>
             <a:endParaRPr dirty="0"/>
           </a:p>
         </p:txBody>
@@ -6532,7 +6593,7 @@
           </a:prstGeom>
           <a:extLst>
             <a:ext uri="{C572A759-6A51-4108-AA02-DFA0A04FC94B}">
-              <ma14:wrappingTextBoxFlag xmlns:ma14="http://schemas.microsoft.com/office/mac/drawingml/2011/main" xmlns:a14="http://schemas.microsoft.com/office/drawing/2010/main" xmlns:m="http://schemas.openxmlformats.org/officeDocument/2006/math" xmlns="" val="1"/>
+              <ma14:wrappingTextBoxFlag xmlns="" xmlns:m="http://schemas.openxmlformats.org/officeDocument/2006/math" xmlns:a14="http://schemas.microsoft.com/office/drawing/2010/main" xmlns:ma14="http://schemas.microsoft.com/office/mac/drawingml/2011/main" val="1"/>
             </a:ext>
           </a:extLst>
         </p:spPr>
@@ -6542,1647 +6603,6 @@
           <a:p>
             <a:fld id="{86CB4B4D-7CA3-9044-876B-883B54F8677D}" type="slidenum">
               <a:t>10</a:t>
-            </a:fld>
-            <a:endParaRPr/>
-          </a:p>
-        </p:txBody>
-      </p:sp>
-      <p:pic>
-        <p:nvPicPr>
-          <p:cNvPr id="3" name="Picture 2">
-            <a:extLst>
-              <a:ext uri="{FF2B5EF4-FFF2-40B4-BE49-F238E27FC236}">
-                <a16:creationId xmlns:a16="http://schemas.microsoft.com/office/drawing/2014/main" id="{E963C22E-FBB1-4047-9AF8-A3DA63978273}"/>
-              </a:ext>
-            </a:extLst>
-          </p:cNvPr>
-          <p:cNvPicPr>
-            <a:picLocks noChangeAspect="1"/>
-          </p:cNvPicPr>
-          <p:nvPr/>
-        </p:nvPicPr>
-        <p:blipFill>
-          <a:blip r:embed="rId2">
-            <a:extLst>
-              <a:ext uri="{28A0092B-C50C-407E-A947-70E740481C1C}">
-                <a14:useLocalDpi xmlns:a14="http://schemas.microsoft.com/office/drawing/2010/main" val="0"/>
-              </a:ext>
-            </a:extLst>
-          </a:blip>
-          <a:stretch>
-            <a:fillRect/>
-          </a:stretch>
-        </p:blipFill>
-        <p:spPr>
-          <a:xfrm>
-            <a:off x="4962053" y="1706398"/>
-            <a:ext cx="7071448" cy="4660111"/>
-          </a:xfrm>
-          <a:prstGeom prst="rect">
-            <a:avLst/>
-          </a:prstGeom>
-        </p:spPr>
-      </p:pic>
-    </p:spTree>
-    <p:extLst>
-      <p:ext uri="{BB962C8B-B14F-4D97-AF65-F5344CB8AC3E}">
-        <p14:creationId xmlns:p14="http://schemas.microsoft.com/office/powerpoint/2010/main" val="1139390163"/>
-      </p:ext>
-    </p:extLst>
-  </p:cSld>
-  <p:clrMapOvr>
-    <a:masterClrMapping/>
-  </p:clrMapOvr>
-  <p:transition spd="med"/>
-</p:sld>
-</file>
-
-<file path=ppt/slides/slide11.xml><?xml version="1.0" encoding="utf-8"?>
-<p:sld xmlns:a="http://schemas.openxmlformats.org/drawingml/2006/main" xmlns:r="http://schemas.openxmlformats.org/officeDocument/2006/relationships" xmlns:p="http://schemas.openxmlformats.org/presentationml/2006/main">
-  <p:cSld>
-    <p:spTree>
-      <p:nvGrpSpPr>
-        <p:cNvPr id="1" name=""/>
-        <p:cNvGrpSpPr/>
-        <p:nvPr/>
-      </p:nvGrpSpPr>
-      <p:grpSpPr>
-        <a:xfrm>
-          <a:off x="0" y="0"/>
-          <a:ext cx="0" cy="0"/>
-          <a:chOff x="0" y="0"/>
-          <a:chExt cx="0" cy="0"/>
-        </a:xfrm>
-      </p:grpSpPr>
-      <p:sp>
-        <p:nvSpPr>
-          <p:cNvPr id="250" name="Title 4"/>
-          <p:cNvSpPr txBox="1">
-            <a:spLocks noGrp="1"/>
-          </p:cNvSpPr>
-          <p:nvPr>
-            <p:ph type="title"/>
-          </p:nvPr>
-        </p:nvSpPr>
-        <p:spPr>
-          <a:xfrm>
-            <a:off x="1774725" y="426126"/>
-            <a:ext cx="9312376" cy="972718"/>
-          </a:xfrm>
-          <a:prstGeom prst="rect">
-            <a:avLst/>
-          </a:prstGeom>
-        </p:spPr>
-        <p:txBody>
-          <a:bodyPr/>
-          <a:lstStyle/>
-          <a:p>
-            <a:r>
-              <a:rPr lang="da-DK" dirty="0"/>
-              <a:t>TAS</a:t>
-            </a:r>
-            <a:endParaRPr dirty="0"/>
-          </a:p>
-        </p:txBody>
-      </p:sp>
-      <p:sp>
-        <p:nvSpPr>
-          <p:cNvPr id="251" name="Content Placeholder 5"/>
-          <p:cNvSpPr txBox="1">
-            <a:spLocks noGrp="1"/>
-          </p:cNvSpPr>
-          <p:nvPr>
-            <p:ph type="body" idx="1"/>
-          </p:nvPr>
-        </p:nvSpPr>
-        <p:spPr>
-          <a:xfrm>
-            <a:off x="1774799" y="1706399"/>
-            <a:ext cx="4060393" cy="4545579"/>
-          </a:xfrm>
-          <a:prstGeom prst="rect">
-            <a:avLst/>
-          </a:prstGeom>
-        </p:spPr>
-        <p:txBody>
-          <a:bodyPr/>
-          <a:lstStyle/>
-          <a:p>
-            <a:r>
-              <a:rPr lang="da-DK" dirty="0" err="1"/>
-              <a:t>Only</a:t>
-            </a:r>
-            <a:r>
-              <a:rPr lang="da-DK" dirty="0"/>
-              <a:t> a small </a:t>
-            </a:r>
-            <a:r>
-              <a:rPr lang="da-DK" dirty="0" err="1"/>
-              <a:t>fraction</a:t>
-            </a:r>
-            <a:r>
-              <a:rPr lang="da-DK" dirty="0"/>
-              <a:t> of neutrons </a:t>
-            </a:r>
-            <a:r>
-              <a:rPr lang="da-DK" dirty="0" err="1"/>
-              <a:t>arrive</a:t>
-            </a:r>
-            <a:r>
-              <a:rPr lang="da-DK" dirty="0"/>
-              <a:t>, most </a:t>
-            </a:r>
-            <a:r>
-              <a:rPr lang="da-DK" dirty="0" err="1"/>
-              <a:t>are</a:t>
-            </a:r>
-            <a:r>
-              <a:rPr lang="da-DK" dirty="0"/>
-              <a:t> </a:t>
-            </a:r>
-            <a:r>
-              <a:rPr lang="da-DK" dirty="0" err="1"/>
-              <a:t>simulated</a:t>
-            </a:r>
-            <a:r>
-              <a:rPr lang="da-DK" dirty="0"/>
-              <a:t> in </a:t>
-            </a:r>
-            <a:r>
-              <a:rPr lang="da-DK" dirty="0" err="1"/>
-              <a:t>vain</a:t>
-            </a:r>
-            <a:endParaRPr lang="da-DK" dirty="0"/>
-          </a:p>
-        </p:txBody>
-      </p:sp>
-      <p:sp>
-        <p:nvSpPr>
-          <p:cNvPr id="252" name="Slide Number Placeholder 3"/>
-          <p:cNvSpPr txBox="1">
-            <a:spLocks noGrp="1"/>
-          </p:cNvSpPr>
-          <p:nvPr>
-            <p:ph type="sldNum" sz="quarter" idx="2"/>
-          </p:nvPr>
-        </p:nvSpPr>
-        <p:spPr>
-          <a:xfrm>
-            <a:off x="11506450" y="6636099"/>
-            <a:ext cx="127001" cy="127001"/>
-          </a:xfrm>
-          <a:prstGeom prst="rect">
-            <a:avLst/>
-          </a:prstGeom>
-          <a:extLst>
-            <a:ext uri="{C572A759-6A51-4108-AA02-DFA0A04FC94B}">
-              <ma14:wrappingTextBoxFlag xmlns:ma14="http://schemas.microsoft.com/office/mac/drawingml/2011/main" xmlns:a14="http://schemas.microsoft.com/office/drawing/2010/main" xmlns:m="http://schemas.openxmlformats.org/officeDocument/2006/math" xmlns="" val="1"/>
-            </a:ext>
-          </a:extLst>
-        </p:spPr>
-        <p:txBody>
-          <a:bodyPr/>
-          <a:lstStyle/>
-          <a:p>
-            <a:fld id="{86CB4B4D-7CA3-9044-876B-883B54F8677D}" type="slidenum">
-              <a:t>11</a:t>
-            </a:fld>
-            <a:endParaRPr/>
-          </a:p>
-        </p:txBody>
-      </p:sp>
-      <p:pic>
-        <p:nvPicPr>
-          <p:cNvPr id="3" name="Picture 2">
-            <a:extLst>
-              <a:ext uri="{FF2B5EF4-FFF2-40B4-BE49-F238E27FC236}">
-                <a16:creationId xmlns:a16="http://schemas.microsoft.com/office/drawing/2014/main" id="{0F080686-8093-B94D-9F4A-9CE20F5AD4FB}"/>
-              </a:ext>
-            </a:extLst>
-          </p:cNvPr>
-          <p:cNvPicPr>
-            <a:picLocks noChangeAspect="1"/>
-          </p:cNvPicPr>
-          <p:nvPr/>
-        </p:nvPicPr>
-        <p:blipFill rotWithShape="1">
-          <a:blip r:embed="rId3">
-            <a:extLst>
-              <a:ext uri="{28A0092B-C50C-407E-A947-70E740481C1C}">
-                <a14:useLocalDpi xmlns:a14="http://schemas.microsoft.com/office/drawing/2010/main" val="0"/>
-              </a:ext>
-            </a:extLst>
-          </a:blip>
-          <a:srcRect l="10227" r="11179"/>
-          <a:stretch/>
-        </p:blipFill>
-        <p:spPr>
-          <a:xfrm>
-            <a:off x="6069331" y="1398844"/>
-            <a:ext cx="5817870" cy="4877326"/>
-          </a:xfrm>
-          <a:prstGeom prst="rect">
-            <a:avLst/>
-          </a:prstGeom>
-        </p:spPr>
-      </p:pic>
-    </p:spTree>
-    <p:extLst>
-      <p:ext uri="{BB962C8B-B14F-4D97-AF65-F5344CB8AC3E}">
-        <p14:creationId xmlns:p14="http://schemas.microsoft.com/office/powerpoint/2010/main" val="3025174763"/>
-      </p:ext>
-    </p:extLst>
-  </p:cSld>
-  <p:clrMapOvr>
-    <a:masterClrMapping/>
-  </p:clrMapOvr>
-  <p:transition spd="med"/>
-</p:sld>
-</file>
-
-<file path=ppt/slides/slide12.xml><?xml version="1.0" encoding="utf-8"?>
-<p:sld xmlns:a="http://schemas.openxmlformats.org/drawingml/2006/main" xmlns:r="http://schemas.openxmlformats.org/officeDocument/2006/relationships" xmlns:p="http://schemas.openxmlformats.org/presentationml/2006/main">
-  <p:cSld>
-    <p:spTree>
-      <p:nvGrpSpPr>
-        <p:cNvPr id="1" name=""/>
-        <p:cNvGrpSpPr/>
-        <p:nvPr/>
-      </p:nvGrpSpPr>
-      <p:grpSpPr>
-        <a:xfrm>
-          <a:off x="0" y="0"/>
-          <a:ext cx="0" cy="0"/>
-          <a:chOff x="0" y="0"/>
-          <a:chExt cx="0" cy="0"/>
-        </a:xfrm>
-      </p:grpSpPr>
-      <p:sp>
-        <p:nvSpPr>
-          <p:cNvPr id="250" name="Title 4"/>
-          <p:cNvSpPr txBox="1">
-            <a:spLocks noGrp="1"/>
-          </p:cNvSpPr>
-          <p:nvPr>
-            <p:ph type="title"/>
-          </p:nvPr>
-        </p:nvSpPr>
-        <p:spPr>
-          <a:xfrm>
-            <a:off x="1774725" y="426126"/>
-            <a:ext cx="9312376" cy="972718"/>
-          </a:xfrm>
-          <a:prstGeom prst="rect">
-            <a:avLst/>
-          </a:prstGeom>
-        </p:spPr>
-        <p:txBody>
-          <a:bodyPr/>
-          <a:lstStyle/>
-          <a:p>
-            <a:r>
-              <a:rPr lang="da-DK" dirty="0"/>
-              <a:t>Chopper </a:t>
-            </a:r>
-            <a:r>
-              <a:rPr lang="da-DK" dirty="0" err="1"/>
-              <a:t>spectrometers</a:t>
-            </a:r>
-            <a:endParaRPr dirty="0"/>
-          </a:p>
-        </p:txBody>
-      </p:sp>
-      <p:sp>
-        <p:nvSpPr>
-          <p:cNvPr id="251" name="Content Placeholder 5"/>
-          <p:cNvSpPr txBox="1">
-            <a:spLocks noGrp="1"/>
-          </p:cNvSpPr>
-          <p:nvPr>
-            <p:ph type="body" idx="1"/>
-          </p:nvPr>
-        </p:nvSpPr>
-        <p:spPr>
-          <a:xfrm>
-            <a:off x="1774799" y="1706399"/>
-            <a:ext cx="4060393" cy="4545579"/>
-          </a:xfrm>
-          <a:prstGeom prst="rect">
-            <a:avLst/>
-          </a:prstGeom>
-        </p:spPr>
-        <p:txBody>
-          <a:bodyPr/>
-          <a:lstStyle/>
-          <a:p>
-            <a:r>
-              <a:rPr lang="da-DK" dirty="0" err="1"/>
-              <a:t>Only</a:t>
-            </a:r>
-            <a:r>
-              <a:rPr lang="da-DK" dirty="0"/>
-              <a:t> a small </a:t>
-            </a:r>
-            <a:r>
-              <a:rPr lang="da-DK" dirty="0" err="1"/>
-              <a:t>fraction</a:t>
-            </a:r>
-            <a:r>
-              <a:rPr lang="da-DK" dirty="0"/>
-              <a:t> of neutrons </a:t>
-            </a:r>
-            <a:r>
-              <a:rPr lang="da-DK" dirty="0" err="1"/>
-              <a:t>arrive</a:t>
-            </a:r>
-            <a:r>
-              <a:rPr lang="da-DK" dirty="0"/>
-              <a:t>, most </a:t>
-            </a:r>
-            <a:r>
-              <a:rPr lang="da-DK" dirty="0" err="1"/>
-              <a:t>are</a:t>
-            </a:r>
-            <a:r>
-              <a:rPr lang="da-DK" dirty="0"/>
-              <a:t> </a:t>
-            </a:r>
-            <a:r>
-              <a:rPr lang="da-DK" dirty="0" err="1"/>
-              <a:t>simulated</a:t>
-            </a:r>
-            <a:r>
-              <a:rPr lang="da-DK" dirty="0"/>
-              <a:t> in </a:t>
-            </a:r>
-            <a:r>
-              <a:rPr lang="da-DK" dirty="0" err="1"/>
-              <a:t>vain</a:t>
-            </a:r>
-            <a:endParaRPr lang="da-DK" dirty="0"/>
-          </a:p>
-        </p:txBody>
-      </p:sp>
-      <p:sp>
-        <p:nvSpPr>
-          <p:cNvPr id="252" name="Slide Number Placeholder 3"/>
-          <p:cNvSpPr txBox="1">
-            <a:spLocks noGrp="1"/>
-          </p:cNvSpPr>
-          <p:nvPr>
-            <p:ph type="sldNum" sz="quarter" idx="2"/>
-          </p:nvPr>
-        </p:nvSpPr>
-        <p:spPr>
-          <a:xfrm>
-            <a:off x="11506450" y="6636099"/>
-            <a:ext cx="127001" cy="127001"/>
-          </a:xfrm>
-          <a:prstGeom prst="rect">
-            <a:avLst/>
-          </a:prstGeom>
-          <a:extLst>
-            <a:ext uri="{C572A759-6A51-4108-AA02-DFA0A04FC94B}">
-              <ma14:wrappingTextBoxFlag xmlns:ma14="http://schemas.microsoft.com/office/mac/drawingml/2011/main" xmlns:a14="http://schemas.microsoft.com/office/drawing/2010/main" xmlns:m="http://schemas.openxmlformats.org/officeDocument/2006/math" xmlns="" val="1"/>
-            </a:ext>
-          </a:extLst>
-        </p:spPr>
-        <p:txBody>
-          <a:bodyPr/>
-          <a:lstStyle/>
-          <a:p>
-            <a:fld id="{86CB4B4D-7CA3-9044-876B-883B54F8677D}" type="slidenum">
-              <a:t>12</a:t>
-            </a:fld>
-            <a:endParaRPr/>
-          </a:p>
-        </p:txBody>
-      </p:sp>
-      <p:pic>
-        <p:nvPicPr>
-          <p:cNvPr id="4" name="Picture 3">
-            <a:extLst>
-              <a:ext uri="{FF2B5EF4-FFF2-40B4-BE49-F238E27FC236}">
-                <a16:creationId xmlns:a16="http://schemas.microsoft.com/office/drawing/2014/main" id="{AB78AAC7-BEE7-0642-9F58-FB54EB4ACAB4}"/>
-              </a:ext>
-            </a:extLst>
-          </p:cNvPr>
-          <p:cNvPicPr>
-            <a:picLocks noChangeAspect="1"/>
-          </p:cNvPicPr>
-          <p:nvPr/>
-        </p:nvPicPr>
-        <p:blipFill>
-          <a:blip r:embed="rId2">
-            <a:extLst>
-              <a:ext uri="{28A0092B-C50C-407E-A947-70E740481C1C}">
-                <a14:useLocalDpi xmlns:a14="http://schemas.microsoft.com/office/drawing/2010/main" val="0"/>
-              </a:ext>
-            </a:extLst>
-          </a:blip>
-          <a:stretch>
-            <a:fillRect/>
-          </a:stretch>
-        </p:blipFill>
-        <p:spPr>
-          <a:xfrm>
-            <a:off x="5835192" y="1517714"/>
-            <a:ext cx="6203647" cy="4529797"/>
-          </a:xfrm>
-          <a:prstGeom prst="rect">
-            <a:avLst/>
-          </a:prstGeom>
-        </p:spPr>
-      </p:pic>
-    </p:spTree>
-    <p:extLst>
-      <p:ext uri="{BB962C8B-B14F-4D97-AF65-F5344CB8AC3E}">
-        <p14:creationId xmlns:p14="http://schemas.microsoft.com/office/powerpoint/2010/main" val="2263456193"/>
-      </p:ext>
-    </p:extLst>
-  </p:cSld>
-  <p:clrMapOvr>
-    <a:masterClrMapping/>
-  </p:clrMapOvr>
-  <p:transition spd="med"/>
-</p:sld>
-</file>
-
-<file path=ppt/slides/slide13.xml><?xml version="1.0" encoding="utf-8"?>
-<p:sld xmlns:a="http://schemas.openxmlformats.org/drawingml/2006/main" xmlns:r="http://schemas.openxmlformats.org/officeDocument/2006/relationships" xmlns:p="http://schemas.openxmlformats.org/presentationml/2006/main">
-  <p:cSld>
-    <p:spTree>
-      <p:nvGrpSpPr>
-        <p:cNvPr id="1" name=""/>
-        <p:cNvGrpSpPr/>
-        <p:nvPr/>
-      </p:nvGrpSpPr>
-      <p:grpSpPr>
-        <a:xfrm>
-          <a:off x="0" y="0"/>
-          <a:ext cx="0" cy="0"/>
-          <a:chOff x="0" y="0"/>
-          <a:chExt cx="0" cy="0"/>
-        </a:xfrm>
-      </p:grpSpPr>
-      <p:sp>
-        <p:nvSpPr>
-          <p:cNvPr id="250" name="Title 4"/>
-          <p:cNvSpPr txBox="1">
-            <a:spLocks noGrp="1"/>
-          </p:cNvSpPr>
-          <p:nvPr>
-            <p:ph type="title"/>
-          </p:nvPr>
-        </p:nvSpPr>
-        <p:spPr>
-          <a:xfrm>
-            <a:off x="1774725" y="426126"/>
-            <a:ext cx="9312376" cy="972718"/>
-          </a:xfrm>
-          <a:prstGeom prst="rect">
-            <a:avLst/>
-          </a:prstGeom>
-        </p:spPr>
-        <p:txBody>
-          <a:bodyPr/>
-          <a:lstStyle/>
-          <a:p>
-            <a:r>
-              <a:rPr lang="da-DK" dirty="0" err="1"/>
-              <a:t>Conclusion</a:t>
-            </a:r>
-            <a:endParaRPr dirty="0"/>
-          </a:p>
-        </p:txBody>
-      </p:sp>
-      <p:sp>
-        <p:nvSpPr>
-          <p:cNvPr id="251" name="Content Placeholder 5"/>
-          <p:cNvSpPr txBox="1">
-            <a:spLocks noGrp="1"/>
-          </p:cNvSpPr>
-          <p:nvPr>
-            <p:ph type="body" idx="1"/>
-          </p:nvPr>
-        </p:nvSpPr>
-        <p:spPr>
-          <a:xfrm>
-            <a:off x="1774799" y="1706399"/>
-            <a:ext cx="9312376" cy="4545579"/>
-          </a:xfrm>
-          <a:prstGeom prst="rect">
-            <a:avLst/>
-          </a:prstGeom>
-        </p:spPr>
-        <p:txBody>
-          <a:bodyPr/>
-          <a:lstStyle/>
-          <a:p>
-            <a:r>
-              <a:rPr lang="da-DK" dirty="0" err="1"/>
-              <a:t>Inelastic</a:t>
-            </a:r>
-            <a:r>
-              <a:rPr lang="da-DK" dirty="0"/>
-              <a:t> </a:t>
-            </a:r>
-            <a:r>
-              <a:rPr lang="da-DK" dirty="0" err="1"/>
-              <a:t>scattering</a:t>
-            </a:r>
-            <a:r>
-              <a:rPr lang="da-DK" dirty="0"/>
-              <a:t> </a:t>
-            </a:r>
-            <a:r>
-              <a:rPr lang="da-DK" dirty="0" err="1"/>
-              <a:t>supported</a:t>
-            </a:r>
-            <a:r>
-              <a:rPr lang="da-DK" dirty="0"/>
-              <a:t> in </a:t>
-            </a:r>
-            <a:r>
-              <a:rPr lang="da-DK" dirty="0" err="1"/>
-              <a:t>McStas</a:t>
-            </a:r>
-            <a:r>
-              <a:rPr lang="da-DK" dirty="0"/>
-              <a:t>, but </a:t>
-            </a:r>
-            <a:r>
-              <a:rPr lang="da-DK" dirty="0" err="1"/>
-              <a:t>could</a:t>
-            </a:r>
-            <a:r>
-              <a:rPr lang="da-DK" dirty="0"/>
-              <a:t> </a:t>
-            </a:r>
-            <a:r>
-              <a:rPr lang="da-DK" dirty="0" err="1"/>
-              <a:t>use</a:t>
-            </a:r>
-            <a:r>
-              <a:rPr lang="da-DK" dirty="0"/>
-              <a:t> more sample components</a:t>
-            </a:r>
-          </a:p>
-          <a:p>
-            <a:r>
-              <a:rPr lang="da-DK" dirty="0"/>
-              <a:t>Longer </a:t>
-            </a:r>
-            <a:r>
-              <a:rPr lang="da-DK" dirty="0" err="1"/>
-              <a:t>computational</a:t>
-            </a:r>
-            <a:r>
-              <a:rPr lang="da-DK" dirty="0"/>
-              <a:t> times </a:t>
-            </a:r>
-            <a:r>
-              <a:rPr lang="da-DK" dirty="0" err="1"/>
-              <a:t>required</a:t>
-            </a:r>
-            <a:endParaRPr lang="da-DK" dirty="0"/>
-          </a:p>
-          <a:p>
-            <a:r>
-              <a:rPr lang="da-DK" dirty="0"/>
-              <a:t>Advantages from simulation </a:t>
-            </a:r>
-            <a:r>
-              <a:rPr lang="da-DK" dirty="0" err="1"/>
-              <a:t>especially</a:t>
-            </a:r>
-            <a:r>
-              <a:rPr lang="da-DK" dirty="0"/>
-              <a:t> </a:t>
-            </a:r>
-            <a:r>
-              <a:rPr lang="da-DK" dirty="0" err="1"/>
-              <a:t>important</a:t>
-            </a:r>
-            <a:r>
-              <a:rPr lang="da-DK" dirty="0"/>
-              <a:t> for </a:t>
-            </a:r>
-            <a:r>
-              <a:rPr lang="da-DK" dirty="0" err="1"/>
-              <a:t>spectroscopy</a:t>
-            </a:r>
-            <a:r>
-              <a:rPr lang="da-DK" dirty="0"/>
-              <a:t> (resolution </a:t>
-            </a:r>
-            <a:r>
-              <a:rPr lang="da-DK" dirty="0" err="1"/>
-              <a:t>function</a:t>
-            </a:r>
-            <a:r>
-              <a:rPr lang="da-DK" dirty="0"/>
-              <a:t>)</a:t>
-            </a:r>
-            <a:endParaRPr dirty="0"/>
-          </a:p>
-        </p:txBody>
-      </p:sp>
-      <p:sp>
-        <p:nvSpPr>
-          <p:cNvPr id="252" name="Slide Number Placeholder 3"/>
-          <p:cNvSpPr txBox="1">
-            <a:spLocks noGrp="1"/>
-          </p:cNvSpPr>
-          <p:nvPr>
-            <p:ph type="sldNum" sz="quarter" idx="2"/>
-          </p:nvPr>
-        </p:nvSpPr>
-        <p:spPr>
-          <a:xfrm>
-            <a:off x="11506450" y="6636099"/>
-            <a:ext cx="127001" cy="127001"/>
-          </a:xfrm>
-          <a:prstGeom prst="rect">
-            <a:avLst/>
-          </a:prstGeom>
-          <a:extLst>
-            <a:ext uri="{C572A759-6A51-4108-AA02-DFA0A04FC94B}">
-              <ma14:wrappingTextBoxFlag xmlns:ma14="http://schemas.microsoft.com/office/mac/drawingml/2011/main" xmlns:a14="http://schemas.microsoft.com/office/drawing/2010/main" xmlns:m="http://schemas.openxmlformats.org/officeDocument/2006/math" xmlns="" val="1"/>
-            </a:ext>
-          </a:extLst>
-        </p:spPr>
-        <p:txBody>
-          <a:bodyPr/>
-          <a:lstStyle/>
-          <a:p>
-            <a:fld id="{86CB4B4D-7CA3-9044-876B-883B54F8677D}" type="slidenum">
-              <a:t>13</a:t>
-            </a:fld>
-            <a:endParaRPr/>
-          </a:p>
-        </p:txBody>
-      </p:sp>
-    </p:spTree>
-    <p:extLst>
-      <p:ext uri="{BB962C8B-B14F-4D97-AF65-F5344CB8AC3E}">
-        <p14:creationId xmlns:p14="http://schemas.microsoft.com/office/powerpoint/2010/main" val="84746531"/>
-      </p:ext>
-    </p:extLst>
-  </p:cSld>
-  <p:clrMapOvr>
-    <a:masterClrMapping/>
-  </p:clrMapOvr>
-  <p:transition spd="med"/>
-</p:sld>
-</file>
-
-<file path=ppt/slides/slide14.xml><?xml version="1.0" encoding="utf-8"?>
-<p:sld xmlns:a="http://schemas.openxmlformats.org/drawingml/2006/main" xmlns:r="http://schemas.openxmlformats.org/officeDocument/2006/relationships" xmlns:p="http://schemas.openxmlformats.org/presentationml/2006/main">
-  <p:cSld>
-    <p:spTree>
-      <p:nvGrpSpPr>
-        <p:cNvPr id="1" name=""/>
-        <p:cNvGrpSpPr/>
-        <p:nvPr/>
-      </p:nvGrpSpPr>
-      <p:grpSpPr>
-        <a:xfrm>
-          <a:off x="0" y="0"/>
-          <a:ext cx="0" cy="0"/>
-          <a:chOff x="0" y="0"/>
-          <a:chExt cx="0" cy="0"/>
-        </a:xfrm>
-      </p:grpSpPr>
-      <p:sp>
-        <p:nvSpPr>
-          <p:cNvPr id="250" name="Title 4"/>
-          <p:cNvSpPr txBox="1">
-            <a:spLocks noGrp="1"/>
-          </p:cNvSpPr>
-          <p:nvPr>
-            <p:ph type="title"/>
-          </p:nvPr>
-        </p:nvSpPr>
-        <p:spPr>
-          <a:xfrm>
-            <a:off x="1774725" y="426126"/>
-            <a:ext cx="9312376" cy="972718"/>
-          </a:xfrm>
-          <a:prstGeom prst="rect">
-            <a:avLst/>
-          </a:prstGeom>
-        </p:spPr>
-        <p:txBody>
-          <a:bodyPr/>
-          <a:lstStyle/>
-          <a:p>
-            <a:r>
-              <a:rPr lang="da-DK" dirty="0" err="1"/>
-              <a:t>Exercise</a:t>
-            </a:r>
-            <a:endParaRPr dirty="0"/>
-          </a:p>
-        </p:txBody>
-      </p:sp>
-      <p:sp>
-        <p:nvSpPr>
-          <p:cNvPr id="251" name="Content Placeholder 5"/>
-          <p:cNvSpPr txBox="1">
-            <a:spLocks noGrp="1"/>
-          </p:cNvSpPr>
-          <p:nvPr>
-            <p:ph type="body" idx="1"/>
-          </p:nvPr>
-        </p:nvSpPr>
-        <p:spPr>
-          <a:xfrm>
-            <a:off x="1774799" y="1706399"/>
-            <a:ext cx="9312376" cy="4545579"/>
-          </a:xfrm>
-          <a:prstGeom prst="rect">
-            <a:avLst/>
-          </a:prstGeom>
-        </p:spPr>
-        <p:txBody>
-          <a:bodyPr>
-            <a:normAutofit/>
-          </a:bodyPr>
-          <a:lstStyle/>
-          <a:p>
-            <a:r>
-              <a:rPr lang="da-DK" sz="2400" dirty="0" err="1"/>
-              <a:t>Use</a:t>
-            </a:r>
-            <a:r>
-              <a:rPr lang="da-DK" sz="2400" dirty="0"/>
-              <a:t> </a:t>
-            </a:r>
-            <a:r>
-              <a:rPr lang="da-DK" sz="2400" dirty="0" err="1"/>
-              <a:t>provided</a:t>
-            </a:r>
-            <a:r>
-              <a:rPr lang="da-DK" sz="2400" dirty="0"/>
-              <a:t> TAS instrument to scan the </a:t>
-            </a:r>
-            <a:r>
-              <a:rPr lang="da-DK" sz="2400" dirty="0" err="1"/>
-              <a:t>phonon</a:t>
-            </a:r>
-            <a:r>
-              <a:rPr lang="da-DK" sz="2400" dirty="0"/>
-              <a:t> dispersion</a:t>
-            </a:r>
-          </a:p>
-          <a:p>
-            <a:r>
-              <a:rPr lang="da-DK" sz="2400" dirty="0" err="1"/>
-              <a:t>Requires</a:t>
-            </a:r>
-            <a:r>
-              <a:rPr lang="da-DK" sz="2400" dirty="0"/>
-              <a:t> </a:t>
-            </a:r>
-            <a:r>
-              <a:rPr lang="da-DK" sz="2400" dirty="0" err="1"/>
-              <a:t>that</a:t>
-            </a:r>
-            <a:r>
-              <a:rPr lang="da-DK" sz="2400" dirty="0"/>
-              <a:t> </a:t>
-            </a:r>
-            <a:r>
-              <a:rPr lang="da-DK" sz="2400" dirty="0" err="1"/>
-              <a:t>you</a:t>
-            </a:r>
-            <a:r>
-              <a:rPr lang="da-DK" sz="2400" dirty="0"/>
-              <a:t> </a:t>
-            </a:r>
-            <a:r>
-              <a:rPr lang="da-DK" sz="2400" dirty="0" err="1"/>
-              <a:t>work</a:t>
-            </a:r>
-            <a:r>
-              <a:rPr lang="da-DK" sz="2400" dirty="0"/>
-              <a:t> in folder with the components in the zip file</a:t>
-            </a:r>
-          </a:p>
-          <a:p>
-            <a:r>
-              <a:rPr lang="da-DK" sz="2400" dirty="0" err="1"/>
-              <a:t>Futrher</a:t>
-            </a:r>
-            <a:r>
-              <a:rPr lang="da-DK" sz="2400" dirty="0"/>
-              <a:t> </a:t>
-            </a:r>
-            <a:r>
-              <a:rPr lang="da-DK" sz="2400" dirty="0" err="1"/>
-              <a:t>explanation</a:t>
-            </a:r>
-            <a:r>
-              <a:rPr lang="da-DK" sz="2400" dirty="0"/>
-              <a:t> on </a:t>
-            </a:r>
-            <a:r>
-              <a:rPr lang="da-DK" sz="2400" dirty="0" err="1"/>
-              <a:t>github</a:t>
-            </a:r>
-            <a:endParaRPr lang="da-DK" sz="2400" dirty="0"/>
-          </a:p>
-          <a:p>
-            <a:pPr marL="0" indent="0">
-              <a:buNone/>
-            </a:pPr>
-            <a:endParaRPr lang="da-DK" sz="2400" dirty="0"/>
-          </a:p>
-          <a:p>
-            <a:endParaRPr lang="da-DK" sz="2400" dirty="0"/>
-          </a:p>
-          <a:p>
-            <a:endParaRPr lang="da-DK" sz="2400" dirty="0"/>
-          </a:p>
-          <a:p>
-            <a:endParaRPr sz="2400" dirty="0"/>
-          </a:p>
-        </p:txBody>
-      </p:sp>
-      <p:sp>
-        <p:nvSpPr>
-          <p:cNvPr id="252" name="Slide Number Placeholder 3"/>
-          <p:cNvSpPr txBox="1">
-            <a:spLocks noGrp="1"/>
-          </p:cNvSpPr>
-          <p:nvPr>
-            <p:ph type="sldNum" sz="quarter" idx="2"/>
-          </p:nvPr>
-        </p:nvSpPr>
-        <p:spPr>
-          <a:xfrm>
-            <a:off x="11506450" y="6636099"/>
-            <a:ext cx="127001" cy="127001"/>
-          </a:xfrm>
-          <a:prstGeom prst="rect">
-            <a:avLst/>
-          </a:prstGeom>
-          <a:extLst>
-            <a:ext uri="{C572A759-6A51-4108-AA02-DFA0A04FC94B}">
-              <ma14:wrappingTextBoxFlag xmlns:ma14="http://schemas.microsoft.com/office/mac/drawingml/2011/main" xmlns:a14="http://schemas.microsoft.com/office/drawing/2010/main" xmlns:m="http://schemas.openxmlformats.org/officeDocument/2006/math" xmlns="" val="1"/>
-            </a:ext>
-          </a:extLst>
-        </p:spPr>
-        <p:txBody>
-          <a:bodyPr/>
-          <a:lstStyle/>
-          <a:p>
-            <a:fld id="{86CB4B4D-7CA3-9044-876B-883B54F8677D}" type="slidenum">
-              <a:t>14</a:t>
-            </a:fld>
-            <a:endParaRPr/>
-          </a:p>
-        </p:txBody>
-      </p:sp>
-    </p:spTree>
-    <p:extLst>
-      <p:ext uri="{BB962C8B-B14F-4D97-AF65-F5344CB8AC3E}">
-        <p14:creationId xmlns:p14="http://schemas.microsoft.com/office/powerpoint/2010/main" val="4247886268"/>
-      </p:ext>
-    </p:extLst>
-  </p:cSld>
-  <p:clrMapOvr>
-    <a:masterClrMapping/>
-  </p:clrMapOvr>
-  <p:transition spd="med"/>
-</p:sld>
-</file>
-
-<file path=ppt/slides/slide2.xml><?xml version="1.0" encoding="utf-8"?>
-<p:sld xmlns:a="http://schemas.openxmlformats.org/drawingml/2006/main" xmlns:r="http://schemas.openxmlformats.org/officeDocument/2006/relationships" xmlns:p="http://schemas.openxmlformats.org/presentationml/2006/main">
-  <p:cSld>
-    <p:spTree>
-      <p:nvGrpSpPr>
-        <p:cNvPr id="1" name=""/>
-        <p:cNvGrpSpPr/>
-        <p:nvPr/>
-      </p:nvGrpSpPr>
-      <p:grpSpPr>
-        <a:xfrm>
-          <a:off x="0" y="0"/>
-          <a:ext cx="0" cy="0"/>
-          <a:chOff x="0" y="0"/>
-          <a:chExt cx="0" cy="0"/>
-        </a:xfrm>
-      </p:grpSpPr>
-      <p:sp>
-        <p:nvSpPr>
-          <p:cNvPr id="250" name="Title 4"/>
-          <p:cNvSpPr txBox="1">
-            <a:spLocks noGrp="1"/>
-          </p:cNvSpPr>
-          <p:nvPr>
-            <p:ph type="title"/>
-          </p:nvPr>
-        </p:nvSpPr>
-        <p:spPr>
-          <a:xfrm>
-            <a:off x="1774725" y="426126"/>
-            <a:ext cx="9312376" cy="972718"/>
-          </a:xfrm>
-          <a:prstGeom prst="rect">
-            <a:avLst/>
-          </a:prstGeom>
-        </p:spPr>
-        <p:txBody>
-          <a:bodyPr/>
-          <a:lstStyle/>
-          <a:p>
-            <a:r>
-              <a:rPr lang="da-DK" dirty="0" err="1"/>
-              <a:t>Inelastic</a:t>
-            </a:r>
-            <a:r>
-              <a:rPr lang="da-DK" dirty="0"/>
-              <a:t> </a:t>
-            </a:r>
-            <a:r>
-              <a:rPr lang="da-DK" dirty="0" err="1"/>
-              <a:t>scattering</a:t>
-            </a:r>
-            <a:r>
-              <a:rPr lang="da-DK" dirty="0"/>
-              <a:t> in </a:t>
-            </a:r>
-            <a:r>
-              <a:rPr lang="da-DK" dirty="0" err="1"/>
-              <a:t>McStas</a:t>
-            </a:r>
-            <a:endParaRPr dirty="0"/>
-          </a:p>
-        </p:txBody>
-      </p:sp>
-      <p:sp>
-        <p:nvSpPr>
-          <p:cNvPr id="251" name="Content Placeholder 5"/>
-          <p:cNvSpPr txBox="1">
-            <a:spLocks noGrp="1"/>
-          </p:cNvSpPr>
-          <p:nvPr>
-            <p:ph type="body" idx="1"/>
-          </p:nvPr>
-        </p:nvSpPr>
-        <p:spPr>
-          <a:xfrm>
-            <a:off x="1774799" y="1706399"/>
-            <a:ext cx="9312376" cy="4545579"/>
-          </a:xfrm>
-          <a:prstGeom prst="rect">
-            <a:avLst/>
-          </a:prstGeom>
-        </p:spPr>
-        <p:txBody>
-          <a:bodyPr/>
-          <a:lstStyle/>
-          <a:p>
-            <a:r>
-              <a:rPr lang="da-DK" dirty="0" err="1"/>
-              <a:t>Introduction</a:t>
-            </a:r>
-            <a:r>
-              <a:rPr lang="da-DK" dirty="0"/>
-              <a:t> to </a:t>
-            </a:r>
-            <a:r>
-              <a:rPr lang="da-DK" dirty="0" err="1"/>
-              <a:t>inelastic</a:t>
-            </a:r>
-            <a:r>
-              <a:rPr lang="da-DK" dirty="0"/>
-              <a:t> </a:t>
-            </a:r>
-            <a:r>
-              <a:rPr lang="da-DK" dirty="0" err="1"/>
-              <a:t>scattering</a:t>
-            </a:r>
-            <a:endParaRPr lang="da-DK" dirty="0"/>
-          </a:p>
-          <a:p>
-            <a:r>
-              <a:rPr lang="da-DK" dirty="0" err="1"/>
-              <a:t>Inelastic</a:t>
-            </a:r>
-            <a:r>
-              <a:rPr lang="da-DK" dirty="0"/>
-              <a:t> </a:t>
-            </a:r>
-            <a:r>
-              <a:rPr lang="da-DK" dirty="0" err="1"/>
-              <a:t>scattering</a:t>
-            </a:r>
-            <a:r>
-              <a:rPr lang="da-DK" dirty="0"/>
-              <a:t> in </a:t>
-            </a:r>
-            <a:r>
-              <a:rPr lang="da-DK" dirty="0" err="1"/>
-              <a:t>McStas</a:t>
-            </a:r>
-            <a:endParaRPr lang="da-DK" dirty="0"/>
-          </a:p>
-          <a:p>
-            <a:r>
-              <a:rPr lang="da-DK" dirty="0" err="1"/>
-              <a:t>Included</a:t>
-            </a:r>
-            <a:r>
-              <a:rPr lang="da-DK" dirty="0"/>
-              <a:t> components</a:t>
-            </a:r>
-          </a:p>
-          <a:p>
-            <a:pPr lvl="2"/>
-            <a:r>
-              <a:rPr lang="da-DK" dirty="0" err="1"/>
-              <a:t>Phonon_simple</a:t>
-            </a:r>
-            <a:endParaRPr lang="da-DK" dirty="0"/>
-          </a:p>
-          <a:p>
-            <a:pPr lvl="2"/>
-            <a:r>
-              <a:rPr lang="da-DK" dirty="0" err="1"/>
-              <a:t>Isotropic_sqw</a:t>
-            </a:r>
-            <a:endParaRPr lang="da-DK" dirty="0"/>
-          </a:p>
-          <a:p>
-            <a:endParaRPr lang="da-DK" dirty="0"/>
-          </a:p>
-          <a:p>
-            <a:r>
-              <a:rPr lang="da-DK" dirty="0" err="1"/>
-              <a:t>McStas</a:t>
-            </a:r>
-            <a:r>
-              <a:rPr lang="da-DK" dirty="0"/>
-              <a:t> performance, TAS / Chopper </a:t>
-            </a:r>
-          </a:p>
-          <a:p>
-            <a:r>
-              <a:rPr lang="da-DK" dirty="0" err="1"/>
-              <a:t>Exercise</a:t>
-            </a:r>
-            <a:endParaRPr lang="da-DK" dirty="0"/>
-          </a:p>
-          <a:p>
-            <a:endParaRPr dirty="0"/>
-          </a:p>
-        </p:txBody>
-      </p:sp>
-      <p:sp>
-        <p:nvSpPr>
-          <p:cNvPr id="252" name="Slide Number Placeholder 3"/>
-          <p:cNvSpPr txBox="1">
-            <a:spLocks noGrp="1"/>
-          </p:cNvSpPr>
-          <p:nvPr>
-            <p:ph type="sldNum" sz="quarter" idx="2"/>
-          </p:nvPr>
-        </p:nvSpPr>
-        <p:spPr>
-          <a:xfrm>
-            <a:off x="11506450" y="6636099"/>
-            <a:ext cx="127001" cy="127001"/>
-          </a:xfrm>
-          <a:prstGeom prst="rect">
-            <a:avLst/>
-          </a:prstGeom>
-          <a:extLst>
-            <a:ext uri="{C572A759-6A51-4108-AA02-DFA0A04FC94B}">
-              <ma14:wrappingTextBoxFlag xmlns:ma14="http://schemas.microsoft.com/office/mac/drawingml/2011/main" xmlns:a14="http://schemas.microsoft.com/office/drawing/2010/main" xmlns:m="http://schemas.openxmlformats.org/officeDocument/2006/math" xmlns="" val="1"/>
-            </a:ext>
-          </a:extLst>
-        </p:spPr>
-        <p:txBody>
-          <a:bodyPr/>
-          <a:lstStyle/>
-          <a:p>
-            <a:fld id="{86CB4B4D-7CA3-9044-876B-883B54F8677D}" type="slidenum">
-              <a:t>2</a:t>
-            </a:fld>
-            <a:endParaRPr/>
-          </a:p>
-        </p:txBody>
-      </p:sp>
-    </p:spTree>
-  </p:cSld>
-  <p:clrMapOvr>
-    <a:masterClrMapping/>
-  </p:clrMapOvr>
-  <p:transition spd="med"/>
-</p:sld>
-</file>
-
-<file path=ppt/slides/slide3.xml><?xml version="1.0" encoding="utf-8"?>
-<p:sld xmlns:a="http://schemas.openxmlformats.org/drawingml/2006/main" xmlns:r="http://schemas.openxmlformats.org/officeDocument/2006/relationships" xmlns:p="http://schemas.openxmlformats.org/presentationml/2006/main">
-  <p:cSld>
-    <p:spTree>
-      <p:nvGrpSpPr>
-        <p:cNvPr id="1" name=""/>
-        <p:cNvGrpSpPr/>
-        <p:nvPr/>
-      </p:nvGrpSpPr>
-      <p:grpSpPr>
-        <a:xfrm>
-          <a:off x="0" y="0"/>
-          <a:ext cx="0" cy="0"/>
-          <a:chOff x="0" y="0"/>
-          <a:chExt cx="0" cy="0"/>
-        </a:xfrm>
-      </p:grpSpPr>
-      <p:sp>
-        <p:nvSpPr>
-          <p:cNvPr id="250" name="Title 4"/>
-          <p:cNvSpPr txBox="1">
-            <a:spLocks noGrp="1"/>
-          </p:cNvSpPr>
-          <p:nvPr>
-            <p:ph type="title"/>
-          </p:nvPr>
-        </p:nvSpPr>
-        <p:spPr>
-          <a:xfrm>
-            <a:off x="1774725" y="426126"/>
-            <a:ext cx="9312376" cy="972718"/>
-          </a:xfrm>
-          <a:prstGeom prst="rect">
-            <a:avLst/>
-          </a:prstGeom>
-        </p:spPr>
-        <p:txBody>
-          <a:bodyPr/>
-          <a:lstStyle/>
-          <a:p>
-            <a:r>
-              <a:rPr lang="da-DK" dirty="0" err="1"/>
-              <a:t>Inelastic</a:t>
-            </a:r>
-            <a:r>
-              <a:rPr lang="da-DK" dirty="0"/>
-              <a:t> </a:t>
-            </a:r>
-            <a:r>
-              <a:rPr lang="da-DK" dirty="0" err="1"/>
-              <a:t>scattering</a:t>
-            </a:r>
-            <a:r>
-              <a:rPr lang="da-DK" dirty="0"/>
-              <a:t> S(</a:t>
-            </a:r>
-            <a:r>
-              <a:rPr lang="da-DK" dirty="0" err="1"/>
-              <a:t>q,w</a:t>
-            </a:r>
-            <a:r>
-              <a:rPr lang="da-DK" dirty="0"/>
-              <a:t>)</a:t>
-            </a:r>
-            <a:endParaRPr dirty="0"/>
-          </a:p>
-        </p:txBody>
-      </p:sp>
-      <p:sp>
-        <p:nvSpPr>
-          <p:cNvPr id="251" name="Content Placeholder 5"/>
-          <p:cNvSpPr txBox="1">
-            <a:spLocks noGrp="1"/>
-          </p:cNvSpPr>
-          <p:nvPr>
-            <p:ph type="body" idx="1"/>
-          </p:nvPr>
-        </p:nvSpPr>
-        <p:spPr>
-          <a:xfrm>
-            <a:off x="1774799" y="1706399"/>
-            <a:ext cx="9312376" cy="4545579"/>
-          </a:xfrm>
-          <a:prstGeom prst="rect">
-            <a:avLst/>
-          </a:prstGeom>
-        </p:spPr>
-        <p:txBody>
-          <a:bodyPr/>
-          <a:lstStyle/>
-          <a:p>
-            <a:r>
-              <a:rPr lang="da-DK" dirty="0" err="1"/>
-              <a:t>partial</a:t>
-            </a:r>
-            <a:r>
-              <a:rPr lang="da-DK" dirty="0"/>
-              <a:t> </a:t>
-            </a:r>
-            <a:r>
-              <a:rPr lang="da-DK" dirty="0" err="1"/>
-              <a:t>differential</a:t>
-            </a:r>
-            <a:r>
-              <a:rPr lang="da-DK" dirty="0"/>
-              <a:t> </a:t>
-            </a:r>
-            <a:r>
-              <a:rPr lang="da-DK" dirty="0" err="1"/>
-              <a:t>cross</a:t>
-            </a:r>
-            <a:r>
-              <a:rPr lang="da-DK" dirty="0"/>
-              <a:t> </a:t>
-            </a:r>
-            <a:r>
-              <a:rPr lang="da-DK" dirty="0" err="1"/>
-              <a:t>section</a:t>
-            </a:r>
-            <a:endParaRPr lang="da-DK" dirty="0"/>
-          </a:p>
-          <a:p>
-            <a:r>
-              <a:rPr lang="da-DK" dirty="0" err="1"/>
-              <a:t>Scattering</a:t>
-            </a:r>
-            <a:r>
-              <a:rPr lang="da-DK" dirty="0"/>
-              <a:t> </a:t>
-            </a:r>
-            <a:r>
-              <a:rPr lang="da-DK" dirty="0" err="1"/>
-              <a:t>function</a:t>
-            </a:r>
-            <a:endParaRPr lang="da-DK" dirty="0"/>
-          </a:p>
-          <a:p>
-            <a:endParaRPr lang="da-DK" dirty="0"/>
-          </a:p>
-          <a:p>
-            <a:r>
-              <a:rPr lang="da-DK" dirty="0" err="1"/>
-              <a:t>Phonons</a:t>
-            </a:r>
-            <a:r>
-              <a:rPr lang="da-DK" dirty="0"/>
-              <a:t>, Spin </a:t>
-            </a:r>
-            <a:r>
-              <a:rPr lang="da-DK" dirty="0" err="1"/>
-              <a:t>waves</a:t>
-            </a:r>
-            <a:r>
-              <a:rPr lang="da-DK" dirty="0"/>
-              <a:t>, … </a:t>
-            </a:r>
-          </a:p>
-          <a:p>
-            <a:pPr marL="0" indent="0">
-              <a:buNone/>
-            </a:pPr>
-            <a:endParaRPr lang="da-DK" dirty="0"/>
-          </a:p>
-        </p:txBody>
-      </p:sp>
-      <p:sp>
-        <p:nvSpPr>
-          <p:cNvPr id="252" name="Slide Number Placeholder 3"/>
-          <p:cNvSpPr txBox="1">
-            <a:spLocks noGrp="1"/>
-          </p:cNvSpPr>
-          <p:nvPr>
-            <p:ph type="sldNum" sz="quarter" idx="2"/>
-          </p:nvPr>
-        </p:nvSpPr>
-        <p:spPr>
-          <a:xfrm>
-            <a:off x="11506450" y="6636099"/>
-            <a:ext cx="127001" cy="127001"/>
-          </a:xfrm>
-          <a:prstGeom prst="rect">
-            <a:avLst/>
-          </a:prstGeom>
-          <a:extLst>
-            <a:ext uri="{C572A759-6A51-4108-AA02-DFA0A04FC94B}">
-              <ma14:wrappingTextBoxFlag xmlns:ma14="http://schemas.microsoft.com/office/mac/drawingml/2011/main" xmlns:a14="http://schemas.microsoft.com/office/drawing/2010/main" xmlns:m="http://schemas.openxmlformats.org/officeDocument/2006/math" xmlns="" val="1"/>
-            </a:ext>
-          </a:extLst>
-        </p:spPr>
-        <p:txBody>
-          <a:bodyPr/>
-          <a:lstStyle/>
-          <a:p>
-            <a:fld id="{86CB4B4D-7CA3-9044-876B-883B54F8677D}" type="slidenum">
-              <a:t>3</a:t>
-            </a:fld>
-            <a:endParaRPr/>
-          </a:p>
-        </p:txBody>
-      </p:sp>
-      <p:pic>
-        <p:nvPicPr>
-          <p:cNvPr id="3" name="Picture 2">
-            <a:extLst>
-              <a:ext uri="{FF2B5EF4-FFF2-40B4-BE49-F238E27FC236}">
-                <a16:creationId xmlns:a16="http://schemas.microsoft.com/office/drawing/2014/main" id="{83D8247C-D927-CB4F-9015-2A7E2B58D014}"/>
-              </a:ext>
-            </a:extLst>
-          </p:cNvPr>
-          <p:cNvPicPr>
-            <a:picLocks noChangeAspect="1"/>
-          </p:cNvPicPr>
-          <p:nvPr/>
-        </p:nvPicPr>
-        <p:blipFill>
-          <a:blip r:embed="rId2">
-            <a:extLst>
-              <a:ext uri="{28A0092B-C50C-407E-A947-70E740481C1C}">
-                <a14:useLocalDpi xmlns:a14="http://schemas.microsoft.com/office/drawing/2010/main" val="0"/>
-              </a:ext>
-            </a:extLst>
-          </a:blip>
-          <a:stretch>
-            <a:fillRect/>
-          </a:stretch>
-        </p:blipFill>
-        <p:spPr>
-          <a:xfrm>
-            <a:off x="3115753" y="3345039"/>
-            <a:ext cx="3745648" cy="876386"/>
-          </a:xfrm>
-          <a:prstGeom prst="rect">
-            <a:avLst/>
-          </a:prstGeom>
-        </p:spPr>
-      </p:pic>
-      <p:pic>
-        <p:nvPicPr>
-          <p:cNvPr id="5" name="Picture 4">
-            <a:extLst>
-              <a:ext uri="{FF2B5EF4-FFF2-40B4-BE49-F238E27FC236}">
-                <a16:creationId xmlns:a16="http://schemas.microsoft.com/office/drawing/2014/main" id="{82FE419C-350B-004E-8768-1ED2FFC98DC1}"/>
-              </a:ext>
-            </a:extLst>
-          </p:cNvPr>
-          <p:cNvPicPr>
-            <a:picLocks noChangeAspect="1"/>
-          </p:cNvPicPr>
-          <p:nvPr/>
-        </p:nvPicPr>
-        <p:blipFill>
-          <a:blip r:embed="rId3">
-            <a:alphaModFix/>
-            <a:extLst>
-              <a:ext uri="{28A0092B-C50C-407E-A947-70E740481C1C}">
-                <a14:useLocalDpi xmlns:a14="http://schemas.microsoft.com/office/drawing/2010/main" val="0"/>
-              </a:ext>
-            </a:extLst>
-          </a:blip>
-          <a:stretch>
-            <a:fillRect/>
-          </a:stretch>
-        </p:blipFill>
-        <p:spPr>
-          <a:xfrm>
-            <a:off x="3537273" y="4221425"/>
-            <a:ext cx="6359080" cy="776107"/>
-          </a:xfrm>
-          <a:prstGeom prst="rect">
-            <a:avLst/>
-          </a:prstGeom>
-        </p:spPr>
-      </p:pic>
-    </p:spTree>
-    <p:extLst>
-      <p:ext uri="{BB962C8B-B14F-4D97-AF65-F5344CB8AC3E}">
-        <p14:creationId xmlns:p14="http://schemas.microsoft.com/office/powerpoint/2010/main" val="3605928242"/>
-      </p:ext>
-    </p:extLst>
-  </p:cSld>
-  <p:clrMapOvr>
-    <a:masterClrMapping/>
-  </p:clrMapOvr>
-  <p:transition spd="med"/>
-</p:sld>
-</file>
-
-<file path=ppt/slides/slide4.xml><?xml version="1.0" encoding="utf-8"?>
-<p:sld xmlns:a="http://schemas.openxmlformats.org/drawingml/2006/main" xmlns:r="http://schemas.openxmlformats.org/officeDocument/2006/relationships" xmlns:p="http://schemas.openxmlformats.org/presentationml/2006/main">
-  <p:cSld>
-    <p:spTree>
-      <p:nvGrpSpPr>
-        <p:cNvPr id="1" name=""/>
-        <p:cNvGrpSpPr/>
-        <p:nvPr/>
-      </p:nvGrpSpPr>
-      <p:grpSpPr>
-        <a:xfrm>
-          <a:off x="0" y="0"/>
-          <a:ext cx="0" cy="0"/>
-          <a:chOff x="0" y="0"/>
-          <a:chExt cx="0" cy="0"/>
-        </a:xfrm>
-      </p:grpSpPr>
-      <p:sp>
-        <p:nvSpPr>
-          <p:cNvPr id="250" name="Title 4"/>
-          <p:cNvSpPr txBox="1">
-            <a:spLocks noGrp="1"/>
-          </p:cNvSpPr>
-          <p:nvPr>
-            <p:ph type="title"/>
-          </p:nvPr>
-        </p:nvSpPr>
-        <p:spPr>
-          <a:xfrm>
-            <a:off x="1774725" y="426126"/>
-            <a:ext cx="9312376" cy="972718"/>
-          </a:xfrm>
-          <a:prstGeom prst="rect">
-            <a:avLst/>
-          </a:prstGeom>
-        </p:spPr>
-        <p:txBody>
-          <a:bodyPr/>
-          <a:lstStyle/>
-          <a:p>
-            <a:r>
-              <a:rPr lang="da-DK" dirty="0" err="1"/>
-              <a:t>Inelastic</a:t>
-            </a:r>
-            <a:r>
-              <a:rPr lang="da-DK" dirty="0"/>
-              <a:t> </a:t>
-            </a:r>
-            <a:r>
-              <a:rPr lang="da-DK" dirty="0" err="1"/>
-              <a:t>scattering</a:t>
-            </a:r>
-            <a:r>
-              <a:rPr lang="da-DK" dirty="0"/>
-              <a:t> in </a:t>
-            </a:r>
-            <a:r>
-              <a:rPr lang="da-DK" dirty="0" err="1"/>
-              <a:t>McStas</a:t>
-            </a:r>
-            <a:endParaRPr dirty="0"/>
-          </a:p>
-        </p:txBody>
-      </p:sp>
-      <p:sp>
-        <p:nvSpPr>
-          <p:cNvPr id="251" name="Content Placeholder 5"/>
-          <p:cNvSpPr txBox="1">
-            <a:spLocks noGrp="1"/>
-          </p:cNvSpPr>
-          <p:nvPr>
-            <p:ph type="body" idx="1"/>
-          </p:nvPr>
-        </p:nvSpPr>
-        <p:spPr>
-          <a:xfrm>
-            <a:off x="1774799" y="1706399"/>
-            <a:ext cx="9312376" cy="4545579"/>
-          </a:xfrm>
-          <a:prstGeom prst="rect">
-            <a:avLst/>
-          </a:prstGeom>
-        </p:spPr>
-        <p:txBody>
-          <a:bodyPr/>
-          <a:lstStyle/>
-          <a:p>
-            <a:r>
-              <a:rPr lang="da-DK" dirty="0"/>
-              <a:t>Monte </a:t>
-            </a:r>
-            <a:r>
-              <a:rPr lang="da-DK" dirty="0" err="1"/>
-              <a:t>carlo</a:t>
-            </a:r>
-            <a:r>
-              <a:rPr lang="da-DK" dirty="0"/>
-              <a:t> sampling </a:t>
-            </a:r>
-            <a:r>
-              <a:rPr lang="da-DK" dirty="0" err="1"/>
-              <a:t>issues</a:t>
-            </a:r>
-            <a:endParaRPr lang="da-DK" dirty="0"/>
-          </a:p>
-          <a:p>
-            <a:r>
-              <a:rPr lang="da-DK" dirty="0" err="1"/>
-              <a:t>Need</a:t>
-            </a:r>
-            <a:r>
-              <a:rPr lang="da-DK" dirty="0"/>
-              <a:t> to sum over large </a:t>
-            </a:r>
-            <a:r>
-              <a:rPr lang="da-DK" dirty="0" err="1"/>
-              <a:t>amount</a:t>
-            </a:r>
-            <a:r>
-              <a:rPr lang="da-DK" dirty="0"/>
-              <a:t> of </a:t>
-            </a:r>
-            <a:r>
-              <a:rPr lang="da-DK" dirty="0" err="1"/>
-              <a:t>possible</a:t>
-            </a:r>
-            <a:r>
-              <a:rPr lang="da-DK" dirty="0"/>
-              <a:t> final </a:t>
-            </a:r>
-            <a:r>
-              <a:rPr lang="da-DK" dirty="0" err="1"/>
-              <a:t>states</a:t>
-            </a:r>
-            <a:r>
-              <a:rPr lang="da-DK" dirty="0"/>
-              <a:t> to find </a:t>
-            </a:r>
-            <a:r>
-              <a:rPr lang="da-DK" dirty="0" err="1"/>
-              <a:t>cross</a:t>
-            </a:r>
-            <a:r>
-              <a:rPr lang="da-DK" dirty="0"/>
-              <a:t> </a:t>
-            </a:r>
-            <a:r>
-              <a:rPr lang="da-DK" dirty="0" err="1"/>
-              <a:t>section</a:t>
-            </a:r>
-            <a:endParaRPr lang="da-DK" dirty="0"/>
-          </a:p>
-          <a:p>
-            <a:r>
-              <a:rPr lang="da-DK" dirty="0" err="1"/>
-              <a:t>Need</a:t>
-            </a:r>
-            <a:r>
-              <a:rPr lang="da-DK" dirty="0"/>
-              <a:t> large </a:t>
-            </a:r>
-            <a:r>
-              <a:rPr lang="da-DK" dirty="0" err="1"/>
-              <a:t>amount</a:t>
-            </a:r>
-            <a:r>
-              <a:rPr lang="da-DK" dirty="0"/>
-              <a:t> of </a:t>
-            </a:r>
-            <a:r>
-              <a:rPr lang="da-DK" dirty="0" err="1"/>
-              <a:t>rays</a:t>
-            </a:r>
-            <a:r>
-              <a:rPr lang="da-DK" dirty="0"/>
-              <a:t> to sample all the options</a:t>
-            </a:r>
-            <a:endParaRPr dirty="0"/>
-          </a:p>
-        </p:txBody>
-      </p:sp>
-      <p:sp>
-        <p:nvSpPr>
-          <p:cNvPr id="252" name="Slide Number Placeholder 3"/>
-          <p:cNvSpPr txBox="1">
-            <a:spLocks noGrp="1"/>
-          </p:cNvSpPr>
-          <p:nvPr>
-            <p:ph type="sldNum" sz="quarter" idx="2"/>
-          </p:nvPr>
-        </p:nvSpPr>
-        <p:spPr>
-          <a:xfrm>
-            <a:off x="11506450" y="6636099"/>
-            <a:ext cx="127001" cy="127001"/>
-          </a:xfrm>
-          <a:prstGeom prst="rect">
-            <a:avLst/>
-          </a:prstGeom>
-          <a:extLst>
-            <a:ext uri="{C572A759-6A51-4108-AA02-DFA0A04FC94B}">
-              <ma14:wrappingTextBoxFlag xmlns:ma14="http://schemas.microsoft.com/office/mac/drawingml/2011/main" xmlns:a14="http://schemas.microsoft.com/office/drawing/2010/main" xmlns:m="http://schemas.openxmlformats.org/officeDocument/2006/math" xmlns="" val="1"/>
-            </a:ext>
-          </a:extLst>
-        </p:spPr>
-        <p:txBody>
-          <a:bodyPr/>
-          <a:lstStyle/>
-          <a:p>
-            <a:fld id="{86CB4B4D-7CA3-9044-876B-883B54F8677D}" type="slidenum">
-              <a:t>4</a:t>
             </a:fld>
             <a:endParaRPr/>
           </a:p>
@@ -9293,6 +7713,403 @@
           </a:p>
         </p:txBody>
       </p:sp>
+      <p:sp>
+        <p:nvSpPr>
+          <p:cNvPr id="29" name="TextBox 28">
+            <a:extLst>
+              <a:ext uri="{FF2B5EF4-FFF2-40B4-BE49-F238E27FC236}">
+                <a16:creationId xmlns:a16="http://schemas.microsoft.com/office/drawing/2014/main" id="{D50E14C7-035C-634E-9CCF-29CFA22F1FAC}"/>
+              </a:ext>
+            </a:extLst>
+          </p:cNvPr>
+          <p:cNvSpPr txBox="1"/>
+          <p:nvPr/>
+        </p:nvSpPr>
+        <p:spPr>
+          <a:xfrm>
+            <a:off x="5025989" y="3617545"/>
+            <a:ext cx="672777" cy="453970"/>
+          </a:xfrm>
+          <a:prstGeom prst="rect">
+            <a:avLst/>
+          </a:prstGeom>
+          <a:noFill/>
+          <a:ln w="12700" cap="flat">
+            <a:noFill/>
+            <a:miter lim="400000"/>
+          </a:ln>
+          <a:effectLst/>
+          <a:sp3d/>
+        </p:spPr>
+        <p:style>
+          <a:lnRef idx="0">
+            <a:scrgbClr r="0" g="0" b="0"/>
+          </a:lnRef>
+          <a:fillRef idx="0">
+            <a:scrgbClr r="0" g="0" b="0"/>
+          </a:fillRef>
+          <a:effectRef idx="0">
+            <a:scrgbClr r="0" g="0" b="0"/>
+          </a:effectRef>
+          <a:fontRef idx="none"/>
+        </p:style>
+        <p:txBody>
+          <a:bodyPr rot="0" spcFirstLastPara="1" vertOverflow="overflow" horzOverflow="overflow" vert="horz" wrap="square" lIns="0" tIns="0" rIns="0" bIns="0" numCol="1" spcCol="38100" rtlCol="0" anchor="t">
+            <a:spAutoFit/>
+          </a:bodyPr>
+          <a:lstStyle/>
+          <a:p>
+            <a:pPr marL="0" marR="0" indent="0" algn="l" defTabSz="914400" rtl="0" fontAlgn="auto" latinLnBrk="0" hangingPunct="0">
+              <a:lnSpc>
+                <a:spcPct val="100000"/>
+              </a:lnSpc>
+              <a:spcBef>
+                <a:spcPts val="900"/>
+              </a:spcBef>
+              <a:spcAft>
+                <a:spcPts val="0"/>
+              </a:spcAft>
+              <a:buClrTx/>
+              <a:buSzTx/>
+              <a:buFontTx/>
+              <a:buNone/>
+              <a:tabLst/>
+            </a:pPr>
+            <a:r>
+              <a:rPr kumimoji="0" lang="da-DK" sz="2200" b="0" i="0" u="none" strike="noStrike" cap="none" spc="0" normalizeH="0" dirty="0" err="1">
+                <a:ln>
+                  <a:noFill/>
+                </a:ln>
+                <a:solidFill>
+                  <a:srgbClr val="000000"/>
+                </a:solidFill>
+                <a:effectLst/>
+                <a:uFillTx/>
+                <a:latin typeface="+mn-lt"/>
+                <a:ea typeface="+mn-ea"/>
+                <a:cs typeface="+mn-cs"/>
+                <a:sym typeface="Arial"/>
+              </a:rPr>
+              <a:t>dq</a:t>
+            </a:r>
+            <a:r>
+              <a:rPr lang="da-DK" sz="2200" baseline="-25000" dirty="0" err="1"/>
+              <a:t>y</a:t>
+            </a:r>
+            <a:endParaRPr kumimoji="0" lang="da-DK" sz="2200" b="0" i="0" u="none" strike="noStrike" cap="none" spc="0" normalizeH="0" baseline="-25000" dirty="0">
+              <a:ln>
+                <a:noFill/>
+              </a:ln>
+              <a:solidFill>
+                <a:srgbClr val="000000"/>
+              </a:solidFill>
+              <a:effectLst/>
+              <a:uFillTx/>
+              <a:latin typeface="+mn-lt"/>
+              <a:ea typeface="+mn-ea"/>
+              <a:cs typeface="+mn-cs"/>
+              <a:sym typeface="Arial"/>
+            </a:endParaRPr>
+          </a:p>
+        </p:txBody>
+      </p:sp>
+      <p:sp>
+        <p:nvSpPr>
+          <p:cNvPr id="30" name="TextBox 29">
+            <a:extLst>
+              <a:ext uri="{FF2B5EF4-FFF2-40B4-BE49-F238E27FC236}">
+                <a16:creationId xmlns:a16="http://schemas.microsoft.com/office/drawing/2014/main" id="{341BE983-765F-2B47-9215-2321464DFD83}"/>
+              </a:ext>
+            </a:extLst>
+          </p:cNvPr>
+          <p:cNvSpPr txBox="1"/>
+          <p:nvPr/>
+        </p:nvSpPr>
+        <p:spPr>
+          <a:xfrm>
+            <a:off x="4131838" y="3937926"/>
+            <a:ext cx="672777" cy="453970"/>
+          </a:xfrm>
+          <a:prstGeom prst="rect">
+            <a:avLst/>
+          </a:prstGeom>
+          <a:noFill/>
+          <a:ln w="12700" cap="flat">
+            <a:noFill/>
+            <a:miter lim="400000"/>
+          </a:ln>
+          <a:effectLst/>
+          <a:sp3d/>
+        </p:spPr>
+        <p:style>
+          <a:lnRef idx="0">
+            <a:scrgbClr r="0" g="0" b="0"/>
+          </a:lnRef>
+          <a:fillRef idx="0">
+            <a:scrgbClr r="0" g="0" b="0"/>
+          </a:fillRef>
+          <a:effectRef idx="0">
+            <a:scrgbClr r="0" g="0" b="0"/>
+          </a:effectRef>
+          <a:fontRef idx="none"/>
+        </p:style>
+        <p:txBody>
+          <a:bodyPr rot="0" spcFirstLastPara="1" vertOverflow="overflow" horzOverflow="overflow" vert="horz" wrap="square" lIns="0" tIns="0" rIns="0" bIns="0" numCol="1" spcCol="38100" rtlCol="0" anchor="t">
+            <a:spAutoFit/>
+          </a:bodyPr>
+          <a:lstStyle/>
+          <a:p>
+            <a:pPr marL="0" marR="0" indent="0" algn="l" defTabSz="914400" rtl="0" fontAlgn="auto" latinLnBrk="0" hangingPunct="0">
+              <a:lnSpc>
+                <a:spcPct val="100000"/>
+              </a:lnSpc>
+              <a:spcBef>
+                <a:spcPts val="900"/>
+              </a:spcBef>
+              <a:spcAft>
+                <a:spcPts val="0"/>
+              </a:spcAft>
+              <a:buClrTx/>
+              <a:buSzTx/>
+              <a:buFontTx/>
+              <a:buNone/>
+              <a:tabLst/>
+            </a:pPr>
+            <a:r>
+              <a:rPr kumimoji="0" lang="da-DK" sz="2200" b="0" i="0" u="none" strike="noStrike" cap="none" spc="0" normalizeH="0" dirty="0" err="1">
+                <a:ln>
+                  <a:noFill/>
+                </a:ln>
+                <a:solidFill>
+                  <a:srgbClr val="000000"/>
+                </a:solidFill>
+                <a:effectLst/>
+                <a:uFillTx/>
+                <a:latin typeface="+mn-lt"/>
+                <a:ea typeface="+mn-ea"/>
+                <a:cs typeface="+mn-cs"/>
+                <a:sym typeface="Arial"/>
+              </a:rPr>
+              <a:t>dq</a:t>
+            </a:r>
+            <a:r>
+              <a:rPr lang="da-DK" sz="2200" baseline="-25000" dirty="0" err="1"/>
+              <a:t>x</a:t>
+            </a:r>
+            <a:endParaRPr kumimoji="0" lang="da-DK" sz="2200" b="0" i="0" u="none" strike="noStrike" cap="none" spc="0" normalizeH="0" baseline="-25000" dirty="0">
+              <a:ln>
+                <a:noFill/>
+              </a:ln>
+              <a:solidFill>
+                <a:srgbClr val="000000"/>
+              </a:solidFill>
+              <a:effectLst/>
+              <a:uFillTx/>
+              <a:latin typeface="+mn-lt"/>
+              <a:ea typeface="+mn-ea"/>
+              <a:cs typeface="+mn-cs"/>
+              <a:sym typeface="Arial"/>
+            </a:endParaRPr>
+          </a:p>
+        </p:txBody>
+      </p:sp>
+      <p:sp>
+        <p:nvSpPr>
+          <p:cNvPr id="32" name="TextBox 31">
+            <a:extLst>
+              <a:ext uri="{FF2B5EF4-FFF2-40B4-BE49-F238E27FC236}">
+                <a16:creationId xmlns:a16="http://schemas.microsoft.com/office/drawing/2014/main" id="{6FD4C52E-56C5-EB4E-93F2-E9C03D5971BA}"/>
+              </a:ext>
+            </a:extLst>
+          </p:cNvPr>
+          <p:cNvSpPr txBox="1"/>
+          <p:nvPr/>
+        </p:nvSpPr>
+        <p:spPr>
+          <a:xfrm>
+            <a:off x="4905213" y="4088144"/>
+            <a:ext cx="672777" cy="453970"/>
+          </a:xfrm>
+          <a:prstGeom prst="rect">
+            <a:avLst/>
+          </a:prstGeom>
+          <a:noFill/>
+          <a:ln w="12700" cap="flat">
+            <a:noFill/>
+            <a:miter lim="400000"/>
+          </a:ln>
+          <a:effectLst/>
+          <a:sp3d/>
+        </p:spPr>
+        <p:style>
+          <a:lnRef idx="0">
+            <a:scrgbClr r="0" g="0" b="0"/>
+          </a:lnRef>
+          <a:fillRef idx="0">
+            <a:scrgbClr r="0" g="0" b="0"/>
+          </a:fillRef>
+          <a:effectRef idx="0">
+            <a:scrgbClr r="0" g="0" b="0"/>
+          </a:effectRef>
+          <a:fontRef idx="none"/>
+        </p:style>
+        <p:txBody>
+          <a:bodyPr rot="0" spcFirstLastPara="1" vertOverflow="overflow" horzOverflow="overflow" vert="horz" wrap="square" lIns="0" tIns="0" rIns="0" bIns="0" numCol="1" spcCol="38100" rtlCol="0" anchor="t">
+            <a:spAutoFit/>
+          </a:bodyPr>
+          <a:lstStyle/>
+          <a:p>
+            <a:pPr marL="0" marR="0" indent="0" algn="l" defTabSz="914400" rtl="0" fontAlgn="auto" latinLnBrk="0" hangingPunct="0">
+              <a:lnSpc>
+                <a:spcPct val="100000"/>
+              </a:lnSpc>
+              <a:spcBef>
+                <a:spcPts val="900"/>
+              </a:spcBef>
+              <a:spcAft>
+                <a:spcPts val="0"/>
+              </a:spcAft>
+              <a:buClrTx/>
+              <a:buSzTx/>
+              <a:buFontTx/>
+              <a:buNone/>
+              <a:tabLst/>
+            </a:pPr>
+            <a:r>
+              <a:rPr kumimoji="0" lang="da-DK" sz="2200" b="0" i="0" u="none" strike="noStrike" cap="none" spc="0" normalizeH="0" dirty="0" err="1">
+                <a:ln>
+                  <a:noFill/>
+                </a:ln>
+                <a:solidFill>
+                  <a:srgbClr val="000000"/>
+                </a:solidFill>
+                <a:effectLst/>
+                <a:uFillTx/>
+                <a:latin typeface="+mn-lt"/>
+                <a:ea typeface="+mn-ea"/>
+                <a:cs typeface="+mn-cs"/>
+                <a:sym typeface="Arial"/>
+              </a:rPr>
+              <a:t>dq</a:t>
+            </a:r>
+            <a:r>
+              <a:rPr kumimoji="0" lang="da-DK" sz="2200" b="0" i="0" u="none" strike="noStrike" cap="none" spc="0" normalizeH="0" baseline="-25000" dirty="0" err="1">
+                <a:ln>
+                  <a:noFill/>
+                </a:ln>
+                <a:solidFill>
+                  <a:srgbClr val="000000"/>
+                </a:solidFill>
+                <a:effectLst/>
+                <a:uFillTx/>
+                <a:latin typeface="+mn-lt"/>
+                <a:ea typeface="+mn-ea"/>
+                <a:cs typeface="+mn-cs"/>
+                <a:sym typeface="Arial"/>
+              </a:rPr>
+              <a:t>z</a:t>
+            </a:r>
+            <a:endParaRPr kumimoji="0" lang="da-DK" sz="2200" b="0" i="0" u="none" strike="noStrike" cap="none" spc="0" normalizeH="0" baseline="-25000" dirty="0">
+              <a:ln>
+                <a:noFill/>
+              </a:ln>
+              <a:solidFill>
+                <a:srgbClr val="000000"/>
+              </a:solidFill>
+              <a:effectLst/>
+              <a:uFillTx/>
+              <a:latin typeface="+mn-lt"/>
+              <a:ea typeface="+mn-ea"/>
+              <a:cs typeface="+mn-cs"/>
+              <a:sym typeface="Arial"/>
+            </a:endParaRPr>
+          </a:p>
+        </p:txBody>
+      </p:sp>
+      <p:sp>
+        <p:nvSpPr>
+          <p:cNvPr id="33" name="TextBox 32">
+            <a:extLst>
+              <a:ext uri="{FF2B5EF4-FFF2-40B4-BE49-F238E27FC236}">
+                <a16:creationId xmlns:a16="http://schemas.microsoft.com/office/drawing/2014/main" id="{6782FFC2-1F98-D54E-8AC3-14D3FA0FFE0F}"/>
+              </a:ext>
+            </a:extLst>
+          </p:cNvPr>
+          <p:cNvSpPr txBox="1"/>
+          <p:nvPr/>
+        </p:nvSpPr>
+        <p:spPr>
+          <a:xfrm>
+            <a:off x="4292240" y="3203596"/>
+            <a:ext cx="672777" cy="484748"/>
+          </a:xfrm>
+          <a:prstGeom prst="rect">
+            <a:avLst/>
+          </a:prstGeom>
+          <a:noFill/>
+          <a:ln w="12700" cap="flat">
+            <a:noFill/>
+            <a:miter lim="400000"/>
+          </a:ln>
+          <a:effectLst/>
+          <a:sp3d/>
+        </p:spPr>
+        <p:style>
+          <a:lnRef idx="0">
+            <a:scrgbClr r="0" g="0" b="0"/>
+          </a:lnRef>
+          <a:fillRef idx="0">
+            <a:scrgbClr r="0" g="0" b="0"/>
+          </a:fillRef>
+          <a:effectRef idx="0">
+            <a:scrgbClr r="0" g="0" b="0"/>
+          </a:effectRef>
+          <a:fontRef idx="none"/>
+        </p:style>
+        <p:txBody>
+          <a:bodyPr rot="0" spcFirstLastPara="1" vertOverflow="overflow" horzOverflow="overflow" vert="horz" wrap="square" lIns="0" tIns="0" rIns="0" bIns="0" numCol="1" spcCol="38100" rtlCol="0" anchor="t">
+            <a:spAutoFit/>
+          </a:bodyPr>
+          <a:lstStyle/>
+          <a:p>
+            <a:r>
+              <a:rPr kumimoji="0" lang="da-DK" sz="2200" b="0" i="0" u="none" strike="noStrike" cap="none" spc="0" normalizeH="0" dirty="0">
+                <a:ln>
+                  <a:noFill/>
+                </a:ln>
+                <a:solidFill>
+                  <a:srgbClr val="000000"/>
+                </a:solidFill>
+                <a:effectLst/>
+                <a:uFillTx/>
+                <a:latin typeface="+mn-lt"/>
+                <a:ea typeface="+mn-ea"/>
+                <a:cs typeface="+mn-cs"/>
+                <a:sym typeface="Arial"/>
+              </a:rPr>
+              <a:t>+d</a:t>
+            </a:r>
+            <a:r>
+              <a:rPr lang="da-DK" sz="2400" dirty="0"/>
+              <a:t>⍵</a:t>
+            </a:r>
+            <a:endParaRPr kumimoji="0" lang="da-DK" sz="2200" b="0" i="0" u="none" strike="noStrike" cap="none" spc="0" normalizeH="0" baseline="-25000" dirty="0">
+              <a:ln>
+                <a:noFill/>
+              </a:ln>
+              <a:solidFill>
+                <a:srgbClr val="000000"/>
+              </a:solidFill>
+              <a:effectLst/>
+              <a:uFillTx/>
+              <a:latin typeface="+mn-lt"/>
+              <a:ea typeface="+mn-ea"/>
+              <a:cs typeface="+mn-cs"/>
+              <a:sym typeface="Arial"/>
+            </a:endParaRPr>
+          </a:p>
+        </p:txBody>
+      </p:sp>
     </p:spTree>
     <p:extLst>
       <p:ext uri="{BB962C8B-B14F-4D97-AF65-F5344CB8AC3E}">
@@ -9307,7 +8124,7 @@
 </p:sld>
 </file>
 
-<file path=ppt/slides/slide5.xml><?xml version="1.0" encoding="utf-8"?>
+<file path=ppt/slides/slide11.xml><?xml version="1.0" encoding="utf-8"?>
 <p:sld xmlns:a="http://schemas.openxmlformats.org/drawingml/2006/main" xmlns:r="http://schemas.openxmlformats.org/officeDocument/2006/relationships" xmlns:p="http://schemas.openxmlformats.org/presentationml/2006/main">
   <p:cSld>
     <p:spTree>
@@ -9348,16 +8165,419 @@
           <a:lstStyle/>
           <a:p>
             <a:r>
+              <a:rPr lang="da-DK" dirty="0"/>
+              <a:t>TAS</a:t>
+            </a:r>
+            <a:endParaRPr dirty="0"/>
+          </a:p>
+        </p:txBody>
+      </p:sp>
+      <p:sp>
+        <p:nvSpPr>
+          <p:cNvPr id="251" name="Content Placeholder 5"/>
+          <p:cNvSpPr txBox="1">
+            <a:spLocks noGrp="1"/>
+          </p:cNvSpPr>
+          <p:nvPr>
+            <p:ph type="body" idx="1"/>
+          </p:nvPr>
+        </p:nvSpPr>
+        <p:spPr>
+          <a:xfrm>
+            <a:off x="1774799" y="1706399"/>
+            <a:ext cx="4060393" cy="4545579"/>
+          </a:xfrm>
+          <a:prstGeom prst="rect">
+            <a:avLst/>
+          </a:prstGeom>
+        </p:spPr>
+        <p:txBody>
+          <a:bodyPr/>
+          <a:lstStyle/>
+          <a:p>
+            <a:r>
               <a:rPr lang="da-DK" dirty="0" err="1"/>
-              <a:t>Popular</a:t>
+              <a:t>Only</a:t>
             </a:r>
             <a:r>
               <a:rPr lang="da-DK" dirty="0"/>
-              <a:t> component: </a:t>
+              <a:t> a small </a:t>
             </a:r>
             <a:r>
               <a:rPr lang="da-DK" dirty="0" err="1"/>
-              <a:t>Phonon_simple</a:t>
+              <a:t>fraction</a:t>
+            </a:r>
+            <a:r>
+              <a:rPr lang="da-DK" dirty="0"/>
+              <a:t> of neutrons </a:t>
+            </a:r>
+            <a:r>
+              <a:rPr lang="da-DK" dirty="0" err="1"/>
+              <a:t>arrive</a:t>
+            </a:r>
+            <a:r>
+              <a:rPr lang="da-DK" dirty="0"/>
+              <a:t>, most </a:t>
+            </a:r>
+            <a:r>
+              <a:rPr lang="da-DK" dirty="0" err="1"/>
+              <a:t>are</a:t>
+            </a:r>
+            <a:r>
+              <a:rPr lang="da-DK" dirty="0"/>
+              <a:t> </a:t>
+            </a:r>
+            <a:r>
+              <a:rPr lang="da-DK" dirty="0" err="1"/>
+              <a:t>simulated</a:t>
+            </a:r>
+            <a:r>
+              <a:rPr lang="da-DK" dirty="0"/>
+              <a:t> in </a:t>
+            </a:r>
+            <a:r>
+              <a:rPr lang="da-DK" dirty="0" err="1"/>
+              <a:t>vain</a:t>
+            </a:r>
+            <a:endParaRPr lang="da-DK" dirty="0"/>
+          </a:p>
+        </p:txBody>
+      </p:sp>
+      <p:sp>
+        <p:nvSpPr>
+          <p:cNvPr id="252" name="Slide Number Placeholder 3"/>
+          <p:cNvSpPr txBox="1">
+            <a:spLocks noGrp="1"/>
+          </p:cNvSpPr>
+          <p:nvPr>
+            <p:ph type="sldNum" sz="quarter" idx="2"/>
+          </p:nvPr>
+        </p:nvSpPr>
+        <p:spPr>
+          <a:xfrm>
+            <a:off x="11506450" y="6636099"/>
+            <a:ext cx="127001" cy="127001"/>
+          </a:xfrm>
+          <a:prstGeom prst="rect">
+            <a:avLst/>
+          </a:prstGeom>
+          <a:extLst>
+            <a:ext uri="{C572A759-6A51-4108-AA02-DFA0A04FC94B}">
+              <ma14:wrappingTextBoxFlag xmlns="" xmlns:m="http://schemas.openxmlformats.org/officeDocument/2006/math" xmlns:a14="http://schemas.microsoft.com/office/drawing/2010/main" xmlns:ma14="http://schemas.microsoft.com/office/mac/drawingml/2011/main" val="1"/>
+            </a:ext>
+          </a:extLst>
+        </p:spPr>
+        <p:txBody>
+          <a:bodyPr/>
+          <a:lstStyle/>
+          <a:p>
+            <a:fld id="{86CB4B4D-7CA3-9044-876B-883B54F8677D}" type="slidenum">
+              <a:t>11</a:t>
+            </a:fld>
+            <a:endParaRPr/>
+          </a:p>
+        </p:txBody>
+      </p:sp>
+      <p:pic>
+        <p:nvPicPr>
+          <p:cNvPr id="3" name="Picture 2">
+            <a:extLst>
+              <a:ext uri="{FF2B5EF4-FFF2-40B4-BE49-F238E27FC236}">
+                <a16:creationId xmlns:a16="http://schemas.microsoft.com/office/drawing/2014/main" id="{0F080686-8093-B94D-9F4A-9CE20F5AD4FB}"/>
+              </a:ext>
+            </a:extLst>
+          </p:cNvPr>
+          <p:cNvPicPr>
+            <a:picLocks noChangeAspect="1"/>
+          </p:cNvPicPr>
+          <p:nvPr/>
+        </p:nvPicPr>
+        <p:blipFill rotWithShape="1">
+          <a:blip r:embed="rId3">
+            <a:extLst>
+              <a:ext uri="{28A0092B-C50C-407E-A947-70E740481C1C}">
+                <a14:useLocalDpi xmlns:a14="http://schemas.microsoft.com/office/drawing/2010/main" val="0"/>
+              </a:ext>
+            </a:extLst>
+          </a:blip>
+          <a:srcRect l="10227" r="11179"/>
+          <a:stretch/>
+        </p:blipFill>
+        <p:spPr>
+          <a:xfrm>
+            <a:off x="6069331" y="1398844"/>
+            <a:ext cx="5817870" cy="4877326"/>
+          </a:xfrm>
+          <a:prstGeom prst="rect">
+            <a:avLst/>
+          </a:prstGeom>
+        </p:spPr>
+      </p:pic>
+    </p:spTree>
+    <p:extLst>
+      <p:ext uri="{BB962C8B-B14F-4D97-AF65-F5344CB8AC3E}">
+        <p14:creationId xmlns:p14="http://schemas.microsoft.com/office/powerpoint/2010/main" val="3025174763"/>
+      </p:ext>
+    </p:extLst>
+  </p:cSld>
+  <p:clrMapOvr>
+    <a:masterClrMapping/>
+  </p:clrMapOvr>
+  <p:transition spd="med"/>
+</p:sld>
+</file>
+
+<file path=ppt/slides/slide12.xml><?xml version="1.0" encoding="utf-8"?>
+<p:sld xmlns:a="http://schemas.openxmlformats.org/drawingml/2006/main" xmlns:r="http://schemas.openxmlformats.org/officeDocument/2006/relationships" xmlns:p="http://schemas.openxmlformats.org/presentationml/2006/main">
+  <p:cSld>
+    <p:spTree>
+      <p:nvGrpSpPr>
+        <p:cNvPr id="1" name=""/>
+        <p:cNvGrpSpPr/>
+        <p:nvPr/>
+      </p:nvGrpSpPr>
+      <p:grpSpPr>
+        <a:xfrm>
+          <a:off x="0" y="0"/>
+          <a:ext cx="0" cy="0"/>
+          <a:chOff x="0" y="0"/>
+          <a:chExt cx="0" cy="0"/>
+        </a:xfrm>
+      </p:grpSpPr>
+      <p:sp>
+        <p:nvSpPr>
+          <p:cNvPr id="250" name="Title 4"/>
+          <p:cNvSpPr txBox="1">
+            <a:spLocks noGrp="1"/>
+          </p:cNvSpPr>
+          <p:nvPr>
+            <p:ph type="title"/>
+          </p:nvPr>
+        </p:nvSpPr>
+        <p:spPr>
+          <a:xfrm>
+            <a:off x="1774725" y="426126"/>
+            <a:ext cx="9312376" cy="972718"/>
+          </a:xfrm>
+          <a:prstGeom prst="rect">
+            <a:avLst/>
+          </a:prstGeom>
+        </p:spPr>
+        <p:txBody>
+          <a:bodyPr/>
+          <a:lstStyle/>
+          <a:p>
+            <a:r>
+              <a:rPr lang="da-DK" dirty="0"/>
+              <a:t>Chopper </a:t>
+            </a:r>
+            <a:r>
+              <a:rPr lang="da-DK" dirty="0" err="1"/>
+              <a:t>spectrometers</a:t>
+            </a:r>
+            <a:endParaRPr dirty="0"/>
+          </a:p>
+        </p:txBody>
+      </p:sp>
+      <p:sp>
+        <p:nvSpPr>
+          <p:cNvPr id="251" name="Content Placeholder 5"/>
+          <p:cNvSpPr txBox="1">
+            <a:spLocks noGrp="1"/>
+          </p:cNvSpPr>
+          <p:nvPr>
+            <p:ph type="body" idx="1"/>
+          </p:nvPr>
+        </p:nvSpPr>
+        <p:spPr>
+          <a:xfrm>
+            <a:off x="1774799" y="1706399"/>
+            <a:ext cx="4060393" cy="4545579"/>
+          </a:xfrm>
+          <a:prstGeom prst="rect">
+            <a:avLst/>
+          </a:prstGeom>
+        </p:spPr>
+        <p:txBody>
+          <a:bodyPr/>
+          <a:lstStyle/>
+          <a:p>
+            <a:r>
+              <a:rPr lang="da-DK" dirty="0" err="1"/>
+              <a:t>Only</a:t>
+            </a:r>
+            <a:r>
+              <a:rPr lang="da-DK" dirty="0"/>
+              <a:t> a small </a:t>
+            </a:r>
+            <a:r>
+              <a:rPr lang="da-DK" dirty="0" err="1"/>
+              <a:t>fraction</a:t>
+            </a:r>
+            <a:r>
+              <a:rPr lang="da-DK" dirty="0"/>
+              <a:t> of neutrons </a:t>
+            </a:r>
+            <a:r>
+              <a:rPr lang="da-DK" dirty="0" err="1"/>
+              <a:t>arrive</a:t>
+            </a:r>
+            <a:r>
+              <a:rPr lang="da-DK" dirty="0"/>
+              <a:t>, most </a:t>
+            </a:r>
+            <a:r>
+              <a:rPr lang="da-DK" dirty="0" err="1"/>
+              <a:t>are</a:t>
+            </a:r>
+            <a:r>
+              <a:rPr lang="da-DK" dirty="0"/>
+              <a:t> </a:t>
+            </a:r>
+            <a:r>
+              <a:rPr lang="da-DK" dirty="0" err="1"/>
+              <a:t>simulated</a:t>
+            </a:r>
+            <a:r>
+              <a:rPr lang="da-DK" dirty="0"/>
+              <a:t> in </a:t>
+            </a:r>
+            <a:r>
+              <a:rPr lang="da-DK" dirty="0" err="1"/>
+              <a:t>vain</a:t>
+            </a:r>
+            <a:endParaRPr lang="da-DK" dirty="0"/>
+          </a:p>
+        </p:txBody>
+      </p:sp>
+      <p:sp>
+        <p:nvSpPr>
+          <p:cNvPr id="252" name="Slide Number Placeholder 3"/>
+          <p:cNvSpPr txBox="1">
+            <a:spLocks noGrp="1"/>
+          </p:cNvSpPr>
+          <p:nvPr>
+            <p:ph type="sldNum" sz="quarter" idx="2"/>
+          </p:nvPr>
+        </p:nvSpPr>
+        <p:spPr>
+          <a:xfrm>
+            <a:off x="11506450" y="6636099"/>
+            <a:ext cx="127001" cy="127001"/>
+          </a:xfrm>
+          <a:prstGeom prst="rect">
+            <a:avLst/>
+          </a:prstGeom>
+          <a:extLst>
+            <a:ext uri="{C572A759-6A51-4108-AA02-DFA0A04FC94B}">
+              <ma14:wrappingTextBoxFlag xmlns="" xmlns:m="http://schemas.openxmlformats.org/officeDocument/2006/math" xmlns:a14="http://schemas.microsoft.com/office/drawing/2010/main" xmlns:ma14="http://schemas.microsoft.com/office/mac/drawingml/2011/main" val="1"/>
+            </a:ext>
+          </a:extLst>
+        </p:spPr>
+        <p:txBody>
+          <a:bodyPr/>
+          <a:lstStyle/>
+          <a:p>
+            <a:fld id="{86CB4B4D-7CA3-9044-876B-883B54F8677D}" type="slidenum">
+              <a:t>12</a:t>
+            </a:fld>
+            <a:endParaRPr/>
+          </a:p>
+        </p:txBody>
+      </p:sp>
+      <p:pic>
+        <p:nvPicPr>
+          <p:cNvPr id="4" name="Picture 3">
+            <a:extLst>
+              <a:ext uri="{FF2B5EF4-FFF2-40B4-BE49-F238E27FC236}">
+                <a16:creationId xmlns:a16="http://schemas.microsoft.com/office/drawing/2014/main" id="{AB78AAC7-BEE7-0642-9F58-FB54EB4ACAB4}"/>
+              </a:ext>
+            </a:extLst>
+          </p:cNvPr>
+          <p:cNvPicPr>
+            <a:picLocks noChangeAspect="1"/>
+          </p:cNvPicPr>
+          <p:nvPr/>
+        </p:nvPicPr>
+        <p:blipFill>
+          <a:blip r:embed="rId2">
+            <a:extLst>
+              <a:ext uri="{28A0092B-C50C-407E-A947-70E740481C1C}">
+                <a14:useLocalDpi xmlns:a14="http://schemas.microsoft.com/office/drawing/2010/main" val="0"/>
+              </a:ext>
+            </a:extLst>
+          </a:blip>
+          <a:stretch>
+            <a:fillRect/>
+          </a:stretch>
+        </p:blipFill>
+        <p:spPr>
+          <a:xfrm>
+            <a:off x="5835192" y="1517714"/>
+            <a:ext cx="6203647" cy="4529797"/>
+          </a:xfrm>
+          <a:prstGeom prst="rect">
+            <a:avLst/>
+          </a:prstGeom>
+        </p:spPr>
+      </p:pic>
+    </p:spTree>
+    <p:extLst>
+      <p:ext uri="{BB962C8B-B14F-4D97-AF65-F5344CB8AC3E}">
+        <p14:creationId xmlns:p14="http://schemas.microsoft.com/office/powerpoint/2010/main" val="2263456193"/>
+      </p:ext>
+    </p:extLst>
+  </p:cSld>
+  <p:clrMapOvr>
+    <a:masterClrMapping/>
+  </p:clrMapOvr>
+  <p:transition spd="med"/>
+</p:sld>
+</file>
+
+<file path=ppt/slides/slide13.xml><?xml version="1.0" encoding="utf-8"?>
+<p:sld xmlns:a="http://schemas.openxmlformats.org/drawingml/2006/main" xmlns:r="http://schemas.openxmlformats.org/officeDocument/2006/relationships" xmlns:p="http://schemas.openxmlformats.org/presentationml/2006/main">
+  <p:cSld>
+    <p:spTree>
+      <p:nvGrpSpPr>
+        <p:cNvPr id="1" name=""/>
+        <p:cNvGrpSpPr/>
+        <p:nvPr/>
+      </p:nvGrpSpPr>
+      <p:grpSpPr>
+        <a:xfrm>
+          <a:off x="0" y="0"/>
+          <a:ext cx="0" cy="0"/>
+          <a:chOff x="0" y="0"/>
+          <a:chExt cx="0" cy="0"/>
+        </a:xfrm>
+      </p:grpSpPr>
+      <p:sp>
+        <p:nvSpPr>
+          <p:cNvPr id="250" name="Title 4"/>
+          <p:cNvSpPr txBox="1">
+            <a:spLocks noGrp="1"/>
+          </p:cNvSpPr>
+          <p:nvPr>
+            <p:ph type="title"/>
+          </p:nvPr>
+        </p:nvSpPr>
+        <p:spPr>
+          <a:xfrm>
+            <a:off x="1774725" y="426126"/>
+            <a:ext cx="9312376" cy="972718"/>
+          </a:xfrm>
+          <a:prstGeom prst="rect">
+            <a:avLst/>
+          </a:prstGeom>
+        </p:spPr>
+        <p:txBody>
+          <a:bodyPr/>
+          <a:lstStyle/>
+          <a:p>
+            <a:r>
+              <a:rPr lang="da-DK" dirty="0" err="1"/>
+              <a:t>Conclusion</a:t>
             </a:r>
             <a:endParaRPr dirty="0"/>
           </a:p>
@@ -9387,12 +8607,8 @@
           <a:lstStyle/>
           <a:p>
             <a:r>
-              <a:rPr lang="da-DK" dirty="0"/>
-              <a:t>One </a:t>
-            </a:r>
-            <a:r>
               <a:rPr lang="da-DK" dirty="0" err="1"/>
-              <a:t>isotropic</a:t>
+              <a:t>Inelastic</a:t>
             </a:r>
             <a:r>
               <a:rPr lang="da-DK" dirty="0"/>
@@ -9400,7 +8616,7 @@
             </a:r>
             <a:r>
               <a:rPr lang="da-DK" dirty="0" err="1"/>
-              <a:t>acustic</a:t>
+              <a:t>scattering</a:t>
             </a:r>
             <a:r>
               <a:rPr lang="da-DK" dirty="0"/>
@@ -9408,7 +8624,23 @@
             </a:r>
             <a:r>
               <a:rPr lang="da-DK" dirty="0" err="1"/>
-              <a:t>phonon</a:t>
+              <a:t>supported</a:t>
+            </a:r>
+            <a:r>
+              <a:rPr lang="da-DK" dirty="0"/>
+              <a:t> in </a:t>
+            </a:r>
+            <a:r>
+              <a:rPr lang="da-DK" dirty="0" err="1"/>
+              <a:t>McStas</a:t>
+            </a:r>
+            <a:r>
+              <a:rPr lang="da-DK" dirty="0"/>
+              <a:t>, but </a:t>
+            </a:r>
+            <a:r>
+              <a:rPr lang="da-DK" dirty="0" err="1"/>
+              <a:t>could</a:t>
             </a:r>
             <a:r>
               <a:rPr lang="da-DK" dirty="0"/>
@@ -9416,32 +8648,730 @@
             </a:r>
             <a:r>
               <a:rPr lang="da-DK" dirty="0" err="1"/>
-              <a:t>branch</a:t>
+              <a:t>use</a:t>
             </a:r>
             <a:r>
               <a:rPr lang="da-DK" dirty="0"/>
-              <a:t> in all </a:t>
+              <a:t> more sample components</a:t>
+            </a:r>
+          </a:p>
+          <a:p>
+            <a:r>
+              <a:rPr lang="da-DK" dirty="0"/>
+              <a:t>Longer </a:t>
             </a:r>
             <a:r>
               <a:rPr lang="da-DK" dirty="0" err="1"/>
-              <a:t>Briullion</a:t>
+              <a:t>computational</a:t>
             </a:r>
             <a:r>
               <a:rPr lang="da-DK" dirty="0"/>
-              <a:t> zones on FCC </a:t>
+              <a:t> times </a:t>
             </a:r>
             <a:r>
               <a:rPr lang="da-DK" dirty="0" err="1"/>
-              <a:t>bravis</a:t>
-            </a:r>
+              <a:t>required</a:t>
+            </a:r>
+            <a:endParaRPr lang="da-DK" dirty="0"/>
+          </a:p>
+          <a:p>
             <a:r>
               <a:rPr lang="da-DK" dirty="0"/>
-              <a:t> single </a:t>
+              <a:t>Advantages from simulation </a:t>
             </a:r>
             <a:r>
               <a:rPr lang="da-DK" dirty="0" err="1"/>
-              <a:t>crystal</a:t>
-            </a:r>
+              <a:t>especially</a:t>
+            </a:r>
+            <a:r>
+              <a:rPr lang="da-DK" dirty="0"/>
+              <a:t> </a:t>
+            </a:r>
+            <a:r>
+              <a:rPr lang="da-DK" dirty="0" err="1"/>
+              <a:t>important</a:t>
+            </a:r>
+            <a:r>
+              <a:rPr lang="da-DK" dirty="0"/>
+              <a:t> for </a:t>
+            </a:r>
+            <a:r>
+              <a:rPr lang="da-DK" dirty="0" err="1"/>
+              <a:t>spectroscopy</a:t>
+            </a:r>
+            <a:r>
+              <a:rPr lang="da-DK" dirty="0"/>
+              <a:t> (resolution </a:t>
+            </a:r>
+            <a:r>
+              <a:rPr lang="da-DK" dirty="0" err="1"/>
+              <a:t>function</a:t>
+            </a:r>
+            <a:r>
+              <a:rPr lang="da-DK" dirty="0"/>
+              <a:t>)</a:t>
+            </a:r>
+            <a:endParaRPr dirty="0"/>
+          </a:p>
+        </p:txBody>
+      </p:sp>
+      <p:sp>
+        <p:nvSpPr>
+          <p:cNvPr id="252" name="Slide Number Placeholder 3"/>
+          <p:cNvSpPr txBox="1">
+            <a:spLocks noGrp="1"/>
+          </p:cNvSpPr>
+          <p:nvPr>
+            <p:ph type="sldNum" sz="quarter" idx="2"/>
+          </p:nvPr>
+        </p:nvSpPr>
+        <p:spPr>
+          <a:xfrm>
+            <a:off x="11506450" y="6636099"/>
+            <a:ext cx="127001" cy="127001"/>
+          </a:xfrm>
+          <a:prstGeom prst="rect">
+            <a:avLst/>
+          </a:prstGeom>
+          <a:extLst>
+            <a:ext uri="{C572A759-6A51-4108-AA02-DFA0A04FC94B}">
+              <ma14:wrappingTextBoxFlag xmlns="" xmlns:m="http://schemas.openxmlformats.org/officeDocument/2006/math" xmlns:a14="http://schemas.microsoft.com/office/drawing/2010/main" xmlns:ma14="http://schemas.microsoft.com/office/mac/drawingml/2011/main" val="1"/>
+            </a:ext>
+          </a:extLst>
+        </p:spPr>
+        <p:txBody>
+          <a:bodyPr/>
+          <a:lstStyle/>
+          <a:p>
+            <a:fld id="{86CB4B4D-7CA3-9044-876B-883B54F8677D}" type="slidenum">
+              <a:t>13</a:t>
+            </a:fld>
+            <a:endParaRPr/>
+          </a:p>
+        </p:txBody>
+      </p:sp>
+    </p:spTree>
+    <p:extLst>
+      <p:ext uri="{BB962C8B-B14F-4D97-AF65-F5344CB8AC3E}">
+        <p14:creationId xmlns:p14="http://schemas.microsoft.com/office/powerpoint/2010/main" val="84746531"/>
+      </p:ext>
+    </p:extLst>
+  </p:cSld>
+  <p:clrMapOvr>
+    <a:masterClrMapping/>
+  </p:clrMapOvr>
+  <p:transition spd="med"/>
+</p:sld>
+</file>
+
+<file path=ppt/slides/slide14.xml><?xml version="1.0" encoding="utf-8"?>
+<p:sld xmlns:a="http://schemas.openxmlformats.org/drawingml/2006/main" xmlns:r="http://schemas.openxmlformats.org/officeDocument/2006/relationships" xmlns:p="http://schemas.openxmlformats.org/presentationml/2006/main">
+  <p:cSld>
+    <p:spTree>
+      <p:nvGrpSpPr>
+        <p:cNvPr id="1" name=""/>
+        <p:cNvGrpSpPr/>
+        <p:nvPr/>
+      </p:nvGrpSpPr>
+      <p:grpSpPr>
+        <a:xfrm>
+          <a:off x="0" y="0"/>
+          <a:ext cx="0" cy="0"/>
+          <a:chOff x="0" y="0"/>
+          <a:chExt cx="0" cy="0"/>
+        </a:xfrm>
+      </p:grpSpPr>
+      <p:sp>
+        <p:nvSpPr>
+          <p:cNvPr id="250" name="Title 4"/>
+          <p:cNvSpPr txBox="1">
+            <a:spLocks noGrp="1"/>
+          </p:cNvSpPr>
+          <p:nvPr>
+            <p:ph type="title"/>
+          </p:nvPr>
+        </p:nvSpPr>
+        <p:spPr>
+          <a:xfrm>
+            <a:off x="1774725" y="426126"/>
+            <a:ext cx="9312376" cy="972718"/>
+          </a:xfrm>
+          <a:prstGeom prst="rect">
+            <a:avLst/>
+          </a:prstGeom>
+        </p:spPr>
+        <p:txBody>
+          <a:bodyPr/>
+          <a:lstStyle/>
+          <a:p>
+            <a:r>
+              <a:rPr lang="da-DK" dirty="0" err="1"/>
+              <a:t>Exercise</a:t>
+            </a:r>
+            <a:endParaRPr dirty="0"/>
+          </a:p>
+        </p:txBody>
+      </p:sp>
+      <p:sp>
+        <p:nvSpPr>
+          <p:cNvPr id="251" name="Content Placeholder 5"/>
+          <p:cNvSpPr txBox="1">
+            <a:spLocks noGrp="1"/>
+          </p:cNvSpPr>
+          <p:nvPr>
+            <p:ph type="body" idx="1"/>
+          </p:nvPr>
+        </p:nvSpPr>
+        <p:spPr>
+          <a:xfrm>
+            <a:off x="1774799" y="1706399"/>
+            <a:ext cx="9312376" cy="4545579"/>
+          </a:xfrm>
+          <a:prstGeom prst="rect">
+            <a:avLst/>
+          </a:prstGeom>
+        </p:spPr>
+        <p:txBody>
+          <a:bodyPr>
+            <a:normAutofit/>
+          </a:bodyPr>
+          <a:lstStyle/>
+          <a:p>
+            <a:r>
+              <a:rPr lang="da-DK" sz="2200" dirty="0" err="1"/>
+              <a:t>Use</a:t>
+            </a:r>
+            <a:r>
+              <a:rPr lang="da-DK" sz="2200" dirty="0"/>
+              <a:t> </a:t>
+            </a:r>
+            <a:r>
+              <a:rPr lang="da-DK" sz="2200" dirty="0" err="1"/>
+              <a:t>provided</a:t>
+            </a:r>
+            <a:r>
+              <a:rPr lang="da-DK" sz="2200" dirty="0"/>
+              <a:t> TAS instrument to scan the </a:t>
+            </a:r>
+            <a:r>
+              <a:rPr lang="da-DK" sz="2200" dirty="0" err="1"/>
+              <a:t>phonon</a:t>
+            </a:r>
+            <a:r>
+              <a:rPr lang="da-DK" sz="2200" dirty="0"/>
+              <a:t> dispersion</a:t>
+            </a:r>
+          </a:p>
+          <a:p>
+            <a:r>
+              <a:rPr lang="da-DK" sz="2200" dirty="0" err="1"/>
+              <a:t>Requires</a:t>
+            </a:r>
+            <a:r>
+              <a:rPr lang="da-DK" sz="2200" dirty="0"/>
+              <a:t> </a:t>
+            </a:r>
+            <a:r>
+              <a:rPr lang="da-DK" sz="2200" dirty="0" err="1"/>
+              <a:t>that</a:t>
+            </a:r>
+            <a:r>
+              <a:rPr lang="da-DK" sz="2200" dirty="0"/>
+              <a:t> </a:t>
+            </a:r>
+            <a:r>
+              <a:rPr lang="da-DK" sz="2200" dirty="0" err="1"/>
+              <a:t>you</a:t>
+            </a:r>
+            <a:r>
+              <a:rPr lang="da-DK" sz="2200" dirty="0"/>
+              <a:t> </a:t>
+            </a:r>
+            <a:r>
+              <a:rPr lang="da-DK" sz="2200" dirty="0" err="1"/>
+              <a:t>work</a:t>
+            </a:r>
+            <a:r>
+              <a:rPr lang="da-DK" sz="2200" dirty="0"/>
+              <a:t> in folder </a:t>
+            </a:r>
+            <a:r>
+              <a:rPr lang="da-DK" sz="2200" dirty="0" err="1"/>
+              <a:t>containing</a:t>
+            </a:r>
+            <a:r>
+              <a:rPr lang="da-DK" sz="2200" dirty="0"/>
+              <a:t> components from the zip file</a:t>
+            </a:r>
+          </a:p>
+          <a:p>
+            <a:r>
+              <a:rPr lang="da-DK" sz="2200" dirty="0" err="1"/>
+              <a:t>Futrher</a:t>
+            </a:r>
+            <a:r>
+              <a:rPr lang="da-DK" sz="2200" dirty="0"/>
+              <a:t> </a:t>
+            </a:r>
+            <a:r>
+              <a:rPr lang="da-DK" sz="2200" dirty="0" err="1"/>
+              <a:t>explanation</a:t>
+            </a:r>
+            <a:r>
+              <a:rPr lang="da-DK" sz="2200" dirty="0"/>
+              <a:t> on </a:t>
+            </a:r>
+            <a:r>
+              <a:rPr lang="da-DK" sz="2200" dirty="0" err="1"/>
+              <a:t>github</a:t>
+            </a:r>
+            <a:endParaRPr lang="da-DK" sz="2200" dirty="0"/>
+          </a:p>
+          <a:p>
+            <a:pPr marL="0" indent="0">
+              <a:buNone/>
+            </a:pPr>
+            <a:endParaRPr lang="da-DK" sz="2200" dirty="0"/>
+          </a:p>
+          <a:p>
+            <a:endParaRPr lang="da-DK" sz="2200" dirty="0"/>
+          </a:p>
+          <a:p>
+            <a:endParaRPr lang="da-DK" sz="2200" dirty="0"/>
+          </a:p>
+          <a:p>
+            <a:endParaRPr sz="2200" dirty="0"/>
+          </a:p>
+        </p:txBody>
+      </p:sp>
+      <p:sp>
+        <p:nvSpPr>
+          <p:cNvPr id="252" name="Slide Number Placeholder 3"/>
+          <p:cNvSpPr txBox="1">
+            <a:spLocks noGrp="1"/>
+          </p:cNvSpPr>
+          <p:nvPr>
+            <p:ph type="sldNum" sz="quarter" idx="2"/>
+          </p:nvPr>
+        </p:nvSpPr>
+        <p:spPr>
+          <a:xfrm>
+            <a:off x="11506450" y="6636099"/>
+            <a:ext cx="127001" cy="127001"/>
+          </a:xfrm>
+          <a:prstGeom prst="rect">
+            <a:avLst/>
+          </a:prstGeom>
+          <a:extLst>
+            <a:ext uri="{C572A759-6A51-4108-AA02-DFA0A04FC94B}">
+              <ma14:wrappingTextBoxFlag xmlns="" xmlns:m="http://schemas.openxmlformats.org/officeDocument/2006/math" xmlns:a14="http://schemas.microsoft.com/office/drawing/2010/main" xmlns:ma14="http://schemas.microsoft.com/office/mac/drawingml/2011/main" val="1"/>
+            </a:ext>
+          </a:extLst>
+        </p:spPr>
+        <p:txBody>
+          <a:bodyPr/>
+          <a:lstStyle/>
+          <a:p>
+            <a:fld id="{86CB4B4D-7CA3-9044-876B-883B54F8677D}" type="slidenum">
+              <a:t>14</a:t>
+            </a:fld>
+            <a:endParaRPr/>
+          </a:p>
+        </p:txBody>
+      </p:sp>
+    </p:spTree>
+    <p:extLst>
+      <p:ext uri="{BB962C8B-B14F-4D97-AF65-F5344CB8AC3E}">
+        <p14:creationId xmlns:p14="http://schemas.microsoft.com/office/powerpoint/2010/main" val="4247886268"/>
+      </p:ext>
+    </p:extLst>
+  </p:cSld>
+  <p:clrMapOvr>
+    <a:masterClrMapping/>
+  </p:clrMapOvr>
+  <p:transition spd="med"/>
+</p:sld>
+</file>
+
+<file path=ppt/slides/slide2.xml><?xml version="1.0" encoding="utf-8"?>
+<p:sld xmlns:a="http://schemas.openxmlformats.org/drawingml/2006/main" xmlns:r="http://schemas.openxmlformats.org/officeDocument/2006/relationships" xmlns:p="http://schemas.openxmlformats.org/presentationml/2006/main">
+  <p:cSld>
+    <p:spTree>
+      <p:nvGrpSpPr>
+        <p:cNvPr id="1" name=""/>
+        <p:cNvGrpSpPr/>
+        <p:nvPr/>
+      </p:nvGrpSpPr>
+      <p:grpSpPr>
+        <a:xfrm>
+          <a:off x="0" y="0"/>
+          <a:ext cx="0" cy="0"/>
+          <a:chOff x="0" y="0"/>
+          <a:chExt cx="0" cy="0"/>
+        </a:xfrm>
+      </p:grpSpPr>
+      <p:sp>
+        <p:nvSpPr>
+          <p:cNvPr id="250" name="Title 4"/>
+          <p:cNvSpPr txBox="1">
+            <a:spLocks noGrp="1"/>
+          </p:cNvSpPr>
+          <p:nvPr>
+            <p:ph type="title"/>
+          </p:nvPr>
+        </p:nvSpPr>
+        <p:spPr>
+          <a:xfrm>
+            <a:off x="1774725" y="426126"/>
+            <a:ext cx="9312376" cy="972718"/>
+          </a:xfrm>
+          <a:prstGeom prst="rect">
+            <a:avLst/>
+          </a:prstGeom>
+        </p:spPr>
+        <p:txBody>
+          <a:bodyPr/>
+          <a:lstStyle/>
+          <a:p>
+            <a:r>
+              <a:rPr lang="da-DK" dirty="0" err="1"/>
+              <a:t>Inelastic</a:t>
+            </a:r>
+            <a:r>
+              <a:rPr lang="da-DK" dirty="0"/>
+              <a:t> </a:t>
+            </a:r>
+            <a:r>
+              <a:rPr lang="da-DK" dirty="0" err="1"/>
+              <a:t>scattering</a:t>
+            </a:r>
+            <a:r>
+              <a:rPr lang="da-DK" dirty="0"/>
+              <a:t> in </a:t>
+            </a:r>
+            <a:r>
+              <a:rPr lang="da-DK" dirty="0" err="1"/>
+              <a:t>McStas</a:t>
+            </a:r>
+            <a:endParaRPr dirty="0"/>
+          </a:p>
+        </p:txBody>
+      </p:sp>
+      <p:sp>
+        <p:nvSpPr>
+          <p:cNvPr id="251" name="Content Placeholder 5"/>
+          <p:cNvSpPr txBox="1">
+            <a:spLocks noGrp="1"/>
+          </p:cNvSpPr>
+          <p:nvPr>
+            <p:ph type="body" idx="1"/>
+          </p:nvPr>
+        </p:nvSpPr>
+        <p:spPr>
+          <a:xfrm>
+            <a:off x="1774799" y="1706399"/>
+            <a:ext cx="9312376" cy="4545579"/>
+          </a:xfrm>
+          <a:prstGeom prst="rect">
+            <a:avLst/>
+          </a:prstGeom>
+        </p:spPr>
+        <p:txBody>
+          <a:bodyPr/>
+          <a:lstStyle/>
+          <a:p>
+            <a:r>
+              <a:rPr lang="da-DK" dirty="0" err="1"/>
+              <a:t>Introduction</a:t>
+            </a:r>
+            <a:r>
+              <a:rPr lang="da-DK" dirty="0"/>
+              <a:t> to </a:t>
+            </a:r>
+            <a:r>
+              <a:rPr lang="da-DK" dirty="0" err="1"/>
+              <a:t>inelastic</a:t>
+            </a:r>
+            <a:r>
+              <a:rPr lang="da-DK" dirty="0"/>
+              <a:t> </a:t>
+            </a:r>
+            <a:r>
+              <a:rPr lang="da-DK" dirty="0" err="1"/>
+              <a:t>scattering</a:t>
+            </a:r>
+            <a:endParaRPr lang="da-DK" dirty="0"/>
+          </a:p>
+          <a:p>
+            <a:r>
+              <a:rPr lang="da-DK" dirty="0" err="1"/>
+              <a:t>Included</a:t>
+            </a:r>
+            <a:r>
+              <a:rPr lang="da-DK" dirty="0"/>
+              <a:t> components</a:t>
+            </a:r>
+          </a:p>
+          <a:p>
+            <a:pPr lvl="2"/>
+            <a:r>
+              <a:rPr lang="da-DK" dirty="0" err="1"/>
+              <a:t>Phonon_simple</a:t>
+            </a:r>
+            <a:endParaRPr lang="da-DK" dirty="0"/>
+          </a:p>
+          <a:p>
+            <a:pPr lvl="2"/>
+            <a:r>
+              <a:rPr lang="da-DK" dirty="0" err="1"/>
+              <a:t>Isotropic_sqw</a:t>
+            </a:r>
+            <a:endParaRPr lang="da-DK" dirty="0"/>
+          </a:p>
+          <a:p>
+            <a:r>
+              <a:rPr lang="da-DK" dirty="0"/>
+              <a:t>Sampling </a:t>
+            </a:r>
+            <a:r>
+              <a:rPr lang="da-DK" dirty="0" err="1"/>
+              <a:t>performnace</a:t>
+            </a:r>
+            <a:r>
+              <a:rPr lang="da-DK" dirty="0"/>
+              <a:t> with data approach</a:t>
+            </a:r>
+          </a:p>
+          <a:p>
+            <a:endParaRPr lang="da-DK" dirty="0"/>
+          </a:p>
+          <a:p>
+            <a:r>
+              <a:rPr lang="da-DK" dirty="0" err="1"/>
+              <a:t>McStas</a:t>
+            </a:r>
+            <a:r>
+              <a:rPr lang="da-DK" dirty="0"/>
+              <a:t> performance, TAS / Chopper </a:t>
+            </a:r>
+          </a:p>
+          <a:p>
+            <a:r>
+              <a:rPr lang="da-DK" dirty="0" err="1"/>
+              <a:t>Exercise</a:t>
+            </a:r>
+            <a:endParaRPr lang="da-DK" dirty="0"/>
+          </a:p>
+          <a:p>
+            <a:endParaRPr dirty="0"/>
+          </a:p>
+        </p:txBody>
+      </p:sp>
+      <p:sp>
+        <p:nvSpPr>
+          <p:cNvPr id="252" name="Slide Number Placeholder 3"/>
+          <p:cNvSpPr txBox="1">
+            <a:spLocks noGrp="1"/>
+          </p:cNvSpPr>
+          <p:nvPr>
+            <p:ph type="sldNum" sz="quarter" idx="2"/>
+          </p:nvPr>
+        </p:nvSpPr>
+        <p:spPr>
+          <a:xfrm>
+            <a:off x="11506450" y="6636099"/>
+            <a:ext cx="127001" cy="127001"/>
+          </a:xfrm>
+          <a:prstGeom prst="rect">
+            <a:avLst/>
+          </a:prstGeom>
+          <a:extLst>
+            <a:ext uri="{C572A759-6A51-4108-AA02-DFA0A04FC94B}">
+              <ma14:wrappingTextBoxFlag xmlns="" xmlns:m="http://schemas.openxmlformats.org/officeDocument/2006/math" xmlns:a14="http://schemas.microsoft.com/office/drawing/2010/main" xmlns:ma14="http://schemas.microsoft.com/office/mac/drawingml/2011/main" val="1"/>
+            </a:ext>
+          </a:extLst>
+        </p:spPr>
+        <p:txBody>
+          <a:bodyPr/>
+          <a:lstStyle/>
+          <a:p>
+            <a:fld id="{86CB4B4D-7CA3-9044-876B-883B54F8677D}" type="slidenum">
+              <a:t>2</a:t>
+            </a:fld>
+            <a:endParaRPr/>
+          </a:p>
+        </p:txBody>
+      </p:sp>
+    </p:spTree>
+  </p:cSld>
+  <p:clrMapOvr>
+    <a:masterClrMapping/>
+  </p:clrMapOvr>
+  <p:transition spd="med"/>
+</p:sld>
+</file>
+
+<file path=ppt/slides/slide3.xml><?xml version="1.0" encoding="utf-8"?>
+<p:sld xmlns:a="http://schemas.openxmlformats.org/drawingml/2006/main" xmlns:r="http://schemas.openxmlformats.org/officeDocument/2006/relationships" xmlns:p="http://schemas.openxmlformats.org/presentationml/2006/main">
+  <p:cSld>
+    <p:spTree>
+      <p:nvGrpSpPr>
+        <p:cNvPr id="1" name=""/>
+        <p:cNvGrpSpPr/>
+        <p:nvPr/>
+      </p:nvGrpSpPr>
+      <p:grpSpPr>
+        <a:xfrm>
+          <a:off x="0" y="0"/>
+          <a:ext cx="0" cy="0"/>
+          <a:chOff x="0" y="0"/>
+          <a:chExt cx="0" cy="0"/>
+        </a:xfrm>
+      </p:grpSpPr>
+      <p:sp>
+        <p:nvSpPr>
+          <p:cNvPr id="250" name="Title 4"/>
+          <p:cNvSpPr txBox="1">
+            <a:spLocks noGrp="1"/>
+          </p:cNvSpPr>
+          <p:nvPr>
+            <p:ph type="title"/>
+          </p:nvPr>
+        </p:nvSpPr>
+        <p:spPr>
+          <a:xfrm>
+            <a:off x="1774725" y="426126"/>
+            <a:ext cx="9312376" cy="972718"/>
+          </a:xfrm>
+          <a:prstGeom prst="rect">
+            <a:avLst/>
+          </a:prstGeom>
+        </p:spPr>
+        <p:txBody>
+          <a:bodyPr/>
+          <a:lstStyle/>
+          <a:p>
+            <a:r>
+              <a:rPr lang="da-DK" dirty="0" err="1"/>
+              <a:t>Inelastic</a:t>
+            </a:r>
+            <a:r>
+              <a:rPr lang="da-DK" dirty="0"/>
+              <a:t> </a:t>
+            </a:r>
+            <a:r>
+              <a:rPr lang="da-DK" dirty="0" err="1"/>
+              <a:t>scattering</a:t>
+            </a:r>
+            <a:r>
+              <a:rPr lang="da-DK" dirty="0"/>
+              <a:t> S(</a:t>
+            </a:r>
+            <a:r>
+              <a:rPr lang="da-DK" dirty="0" err="1"/>
+              <a:t>q,w</a:t>
+            </a:r>
+            <a:r>
+              <a:rPr lang="da-DK" dirty="0"/>
+              <a:t>)</a:t>
+            </a:r>
+            <a:endParaRPr dirty="0"/>
+          </a:p>
+        </p:txBody>
+      </p:sp>
+      <p:sp>
+        <p:nvSpPr>
+          <p:cNvPr id="251" name="Content Placeholder 5"/>
+          <p:cNvSpPr txBox="1">
+            <a:spLocks noGrp="1"/>
+          </p:cNvSpPr>
+          <p:nvPr>
+            <p:ph type="body" idx="1"/>
+          </p:nvPr>
+        </p:nvSpPr>
+        <p:spPr>
+          <a:xfrm>
+            <a:off x="1774799" y="1706399"/>
+            <a:ext cx="9312376" cy="4545579"/>
+          </a:xfrm>
+          <a:prstGeom prst="rect">
+            <a:avLst/>
+          </a:prstGeom>
+        </p:spPr>
+        <p:txBody>
+          <a:bodyPr/>
+          <a:lstStyle/>
+          <a:p>
+            <a:r>
+              <a:rPr lang="da-DK" dirty="0" err="1"/>
+              <a:t>partial</a:t>
+            </a:r>
+            <a:r>
+              <a:rPr lang="da-DK" dirty="0"/>
+              <a:t> </a:t>
+            </a:r>
+            <a:r>
+              <a:rPr lang="da-DK" dirty="0" err="1"/>
+              <a:t>differential</a:t>
+            </a:r>
+            <a:r>
+              <a:rPr lang="da-DK" dirty="0"/>
+              <a:t> </a:t>
+            </a:r>
+            <a:r>
+              <a:rPr lang="da-DK" dirty="0" err="1"/>
+              <a:t>cross</a:t>
+            </a:r>
+            <a:r>
+              <a:rPr lang="da-DK" dirty="0"/>
+              <a:t> </a:t>
+            </a:r>
+            <a:r>
+              <a:rPr lang="da-DK" dirty="0" err="1"/>
+              <a:t>section</a:t>
+            </a:r>
+            <a:endParaRPr lang="da-DK" dirty="0"/>
+          </a:p>
+          <a:p>
+            <a:r>
+              <a:rPr lang="da-DK" dirty="0" err="1"/>
+              <a:t>Scattering</a:t>
+            </a:r>
+            <a:r>
+              <a:rPr lang="da-DK" dirty="0"/>
+              <a:t> </a:t>
+            </a:r>
+            <a:r>
+              <a:rPr lang="da-DK" dirty="0" err="1"/>
+              <a:t>function</a:t>
+            </a:r>
+            <a:endParaRPr lang="da-DK" dirty="0"/>
+          </a:p>
+          <a:p>
+            <a:endParaRPr lang="da-DK" dirty="0"/>
+          </a:p>
+          <a:p>
+            <a:r>
+              <a:rPr lang="da-DK" dirty="0" err="1"/>
+              <a:t>Phonons</a:t>
+            </a:r>
+            <a:r>
+              <a:rPr lang="da-DK" dirty="0"/>
+              <a:t>, Spin </a:t>
+            </a:r>
+            <a:r>
+              <a:rPr lang="da-DK" dirty="0" err="1"/>
+              <a:t>waves</a:t>
+            </a:r>
+            <a:r>
+              <a:rPr lang="da-DK" dirty="0"/>
+              <a:t>, … </a:t>
+            </a:r>
+          </a:p>
+          <a:p>
+            <a:pPr marL="0" indent="0">
+              <a:buNone/>
+            </a:pPr>
             <a:endParaRPr lang="da-DK" dirty="0"/>
           </a:p>
         </p:txBody>
@@ -9466,7 +9396,7 @@
           </a:prstGeom>
           <a:extLst>
             <a:ext uri="{C572A759-6A51-4108-AA02-DFA0A04FC94B}">
-              <ma14:wrappingTextBoxFlag xmlns:ma14="http://schemas.microsoft.com/office/mac/drawingml/2011/main" xmlns:a14="http://schemas.microsoft.com/office/drawing/2010/main" xmlns:m="http://schemas.openxmlformats.org/officeDocument/2006/math" xmlns="" val="1"/>
+              <ma14:wrappingTextBoxFlag xmlns="" xmlns:m="http://schemas.openxmlformats.org/officeDocument/2006/math" xmlns:a14="http://schemas.microsoft.com/office/drawing/2010/main" xmlns:ma14="http://schemas.microsoft.com/office/mac/drawingml/2011/main" val="1"/>
             </a:ext>
           </a:extLst>
         </p:spPr>
@@ -9475,7 +9405,268 @@
           <a:lstStyle/>
           <a:p>
             <a:fld id="{86CB4B4D-7CA3-9044-876B-883B54F8677D}" type="slidenum">
-              <a:t>5</a:t>
+              <a:t>3</a:t>
+            </a:fld>
+            <a:endParaRPr/>
+          </a:p>
+        </p:txBody>
+      </p:sp>
+      <p:pic>
+        <p:nvPicPr>
+          <p:cNvPr id="3" name="Picture 2">
+            <a:extLst>
+              <a:ext uri="{FF2B5EF4-FFF2-40B4-BE49-F238E27FC236}">
+                <a16:creationId xmlns:a16="http://schemas.microsoft.com/office/drawing/2014/main" id="{83D8247C-D927-CB4F-9015-2A7E2B58D014}"/>
+              </a:ext>
+            </a:extLst>
+          </p:cNvPr>
+          <p:cNvPicPr>
+            <a:picLocks noChangeAspect="1"/>
+          </p:cNvPicPr>
+          <p:nvPr/>
+        </p:nvPicPr>
+        <p:blipFill>
+          <a:blip r:embed="rId2">
+            <a:extLst>
+              <a:ext uri="{28A0092B-C50C-407E-A947-70E740481C1C}">
+                <a14:useLocalDpi xmlns:a14="http://schemas.microsoft.com/office/drawing/2010/main" val="0"/>
+              </a:ext>
+            </a:extLst>
+          </a:blip>
+          <a:stretch>
+            <a:fillRect/>
+          </a:stretch>
+        </p:blipFill>
+        <p:spPr>
+          <a:xfrm>
+            <a:off x="3115753" y="3345039"/>
+            <a:ext cx="3745648" cy="876386"/>
+          </a:xfrm>
+          <a:prstGeom prst="rect">
+            <a:avLst/>
+          </a:prstGeom>
+        </p:spPr>
+      </p:pic>
+      <p:pic>
+        <p:nvPicPr>
+          <p:cNvPr id="5" name="Picture 4">
+            <a:extLst>
+              <a:ext uri="{FF2B5EF4-FFF2-40B4-BE49-F238E27FC236}">
+                <a16:creationId xmlns:a16="http://schemas.microsoft.com/office/drawing/2014/main" id="{82FE419C-350B-004E-8768-1ED2FFC98DC1}"/>
+              </a:ext>
+            </a:extLst>
+          </p:cNvPr>
+          <p:cNvPicPr>
+            <a:picLocks noChangeAspect="1"/>
+          </p:cNvPicPr>
+          <p:nvPr/>
+        </p:nvPicPr>
+        <p:blipFill>
+          <a:blip r:embed="rId3">
+            <a:alphaModFix/>
+            <a:extLst>
+              <a:ext uri="{28A0092B-C50C-407E-A947-70E740481C1C}">
+                <a14:useLocalDpi xmlns:a14="http://schemas.microsoft.com/office/drawing/2010/main" val="0"/>
+              </a:ext>
+            </a:extLst>
+          </a:blip>
+          <a:stretch>
+            <a:fillRect/>
+          </a:stretch>
+        </p:blipFill>
+        <p:spPr>
+          <a:xfrm>
+            <a:off x="3537273" y="4221425"/>
+            <a:ext cx="6359080" cy="776107"/>
+          </a:xfrm>
+          <a:prstGeom prst="rect">
+            <a:avLst/>
+          </a:prstGeom>
+        </p:spPr>
+      </p:pic>
+    </p:spTree>
+    <p:extLst>
+      <p:ext uri="{BB962C8B-B14F-4D97-AF65-F5344CB8AC3E}">
+        <p14:creationId xmlns:p14="http://schemas.microsoft.com/office/powerpoint/2010/main" val="3605928242"/>
+      </p:ext>
+    </p:extLst>
+  </p:cSld>
+  <p:clrMapOvr>
+    <a:masterClrMapping/>
+  </p:clrMapOvr>
+  <p:transition spd="med"/>
+</p:sld>
+</file>
+
+<file path=ppt/slides/slide4.xml><?xml version="1.0" encoding="utf-8"?>
+<p:sld xmlns:a="http://schemas.openxmlformats.org/drawingml/2006/main" xmlns:r="http://schemas.openxmlformats.org/officeDocument/2006/relationships" xmlns:p="http://schemas.openxmlformats.org/presentationml/2006/main">
+  <p:cSld>
+    <p:spTree>
+      <p:nvGrpSpPr>
+        <p:cNvPr id="1" name=""/>
+        <p:cNvGrpSpPr/>
+        <p:nvPr/>
+      </p:nvGrpSpPr>
+      <p:grpSpPr>
+        <a:xfrm>
+          <a:off x="0" y="0"/>
+          <a:ext cx="0" cy="0"/>
+          <a:chOff x="0" y="0"/>
+          <a:chExt cx="0" cy="0"/>
+        </a:xfrm>
+      </p:grpSpPr>
+      <p:sp>
+        <p:nvSpPr>
+          <p:cNvPr id="250" name="Title 4"/>
+          <p:cNvSpPr txBox="1">
+            <a:spLocks noGrp="1"/>
+          </p:cNvSpPr>
+          <p:nvPr>
+            <p:ph type="title"/>
+          </p:nvPr>
+        </p:nvSpPr>
+        <p:spPr>
+          <a:xfrm>
+            <a:off x="1774725" y="426126"/>
+            <a:ext cx="9312376" cy="972718"/>
+          </a:xfrm>
+          <a:prstGeom prst="rect">
+            <a:avLst/>
+          </a:prstGeom>
+        </p:spPr>
+        <p:txBody>
+          <a:bodyPr/>
+          <a:lstStyle/>
+          <a:p>
+            <a:r>
+              <a:rPr lang="da-DK" dirty="0" err="1"/>
+              <a:t>Popular</a:t>
+            </a:r>
+            <a:r>
+              <a:rPr lang="da-DK" dirty="0"/>
+              <a:t> component: </a:t>
+            </a:r>
+            <a:r>
+              <a:rPr lang="da-DK" dirty="0" err="1"/>
+              <a:t>Phonon_simple</a:t>
+            </a:r>
+            <a:endParaRPr dirty="0"/>
+          </a:p>
+        </p:txBody>
+      </p:sp>
+      <p:sp>
+        <p:nvSpPr>
+          <p:cNvPr id="251" name="Content Placeholder 5"/>
+          <p:cNvSpPr txBox="1">
+            <a:spLocks noGrp="1"/>
+          </p:cNvSpPr>
+          <p:nvPr>
+            <p:ph type="body" idx="1"/>
+          </p:nvPr>
+        </p:nvSpPr>
+        <p:spPr>
+          <a:xfrm>
+            <a:off x="1774799" y="1706399"/>
+            <a:ext cx="9312376" cy="4545579"/>
+          </a:xfrm>
+          <a:prstGeom prst="rect">
+            <a:avLst/>
+          </a:prstGeom>
+        </p:spPr>
+        <p:txBody>
+          <a:bodyPr/>
+          <a:lstStyle/>
+          <a:p>
+            <a:r>
+              <a:rPr lang="da-DK" dirty="0"/>
+              <a:t>One </a:t>
+            </a:r>
+            <a:r>
+              <a:rPr lang="da-DK" dirty="0" err="1"/>
+              <a:t>isotropic</a:t>
+            </a:r>
+            <a:r>
+              <a:rPr lang="da-DK" dirty="0"/>
+              <a:t> </a:t>
+            </a:r>
+            <a:r>
+              <a:rPr lang="da-DK" dirty="0" err="1"/>
+              <a:t>acustic</a:t>
+            </a:r>
+            <a:r>
+              <a:rPr lang="da-DK" dirty="0"/>
+              <a:t> </a:t>
+            </a:r>
+            <a:r>
+              <a:rPr lang="da-DK" dirty="0" err="1"/>
+              <a:t>phonon</a:t>
+            </a:r>
+            <a:r>
+              <a:rPr lang="da-DK" dirty="0"/>
+              <a:t> </a:t>
+            </a:r>
+            <a:r>
+              <a:rPr lang="da-DK" dirty="0" err="1"/>
+              <a:t>branch</a:t>
+            </a:r>
+            <a:r>
+              <a:rPr lang="da-DK" dirty="0"/>
+              <a:t> in all </a:t>
+            </a:r>
+            <a:r>
+              <a:rPr lang="da-DK" dirty="0" err="1"/>
+              <a:t>Briullion</a:t>
+            </a:r>
+            <a:r>
+              <a:rPr lang="da-DK" dirty="0"/>
+              <a:t> zones on FCC </a:t>
+            </a:r>
+            <a:r>
+              <a:rPr lang="da-DK" dirty="0" err="1"/>
+              <a:t>bravis</a:t>
+            </a:r>
+            <a:r>
+              <a:rPr lang="da-DK" dirty="0"/>
+              <a:t> single </a:t>
+            </a:r>
+            <a:r>
+              <a:rPr lang="da-DK" dirty="0" err="1"/>
+              <a:t>crystal</a:t>
+            </a:r>
+            <a:endParaRPr lang="da-DK" dirty="0"/>
+          </a:p>
+        </p:txBody>
+      </p:sp>
+      <p:sp>
+        <p:nvSpPr>
+          <p:cNvPr id="252" name="Slide Number Placeholder 3"/>
+          <p:cNvSpPr txBox="1">
+            <a:spLocks noGrp="1"/>
+          </p:cNvSpPr>
+          <p:nvPr>
+            <p:ph type="sldNum" sz="quarter" idx="2"/>
+          </p:nvPr>
+        </p:nvSpPr>
+        <p:spPr>
+          <a:xfrm>
+            <a:off x="11506450" y="6636099"/>
+            <a:ext cx="127001" cy="127001"/>
+          </a:xfrm>
+          <a:prstGeom prst="rect">
+            <a:avLst/>
+          </a:prstGeom>
+          <a:extLst>
+            <a:ext uri="{C572A759-6A51-4108-AA02-DFA0A04FC94B}">
+              <ma14:wrappingTextBoxFlag xmlns="" xmlns:m="http://schemas.openxmlformats.org/officeDocument/2006/math" xmlns:a14="http://schemas.microsoft.com/office/drawing/2010/main" xmlns:ma14="http://schemas.microsoft.com/office/mac/drawingml/2011/main" val="1"/>
+            </a:ext>
+          </a:extLst>
+        </p:spPr>
+        <p:txBody>
+          <a:bodyPr/>
+          <a:lstStyle/>
+          <a:p>
+            <a:fld id="{86CB4B4D-7CA3-9044-876B-883B54F8677D}" type="slidenum">
+              <a:t>4</a:t>
             </a:fld>
             <a:endParaRPr/>
           </a:p>
@@ -10513,7 +10704,7 @@
 </p:sld>
 </file>
 
-<file path=ppt/slides/slide6.xml><?xml version="1.0" encoding="utf-8"?>
+<file path=ppt/slides/slide5.xml><?xml version="1.0" encoding="utf-8"?>
 <p:sld xmlns:a="http://schemas.openxmlformats.org/drawingml/2006/main" xmlns:r="http://schemas.openxmlformats.org/officeDocument/2006/relationships" xmlns:p="http://schemas.openxmlformats.org/presentationml/2006/main">
   <p:cSld>
     <p:spTree>
@@ -10550,7 +10741,7 @@
           </a:prstGeom>
           <a:extLst>
             <a:ext uri="{C572A759-6A51-4108-AA02-DFA0A04FC94B}">
-              <ma14:wrappingTextBoxFlag xmlns:ma14="http://schemas.microsoft.com/office/mac/drawingml/2011/main" xmlns:a14="http://schemas.microsoft.com/office/drawing/2010/main" xmlns:m="http://schemas.openxmlformats.org/officeDocument/2006/math" xmlns="" val="1"/>
+              <ma14:wrappingTextBoxFlag xmlns="" xmlns:m="http://schemas.openxmlformats.org/officeDocument/2006/math" xmlns:a14="http://schemas.microsoft.com/office/drawing/2010/main" xmlns:ma14="http://schemas.microsoft.com/office/mac/drawingml/2011/main" val="1"/>
             </a:ext>
           </a:extLst>
         </p:spPr>
@@ -10559,7 +10750,7 @@
           <a:lstStyle/>
           <a:p>
             <a:fld id="{86CB4B4D-7CA3-9044-876B-883B54F8677D}" type="slidenum">
-              <a:t>6</a:t>
+              <a:t>5</a:t>
             </a:fld>
             <a:endParaRPr/>
           </a:p>
@@ -11268,7 +11459,7 @@
 </p:sld>
 </file>
 
-<file path=ppt/slides/slide7.xml><?xml version="1.0" encoding="utf-8"?>
+<file path=ppt/slides/slide6.xml><?xml version="1.0" encoding="utf-8"?>
 <p:sld xmlns:a="http://schemas.openxmlformats.org/drawingml/2006/main" xmlns:r="http://schemas.openxmlformats.org/officeDocument/2006/relationships" xmlns:p="http://schemas.openxmlformats.org/presentationml/2006/main">
   <p:cSld>
     <p:spTree>
@@ -11379,7 +11570,7 @@
           </a:prstGeom>
           <a:extLst>
             <a:ext uri="{C572A759-6A51-4108-AA02-DFA0A04FC94B}">
-              <ma14:wrappingTextBoxFlag xmlns:ma14="http://schemas.microsoft.com/office/mac/drawingml/2011/main" xmlns:a14="http://schemas.microsoft.com/office/drawing/2010/main" xmlns:m="http://schemas.openxmlformats.org/officeDocument/2006/math" xmlns="" val="1"/>
+              <ma14:wrappingTextBoxFlag xmlns="" xmlns:m="http://schemas.openxmlformats.org/officeDocument/2006/math" xmlns:a14="http://schemas.microsoft.com/office/drawing/2010/main" xmlns:ma14="http://schemas.microsoft.com/office/mac/drawingml/2011/main" val="1"/>
             </a:ext>
           </a:extLst>
         </p:spPr>
@@ -11388,7 +11579,7 @@
           <a:lstStyle/>
           <a:p>
             <a:fld id="{86CB4B4D-7CA3-9044-876B-883B54F8677D}" type="slidenum">
-              <a:t>7</a:t>
+              <a:t>6</a:t>
             </a:fld>
             <a:endParaRPr/>
           </a:p>
@@ -11593,7 +11784,7 @@
 </p:sld>
 </file>
 
-<file path=ppt/slides/slide8.xml><?xml version="1.0" encoding="utf-8"?>
+<file path=ppt/slides/slide7.xml><?xml version="1.0" encoding="utf-8"?>
 <p:sld xmlns:a="http://schemas.openxmlformats.org/drawingml/2006/main" xmlns:r="http://schemas.openxmlformats.org/officeDocument/2006/relationships" xmlns:p="http://schemas.openxmlformats.org/presentationml/2006/main">
   <p:cSld>
     <p:spTree>
@@ -11780,7 +11971,7 @@
           </a:prstGeom>
           <a:extLst>
             <a:ext uri="{C572A759-6A51-4108-AA02-DFA0A04FC94B}">
-              <ma14:wrappingTextBoxFlag xmlns:ma14="http://schemas.microsoft.com/office/mac/drawingml/2011/main" xmlns:a14="http://schemas.microsoft.com/office/drawing/2010/main" xmlns:m="http://schemas.openxmlformats.org/officeDocument/2006/math" xmlns="" val="1"/>
+              <ma14:wrappingTextBoxFlag xmlns="" xmlns:m="http://schemas.openxmlformats.org/officeDocument/2006/math" xmlns:a14="http://schemas.microsoft.com/office/drawing/2010/main" xmlns:ma14="http://schemas.microsoft.com/office/mac/drawingml/2011/main" val="1"/>
             </a:ext>
           </a:extLst>
         </p:spPr>
@@ -11789,7 +11980,7 @@
           <a:lstStyle/>
           <a:p>
             <a:fld id="{86CB4B4D-7CA3-9044-876B-883B54F8677D}" type="slidenum">
-              <a:t>8</a:t>
+              <a:t>7</a:t>
             </a:fld>
             <a:endParaRPr/>
           </a:p>
@@ -11845,7 +12036,7 @@
 </p:sld>
 </file>
 
-<file path=ppt/slides/slide9.xml><?xml version="1.0" encoding="utf-8"?>
+<file path=ppt/slides/slide8.xml><?xml version="1.0" encoding="utf-8"?>
 <p:sld xmlns:a="http://schemas.openxmlformats.org/drawingml/2006/main" xmlns:r="http://schemas.openxmlformats.org/officeDocument/2006/relationships" xmlns:p="http://schemas.openxmlformats.org/presentationml/2006/main">
   <p:cSld>
     <p:spTree>
@@ -12032,7 +12223,7 @@
           </a:prstGeom>
           <a:extLst>
             <a:ext uri="{C572A759-6A51-4108-AA02-DFA0A04FC94B}">
-              <ma14:wrappingTextBoxFlag xmlns:ma14="http://schemas.microsoft.com/office/mac/drawingml/2011/main" xmlns:a14="http://schemas.microsoft.com/office/drawing/2010/main" xmlns:m="http://schemas.openxmlformats.org/officeDocument/2006/math" xmlns="" val="1"/>
+              <ma14:wrappingTextBoxFlag xmlns="" xmlns:m="http://schemas.openxmlformats.org/officeDocument/2006/math" xmlns:a14="http://schemas.microsoft.com/office/drawing/2010/main" xmlns:ma14="http://schemas.microsoft.com/office/mac/drawingml/2011/main" val="1"/>
             </a:ext>
           </a:extLst>
         </p:spPr>
@@ -12041,7 +12232,7 @@
           <a:lstStyle/>
           <a:p>
             <a:fld id="{86CB4B4D-7CA3-9044-876B-883B54F8677D}" type="slidenum">
-              <a:t>9</a:t>
+              <a:t>8</a:t>
             </a:fld>
             <a:endParaRPr/>
           </a:p>
@@ -12497,6 +12688,211 @@
     <p:extLst>
       <p:ext uri="{BB962C8B-B14F-4D97-AF65-F5344CB8AC3E}">
         <p14:creationId xmlns:p14="http://schemas.microsoft.com/office/powerpoint/2010/main" val="2261644890"/>
+      </p:ext>
+    </p:extLst>
+  </p:cSld>
+  <p:clrMapOvr>
+    <a:masterClrMapping/>
+  </p:clrMapOvr>
+  <p:transition spd="med"/>
+</p:sld>
+</file>
+
+<file path=ppt/slides/slide9.xml><?xml version="1.0" encoding="utf-8"?>
+<p:sld xmlns:a="http://schemas.openxmlformats.org/drawingml/2006/main" xmlns:r="http://schemas.openxmlformats.org/officeDocument/2006/relationships" xmlns:p="http://schemas.openxmlformats.org/presentationml/2006/main">
+  <p:cSld>
+    <p:spTree>
+      <p:nvGrpSpPr>
+        <p:cNvPr id="1" name=""/>
+        <p:cNvGrpSpPr/>
+        <p:nvPr/>
+      </p:nvGrpSpPr>
+      <p:grpSpPr>
+        <a:xfrm>
+          <a:off x="0" y="0"/>
+          <a:ext cx="0" cy="0"/>
+          <a:chOff x="0" y="0"/>
+          <a:chExt cx="0" cy="0"/>
+        </a:xfrm>
+      </p:grpSpPr>
+      <p:sp>
+        <p:nvSpPr>
+          <p:cNvPr id="250" name="Title 4"/>
+          <p:cNvSpPr txBox="1">
+            <a:spLocks noGrp="1"/>
+          </p:cNvSpPr>
+          <p:nvPr>
+            <p:ph type="title"/>
+          </p:nvPr>
+        </p:nvSpPr>
+        <p:spPr>
+          <a:xfrm>
+            <a:off x="1774725" y="426126"/>
+            <a:ext cx="9312376" cy="972718"/>
+          </a:xfrm>
+          <a:prstGeom prst="rect">
+            <a:avLst/>
+          </a:prstGeom>
+        </p:spPr>
+        <p:txBody>
+          <a:bodyPr/>
+          <a:lstStyle/>
+          <a:p>
+            <a:r>
+              <a:rPr lang="da-DK" dirty="0" err="1"/>
+              <a:t>Popular</a:t>
+            </a:r>
+            <a:r>
+              <a:rPr lang="da-DK" dirty="0"/>
+              <a:t> component: </a:t>
+            </a:r>
+            <a:r>
+              <a:rPr lang="da-DK" dirty="0" err="1"/>
+              <a:t>Isotropic_sqw</a:t>
+            </a:r>
+            <a:endParaRPr dirty="0"/>
+          </a:p>
+        </p:txBody>
+      </p:sp>
+      <p:sp>
+        <p:nvSpPr>
+          <p:cNvPr id="251" name="Content Placeholder 5"/>
+          <p:cNvSpPr txBox="1">
+            <a:spLocks noGrp="1"/>
+          </p:cNvSpPr>
+          <p:nvPr>
+            <p:ph type="body" idx="1"/>
+          </p:nvPr>
+        </p:nvSpPr>
+        <p:spPr>
+          <a:xfrm>
+            <a:off x="1774799" y="1706399"/>
+            <a:ext cx="9312376" cy="4545579"/>
+          </a:xfrm>
+          <a:prstGeom prst="rect">
+            <a:avLst/>
+          </a:prstGeom>
+        </p:spPr>
+        <p:txBody>
+          <a:bodyPr/>
+          <a:lstStyle/>
+          <a:p>
+            <a:r>
+              <a:rPr lang="da-DK" dirty="0"/>
+              <a:t>Rb </a:t>
+            </a:r>
+            <a:r>
+              <a:rPr lang="da-DK" dirty="0" err="1"/>
+              <a:t>liquid</a:t>
+            </a:r>
+            <a:r>
+              <a:rPr lang="da-DK" dirty="0"/>
+              <a:t> in time of </a:t>
+            </a:r>
+            <a:r>
+              <a:rPr lang="da-DK" dirty="0" err="1"/>
+              <a:t>flight</a:t>
+            </a:r>
+            <a:endParaRPr lang="da-DK" dirty="0"/>
+          </a:p>
+          <a:p>
+            <a:r>
+              <a:rPr lang="da-DK" dirty="0" err="1"/>
+              <a:t>Coherent</a:t>
+            </a:r>
+            <a:r>
+              <a:rPr lang="da-DK" dirty="0"/>
+              <a:t> and </a:t>
+            </a:r>
+            <a:r>
+              <a:rPr lang="da-DK" dirty="0" err="1"/>
+              <a:t>incoherent</a:t>
+            </a:r>
+            <a:endParaRPr lang="da-DK" dirty="0"/>
+          </a:p>
+          <a:p>
+            <a:pPr marL="0" indent="0">
+              <a:buNone/>
+            </a:pPr>
+            <a:endParaRPr dirty="0"/>
+          </a:p>
+        </p:txBody>
+      </p:sp>
+      <p:sp>
+        <p:nvSpPr>
+          <p:cNvPr id="252" name="Slide Number Placeholder 3"/>
+          <p:cNvSpPr txBox="1">
+            <a:spLocks noGrp="1"/>
+          </p:cNvSpPr>
+          <p:nvPr>
+            <p:ph type="sldNum" sz="quarter" idx="2"/>
+          </p:nvPr>
+        </p:nvSpPr>
+        <p:spPr>
+          <a:xfrm>
+            <a:off x="11506450" y="6636099"/>
+            <a:ext cx="127001" cy="127001"/>
+          </a:xfrm>
+          <a:prstGeom prst="rect">
+            <a:avLst/>
+          </a:prstGeom>
+          <a:extLst>
+            <a:ext uri="{C572A759-6A51-4108-AA02-DFA0A04FC94B}">
+              <ma14:wrappingTextBoxFlag xmlns="" xmlns:m="http://schemas.openxmlformats.org/officeDocument/2006/math" xmlns:a14="http://schemas.microsoft.com/office/drawing/2010/main" xmlns:ma14="http://schemas.microsoft.com/office/mac/drawingml/2011/main" val="1"/>
+            </a:ext>
+          </a:extLst>
+        </p:spPr>
+        <p:txBody>
+          <a:bodyPr/>
+          <a:lstStyle/>
+          <a:p>
+            <a:fld id="{86CB4B4D-7CA3-9044-876B-883B54F8677D}" type="slidenum">
+              <a:t>9</a:t>
+            </a:fld>
+            <a:endParaRPr/>
+          </a:p>
+        </p:txBody>
+      </p:sp>
+      <p:pic>
+        <p:nvPicPr>
+          <p:cNvPr id="3" name="Picture 2">
+            <a:extLst>
+              <a:ext uri="{FF2B5EF4-FFF2-40B4-BE49-F238E27FC236}">
+                <a16:creationId xmlns:a16="http://schemas.microsoft.com/office/drawing/2014/main" id="{E963C22E-FBB1-4047-9AF8-A3DA63978273}"/>
+              </a:ext>
+            </a:extLst>
+          </p:cNvPr>
+          <p:cNvPicPr>
+            <a:picLocks noChangeAspect="1"/>
+          </p:cNvPicPr>
+          <p:nvPr/>
+        </p:nvPicPr>
+        <p:blipFill>
+          <a:blip r:embed="rId2">
+            <a:extLst>
+              <a:ext uri="{28A0092B-C50C-407E-A947-70E740481C1C}">
+                <a14:useLocalDpi xmlns:a14="http://schemas.microsoft.com/office/drawing/2010/main" val="0"/>
+              </a:ext>
+            </a:extLst>
+          </a:blip>
+          <a:stretch>
+            <a:fillRect/>
+          </a:stretch>
+        </p:blipFill>
+        <p:spPr>
+          <a:xfrm>
+            <a:off x="4962053" y="1706398"/>
+            <a:ext cx="7071448" cy="4660111"/>
+          </a:xfrm>
+          <a:prstGeom prst="rect">
+            <a:avLst/>
+          </a:prstGeom>
+        </p:spPr>
+      </p:pic>
+    </p:spTree>
+    <p:extLst>
+      <p:ext uri="{BB962C8B-B14F-4D97-AF65-F5344CB8AC3E}">
+        <p14:creationId xmlns:p14="http://schemas.microsoft.com/office/powerpoint/2010/main" val="1139390163"/>
       </p:ext>
     </p:extLst>
   </p:cSld>

</xml_diff>